<commit_message>
MCU documents for T-Type 3L Inverters
</commit_message>
<xml_diff>
--- a/Reports/Fault_Tolerance.pptx
+++ b/Reports/Fault_Tolerance.pptx
@@ -15,7 +15,9 @@
     <p:sldId id="263" r:id="rId9"/>
     <p:sldId id="265" r:id="rId10"/>
     <p:sldId id="264" r:id="rId11"/>
-    <p:sldId id="266" r:id="rId12"/>
+    <p:sldId id="268" r:id="rId12"/>
+    <p:sldId id="266" r:id="rId13"/>
+    <p:sldId id="267" r:id="rId14"/>
   </p:sldIdLst>
   <p:sldSz cx="12192000" cy="6858000"/>
   <p:notesSz cx="6858000" cy="9144000"/>
@@ -253,7 +255,7 @@
           <a:p>
             <a:fld id="{524C83C5-A6E3-467E-88A3-7867E1892419}" type="datetimeFigureOut">
               <a:rPr lang="tr-TR" smtClean="0"/>
-              <a:t>17.02.2024</a:t>
+              <a:t>20.02.2024</a:t>
             </a:fld>
             <a:endParaRPr lang="tr-TR"/>
           </a:p>
@@ -423,7 +425,7 @@
           <a:p>
             <a:fld id="{524C83C5-A6E3-467E-88A3-7867E1892419}" type="datetimeFigureOut">
               <a:rPr lang="tr-TR" smtClean="0"/>
-              <a:t>17.02.2024</a:t>
+              <a:t>20.02.2024</a:t>
             </a:fld>
             <a:endParaRPr lang="tr-TR"/>
           </a:p>
@@ -603,7 +605,7 @@
           <a:p>
             <a:fld id="{524C83C5-A6E3-467E-88A3-7867E1892419}" type="datetimeFigureOut">
               <a:rPr lang="tr-TR" smtClean="0"/>
-              <a:t>17.02.2024</a:t>
+              <a:t>20.02.2024</a:t>
             </a:fld>
             <a:endParaRPr lang="tr-TR"/>
           </a:p>
@@ -773,7 +775,7 @@
           <a:p>
             <a:fld id="{524C83C5-A6E3-467E-88A3-7867E1892419}" type="datetimeFigureOut">
               <a:rPr lang="tr-TR" smtClean="0"/>
-              <a:t>17.02.2024</a:t>
+              <a:t>20.02.2024</a:t>
             </a:fld>
             <a:endParaRPr lang="tr-TR"/>
           </a:p>
@@ -1019,7 +1021,7 @@
           <a:p>
             <a:fld id="{524C83C5-A6E3-467E-88A3-7867E1892419}" type="datetimeFigureOut">
               <a:rPr lang="tr-TR" smtClean="0"/>
-              <a:t>17.02.2024</a:t>
+              <a:t>20.02.2024</a:t>
             </a:fld>
             <a:endParaRPr lang="tr-TR"/>
           </a:p>
@@ -1251,7 +1253,7 @@
           <a:p>
             <a:fld id="{524C83C5-A6E3-467E-88A3-7867E1892419}" type="datetimeFigureOut">
               <a:rPr lang="tr-TR" smtClean="0"/>
-              <a:t>17.02.2024</a:t>
+              <a:t>20.02.2024</a:t>
             </a:fld>
             <a:endParaRPr lang="tr-TR"/>
           </a:p>
@@ -1618,7 +1620,7 @@
           <a:p>
             <a:fld id="{524C83C5-A6E3-467E-88A3-7867E1892419}" type="datetimeFigureOut">
               <a:rPr lang="tr-TR" smtClean="0"/>
-              <a:t>17.02.2024</a:t>
+              <a:t>20.02.2024</a:t>
             </a:fld>
             <a:endParaRPr lang="tr-TR"/>
           </a:p>
@@ -1736,7 +1738,7 @@
           <a:p>
             <a:fld id="{524C83C5-A6E3-467E-88A3-7867E1892419}" type="datetimeFigureOut">
               <a:rPr lang="tr-TR" smtClean="0"/>
-              <a:t>17.02.2024</a:t>
+              <a:t>20.02.2024</a:t>
             </a:fld>
             <a:endParaRPr lang="tr-TR"/>
           </a:p>
@@ -1831,7 +1833,7 @@
           <a:p>
             <a:fld id="{524C83C5-A6E3-467E-88A3-7867E1892419}" type="datetimeFigureOut">
               <a:rPr lang="tr-TR" smtClean="0"/>
-              <a:t>17.02.2024</a:t>
+              <a:t>20.02.2024</a:t>
             </a:fld>
             <a:endParaRPr lang="tr-TR"/>
           </a:p>
@@ -2108,7 +2110,7 @@
           <a:p>
             <a:fld id="{524C83C5-A6E3-467E-88A3-7867E1892419}" type="datetimeFigureOut">
               <a:rPr lang="tr-TR" smtClean="0"/>
-              <a:t>17.02.2024</a:t>
+              <a:t>20.02.2024</a:t>
             </a:fld>
             <a:endParaRPr lang="tr-TR"/>
           </a:p>
@@ -2365,7 +2367,7 @@
           <a:p>
             <a:fld id="{524C83C5-A6E3-467E-88A3-7867E1892419}" type="datetimeFigureOut">
               <a:rPr lang="tr-TR" smtClean="0"/>
-              <a:t>17.02.2024</a:t>
+              <a:t>20.02.2024</a:t>
             </a:fld>
             <a:endParaRPr lang="tr-TR"/>
           </a:p>
@@ -2578,7 +2580,7 @@
           <a:p>
             <a:fld id="{524C83C5-A6E3-467E-88A3-7867E1892419}" type="datetimeFigureOut">
               <a:rPr lang="tr-TR" smtClean="0"/>
-              <a:t>17.02.2024</a:t>
+              <a:t>20.02.2024</a:t>
             </a:fld>
             <a:endParaRPr lang="tr-TR"/>
           </a:p>
@@ -2969,6 +2971,14 @@
 <file path=ppt/slides/slide1.xml><?xml version="1.0" encoding="utf-8"?>
 <p:sld xmlns:a="http://schemas.openxmlformats.org/drawingml/2006/main" xmlns:r="http://schemas.openxmlformats.org/officeDocument/2006/relationships" xmlns:p="http://schemas.openxmlformats.org/presentationml/2006/main">
   <p:cSld>
+    <p:bg>
+      <p:bgPr>
+        <a:solidFill>
+          <a:schemeClr val="bg1"/>
+        </a:solidFill>
+        <a:effectLst/>
+      </p:bgPr>
+    </p:bg>
     <p:spTree>
       <p:nvGrpSpPr>
         <p:cNvPr id="1" name=""/>
@@ -2983,6 +2993,457 @@
           <a:chExt cx="0" cy="0"/>
         </a:xfrm>
       </p:grpSpPr>
+      <p:sp useBgFill="1">
+        <p:nvSpPr>
+          <p:cNvPr id="8" name="Rectangle 7">
+            <a:extLst>
+              <a:ext uri="{FF2B5EF4-FFF2-40B4-BE49-F238E27FC236}">
+                <a16:creationId xmlns:a16="http://schemas.microsoft.com/office/drawing/2014/main" id="{FFD48BC7-DC40-47DE-87EE-9F4B6ECB9ABB}"/>
+              </a:ext>
+              <a:ext uri="{C183D7F6-B498-43B3-948B-1728B52AA6E4}">
+                <adec:decorative xmlns:adec="http://schemas.microsoft.com/office/drawing/2017/decorative" val="1"/>
+              </a:ext>
+            </a:extLst>
+          </p:cNvPr>
+          <p:cNvSpPr>
+            <a:spLocks noGrp="1" noRot="1" noChangeAspect="1" noMove="1" noResize="1" noEditPoints="1" noAdjustHandles="1" noChangeArrowheads="1" noChangeShapeType="1" noTextEdit="1"/>
+          </p:cNvSpPr>
+          <p:nvPr>
+            <p:extLst>
+              <p:ext uri="{386F3935-93C4-4BCD-93E2-E3B085C9AB24}">
+                <p16:designElem xmlns:p16="http://schemas.microsoft.com/office/powerpoint/2015/main" val="1"/>
+              </p:ext>
+            </p:extLst>
+          </p:nvPr>
+        </p:nvSpPr>
+        <p:spPr>
+          <a:xfrm>
+            <a:off x="0" y="0"/>
+            <a:ext cx="12192000" cy="6858000"/>
+          </a:xfrm>
+          <a:prstGeom prst="rect">
+            <a:avLst/>
+          </a:prstGeom>
+          <a:ln>
+            <a:noFill/>
+          </a:ln>
+        </p:spPr>
+        <p:style>
+          <a:lnRef idx="2">
+            <a:schemeClr val="accent1">
+              <a:shade val="50000"/>
+            </a:schemeClr>
+          </a:lnRef>
+          <a:fillRef idx="1">
+            <a:schemeClr val="accent1"/>
+          </a:fillRef>
+          <a:effectRef idx="0">
+            <a:schemeClr val="accent1"/>
+          </a:effectRef>
+          <a:fontRef idx="minor">
+            <a:schemeClr val="lt1"/>
+          </a:fontRef>
+        </p:style>
+        <p:txBody>
+          <a:bodyPr rtlCol="0" anchor="ctr"/>
+          <a:lstStyle/>
+          <a:p>
+            <a:pPr algn="ctr"/>
+            <a:endParaRPr lang="en-US"/>
+          </a:p>
+        </p:txBody>
+      </p:sp>
+      <p:sp useBgFill="1">
+        <p:nvSpPr>
+          <p:cNvPr id="10" name="Freeform: Shape 9">
+            <a:extLst>
+              <a:ext uri="{FF2B5EF4-FFF2-40B4-BE49-F238E27FC236}">
+                <a16:creationId xmlns:a16="http://schemas.microsoft.com/office/drawing/2014/main" id="{E502BBC7-2C76-46F3-BC24-5985BC13DB88}"/>
+              </a:ext>
+              <a:ext uri="{C183D7F6-B498-43B3-948B-1728B52AA6E4}">
+                <adec:decorative xmlns:adec="http://schemas.microsoft.com/office/drawing/2017/decorative" val="1"/>
+              </a:ext>
+            </a:extLst>
+          </p:cNvPr>
+          <p:cNvSpPr>
+            <a:spLocks noGrp="1" noRot="1" noChangeAspect="1" noMove="1" noResize="1" noEditPoints="1" noAdjustHandles="1" noChangeArrowheads="1" noChangeShapeType="1" noTextEdit="1"/>
+          </p:cNvSpPr>
+          <p:nvPr>
+            <p:extLst>
+              <p:ext uri="{386F3935-93C4-4BCD-93E2-E3B085C9AB24}">
+                <p16:designElem xmlns:p16="http://schemas.microsoft.com/office/powerpoint/2015/main" val="1"/>
+              </p:ext>
+            </p:extLst>
+          </p:nvPr>
+        </p:nvSpPr>
+        <p:spPr>
+          <a:xfrm>
+            <a:off x="1114425" y="0"/>
+            <a:ext cx="9963150" cy="6858000"/>
+          </a:xfrm>
+          <a:custGeom>
+            <a:avLst/>
+            <a:gdLst>
+              <a:gd name="connsiteX0" fmla="*/ 1595771 w 9963150"/>
+              <a:gd name="connsiteY0" fmla="*/ 0 h 6858000"/>
+              <a:gd name="connsiteX1" fmla="*/ 8367379 w 9963150"/>
+              <a:gd name="connsiteY1" fmla="*/ 0 h 6858000"/>
+              <a:gd name="connsiteX2" fmla="*/ 8504080 w 9963150"/>
+              <a:gd name="connsiteY2" fmla="*/ 130333 h 6858000"/>
+              <a:gd name="connsiteX3" fmla="*/ 9963150 w 9963150"/>
+              <a:gd name="connsiteY3" fmla="*/ 3652838 h 6858000"/>
+              <a:gd name="connsiteX4" fmla="*/ 8825600 w 9963150"/>
+              <a:gd name="connsiteY4" fmla="*/ 6821583 h 6858000"/>
+              <a:gd name="connsiteX5" fmla="*/ 8794055 w 9963150"/>
+              <a:gd name="connsiteY5" fmla="*/ 6858000 h 6858000"/>
+              <a:gd name="connsiteX6" fmla="*/ 1169096 w 9963150"/>
+              <a:gd name="connsiteY6" fmla="*/ 6858000 h 6858000"/>
+              <a:gd name="connsiteX7" fmla="*/ 1137550 w 9963150"/>
+              <a:gd name="connsiteY7" fmla="*/ 6821583 h 6858000"/>
+              <a:gd name="connsiteX8" fmla="*/ 0 w 9963150"/>
+              <a:gd name="connsiteY8" fmla="*/ 3652838 h 6858000"/>
+              <a:gd name="connsiteX9" fmla="*/ 1459070 w 9963150"/>
+              <a:gd name="connsiteY9" fmla="*/ 130333 h 6858000"/>
+            </a:gdLst>
+            <a:ahLst/>
+            <a:cxnLst>
+              <a:cxn ang="0">
+                <a:pos x="connsiteX0" y="connsiteY0"/>
+              </a:cxn>
+              <a:cxn ang="0">
+                <a:pos x="connsiteX1" y="connsiteY1"/>
+              </a:cxn>
+              <a:cxn ang="0">
+                <a:pos x="connsiteX2" y="connsiteY2"/>
+              </a:cxn>
+              <a:cxn ang="0">
+                <a:pos x="connsiteX3" y="connsiteY3"/>
+              </a:cxn>
+              <a:cxn ang="0">
+                <a:pos x="connsiteX4" y="connsiteY4"/>
+              </a:cxn>
+              <a:cxn ang="0">
+                <a:pos x="connsiteX5" y="connsiteY5"/>
+              </a:cxn>
+              <a:cxn ang="0">
+                <a:pos x="connsiteX6" y="connsiteY6"/>
+              </a:cxn>
+              <a:cxn ang="0">
+                <a:pos x="connsiteX7" y="connsiteY7"/>
+              </a:cxn>
+              <a:cxn ang="0">
+                <a:pos x="connsiteX8" y="connsiteY8"/>
+              </a:cxn>
+              <a:cxn ang="0">
+                <a:pos x="connsiteX9" y="connsiteY9"/>
+              </a:cxn>
+            </a:cxnLst>
+            <a:rect l="l" t="t" r="r" b="b"/>
+            <a:pathLst>
+              <a:path w="9963150" h="6858000">
+                <a:moveTo>
+                  <a:pt x="1595771" y="0"/>
+                </a:moveTo>
+                <a:lnTo>
+                  <a:pt x="8367379" y="0"/>
+                </a:lnTo>
+                <a:lnTo>
+                  <a:pt x="8504080" y="130333"/>
+                </a:lnTo>
+                <a:cubicBezTo>
+                  <a:pt x="9405568" y="1031820"/>
+                  <a:pt x="9963150" y="2277214"/>
+                  <a:pt x="9963150" y="3652838"/>
+                </a:cubicBezTo>
+                <a:cubicBezTo>
+                  <a:pt x="9963150" y="4856509"/>
+                  <a:pt x="9536251" y="5960473"/>
+                  <a:pt x="8825600" y="6821583"/>
+                </a:cubicBezTo>
+                <a:lnTo>
+                  <a:pt x="8794055" y="6858000"/>
+                </a:lnTo>
+                <a:lnTo>
+                  <a:pt x="1169096" y="6858000"/>
+                </a:lnTo>
+                <a:lnTo>
+                  <a:pt x="1137550" y="6821583"/>
+                </a:lnTo>
+                <a:cubicBezTo>
+                  <a:pt x="426899" y="5960473"/>
+                  <a:pt x="0" y="4856509"/>
+                  <a:pt x="0" y="3652838"/>
+                </a:cubicBezTo>
+                <a:cubicBezTo>
+                  <a:pt x="0" y="2277214"/>
+                  <a:pt x="557582" y="1031820"/>
+                  <a:pt x="1459070" y="130333"/>
+                </a:cubicBezTo>
+                <a:close/>
+              </a:path>
+            </a:pathLst>
+          </a:custGeom>
+          <a:ln w="9525">
+            <a:solidFill>
+              <a:srgbClr val="EFEFEF"/>
+            </a:solidFill>
+          </a:ln>
+          <a:effectLst>
+            <a:outerShdw blurRad="139700" sx="102000" sy="102000" algn="ctr" rotWithShape="0">
+              <a:schemeClr val="bg1">
+                <a:lumMod val="85000"/>
+                <a:alpha val="38000"/>
+              </a:schemeClr>
+            </a:outerShdw>
+          </a:effectLst>
+        </p:spPr>
+        <p:style>
+          <a:lnRef idx="2">
+            <a:schemeClr val="accent1">
+              <a:shade val="50000"/>
+            </a:schemeClr>
+          </a:lnRef>
+          <a:fillRef idx="1">
+            <a:schemeClr val="accent1"/>
+          </a:fillRef>
+          <a:effectRef idx="0">
+            <a:schemeClr val="accent1"/>
+          </a:effectRef>
+          <a:fontRef idx="minor">
+            <a:schemeClr val="lt1"/>
+          </a:fontRef>
+        </p:style>
+        <p:txBody>
+          <a:bodyPr wrap="square" rtlCol="0" anchor="ctr">
+            <a:noAutofit/>
+          </a:bodyPr>
+          <a:lstStyle/>
+          <a:p>
+            <a:pPr marL="0" marR="0" lvl="0" indent="0" algn="ctr" defTabSz="914400" rtl="0" eaLnBrk="1" fontAlgn="auto" latinLnBrk="0" hangingPunct="1">
+              <a:lnSpc>
+                <a:spcPct val="100000"/>
+              </a:lnSpc>
+              <a:spcBef>
+                <a:spcPts val="0"/>
+              </a:spcBef>
+              <a:spcAft>
+                <a:spcPts val="0"/>
+              </a:spcAft>
+              <a:buClrTx/>
+              <a:buSzTx/>
+              <a:buFontTx/>
+              <a:buNone/>
+              <a:tabLst/>
+              <a:defRPr/>
+            </a:pPr>
+            <a:endParaRPr kumimoji="0" lang="en-US" sz="1800" b="0" i="0" u="none" strike="noStrike" kern="1200" cap="none" spc="0" normalizeH="0" baseline="0" noProof="0">
+              <a:ln>
+                <a:noFill/>
+              </a:ln>
+              <a:solidFill>
+                <a:prstClr val="white"/>
+              </a:solidFill>
+              <a:effectLst/>
+              <a:uLnTx/>
+              <a:uFillTx/>
+              <a:latin typeface="Calibri" panose="020F0502020204030204"/>
+              <a:ea typeface="+mn-ea"/>
+              <a:cs typeface="+mn-cs"/>
+            </a:endParaRPr>
+          </a:p>
+        </p:txBody>
+      </p:sp>
+      <p:sp useBgFill="1">
+        <p:nvSpPr>
+          <p:cNvPr id="12" name="Freeform: Shape 11">
+            <a:extLst>
+              <a:ext uri="{FF2B5EF4-FFF2-40B4-BE49-F238E27FC236}">
+                <a16:creationId xmlns:a16="http://schemas.microsoft.com/office/drawing/2014/main" id="{C7F28D52-2A5F-4D23-81AE-7CB8B591C7AF}"/>
+              </a:ext>
+              <a:ext uri="{C183D7F6-B498-43B3-948B-1728B52AA6E4}">
+                <adec:decorative xmlns:adec="http://schemas.microsoft.com/office/drawing/2017/decorative" val="1"/>
+              </a:ext>
+            </a:extLst>
+          </p:cNvPr>
+          <p:cNvSpPr>
+            <a:spLocks noGrp="1" noRot="1" noChangeAspect="1" noMove="1" noResize="1" noEditPoints="1" noAdjustHandles="1" noChangeArrowheads="1" noChangeShapeType="1" noTextEdit="1"/>
+          </p:cNvSpPr>
+          <p:nvPr>
+            <p:extLst>
+              <p:ext uri="{386F3935-93C4-4BCD-93E2-E3B085C9AB24}">
+                <p16:designElem xmlns:p16="http://schemas.microsoft.com/office/powerpoint/2015/main" val="1"/>
+              </p:ext>
+            </p:extLst>
+          </p:nvPr>
+        </p:nvSpPr>
+        <p:spPr>
+          <a:xfrm>
+            <a:off x="1121664" y="0"/>
+            <a:ext cx="9948672" cy="6858000"/>
+          </a:xfrm>
+          <a:custGeom>
+            <a:avLst/>
+            <a:gdLst>
+              <a:gd name="connsiteX0" fmla="*/ 1595771 w 9963150"/>
+              <a:gd name="connsiteY0" fmla="*/ 0 h 6858000"/>
+              <a:gd name="connsiteX1" fmla="*/ 8367379 w 9963150"/>
+              <a:gd name="connsiteY1" fmla="*/ 0 h 6858000"/>
+              <a:gd name="connsiteX2" fmla="*/ 8504080 w 9963150"/>
+              <a:gd name="connsiteY2" fmla="*/ 130333 h 6858000"/>
+              <a:gd name="connsiteX3" fmla="*/ 9963150 w 9963150"/>
+              <a:gd name="connsiteY3" fmla="*/ 3652838 h 6858000"/>
+              <a:gd name="connsiteX4" fmla="*/ 8825600 w 9963150"/>
+              <a:gd name="connsiteY4" fmla="*/ 6821583 h 6858000"/>
+              <a:gd name="connsiteX5" fmla="*/ 8794055 w 9963150"/>
+              <a:gd name="connsiteY5" fmla="*/ 6858000 h 6858000"/>
+              <a:gd name="connsiteX6" fmla="*/ 1169096 w 9963150"/>
+              <a:gd name="connsiteY6" fmla="*/ 6858000 h 6858000"/>
+              <a:gd name="connsiteX7" fmla="*/ 1137550 w 9963150"/>
+              <a:gd name="connsiteY7" fmla="*/ 6821583 h 6858000"/>
+              <a:gd name="connsiteX8" fmla="*/ 0 w 9963150"/>
+              <a:gd name="connsiteY8" fmla="*/ 3652838 h 6858000"/>
+              <a:gd name="connsiteX9" fmla="*/ 1459070 w 9963150"/>
+              <a:gd name="connsiteY9" fmla="*/ 130333 h 6858000"/>
+            </a:gdLst>
+            <a:ahLst/>
+            <a:cxnLst>
+              <a:cxn ang="0">
+                <a:pos x="connsiteX0" y="connsiteY0"/>
+              </a:cxn>
+              <a:cxn ang="0">
+                <a:pos x="connsiteX1" y="connsiteY1"/>
+              </a:cxn>
+              <a:cxn ang="0">
+                <a:pos x="connsiteX2" y="connsiteY2"/>
+              </a:cxn>
+              <a:cxn ang="0">
+                <a:pos x="connsiteX3" y="connsiteY3"/>
+              </a:cxn>
+              <a:cxn ang="0">
+                <a:pos x="connsiteX4" y="connsiteY4"/>
+              </a:cxn>
+              <a:cxn ang="0">
+                <a:pos x="connsiteX5" y="connsiteY5"/>
+              </a:cxn>
+              <a:cxn ang="0">
+                <a:pos x="connsiteX6" y="connsiteY6"/>
+              </a:cxn>
+              <a:cxn ang="0">
+                <a:pos x="connsiteX7" y="connsiteY7"/>
+              </a:cxn>
+              <a:cxn ang="0">
+                <a:pos x="connsiteX8" y="connsiteY8"/>
+              </a:cxn>
+              <a:cxn ang="0">
+                <a:pos x="connsiteX9" y="connsiteY9"/>
+              </a:cxn>
+            </a:cxnLst>
+            <a:rect l="l" t="t" r="r" b="b"/>
+            <a:pathLst>
+              <a:path w="9963150" h="6858000">
+                <a:moveTo>
+                  <a:pt x="1595771" y="0"/>
+                </a:moveTo>
+                <a:lnTo>
+                  <a:pt x="8367379" y="0"/>
+                </a:lnTo>
+                <a:lnTo>
+                  <a:pt x="8504080" y="130333"/>
+                </a:lnTo>
+                <a:cubicBezTo>
+                  <a:pt x="9405568" y="1031820"/>
+                  <a:pt x="9963150" y="2277214"/>
+                  <a:pt x="9963150" y="3652838"/>
+                </a:cubicBezTo>
+                <a:cubicBezTo>
+                  <a:pt x="9963150" y="4856509"/>
+                  <a:pt x="9536251" y="5960473"/>
+                  <a:pt x="8825600" y="6821583"/>
+                </a:cubicBezTo>
+                <a:lnTo>
+                  <a:pt x="8794055" y="6858000"/>
+                </a:lnTo>
+                <a:lnTo>
+                  <a:pt x="1169096" y="6858000"/>
+                </a:lnTo>
+                <a:lnTo>
+                  <a:pt x="1137550" y="6821583"/>
+                </a:lnTo>
+                <a:cubicBezTo>
+                  <a:pt x="426899" y="5960473"/>
+                  <a:pt x="0" y="4856509"/>
+                  <a:pt x="0" y="3652838"/>
+                </a:cubicBezTo>
+                <a:cubicBezTo>
+                  <a:pt x="0" y="2277214"/>
+                  <a:pt x="557582" y="1031820"/>
+                  <a:pt x="1459070" y="130333"/>
+                </a:cubicBezTo>
+                <a:close/>
+              </a:path>
+            </a:pathLst>
+          </a:custGeom>
+          <a:ln w="9525">
+            <a:noFill/>
+          </a:ln>
+          <a:effectLst/>
+        </p:spPr>
+        <p:style>
+          <a:lnRef idx="2">
+            <a:schemeClr val="accent1">
+              <a:shade val="50000"/>
+            </a:schemeClr>
+          </a:lnRef>
+          <a:fillRef idx="1">
+            <a:schemeClr val="accent1"/>
+          </a:fillRef>
+          <a:effectRef idx="0">
+            <a:schemeClr val="accent1"/>
+          </a:effectRef>
+          <a:fontRef idx="minor">
+            <a:schemeClr val="lt1"/>
+          </a:fontRef>
+        </p:style>
+        <p:txBody>
+          <a:bodyPr wrap="square" rtlCol="0" anchor="ctr">
+            <a:noAutofit/>
+          </a:bodyPr>
+          <a:lstStyle/>
+          <a:p>
+            <a:pPr marL="0" marR="0" lvl="0" indent="0" algn="ctr" defTabSz="914400" rtl="0" eaLnBrk="1" fontAlgn="auto" latinLnBrk="0" hangingPunct="1">
+              <a:lnSpc>
+                <a:spcPct val="100000"/>
+              </a:lnSpc>
+              <a:spcBef>
+                <a:spcPts val="0"/>
+              </a:spcBef>
+              <a:spcAft>
+                <a:spcPts val="0"/>
+              </a:spcAft>
+              <a:buClrTx/>
+              <a:buSzTx/>
+              <a:buFontTx/>
+              <a:buNone/>
+              <a:tabLst/>
+              <a:defRPr/>
+            </a:pPr>
+            <a:endParaRPr kumimoji="0" lang="en-US" sz="1800" b="0" i="0" u="none" strike="noStrike" kern="1200" cap="none" spc="0" normalizeH="0" baseline="0" noProof="0">
+              <a:ln>
+                <a:noFill/>
+              </a:ln>
+              <a:solidFill>
+                <a:prstClr val="white"/>
+              </a:solidFill>
+              <a:effectLst/>
+              <a:uLnTx/>
+              <a:uFillTx/>
+              <a:latin typeface="Calibri" panose="020F0502020204030204"/>
+              <a:ea typeface="+mn-ea"/>
+              <a:cs typeface="+mn-cs"/>
+            </a:endParaRPr>
+          </a:p>
+        </p:txBody>
+      </p:sp>
       <p:sp>
         <p:nvSpPr>
           <p:cNvPr id="2" name="Title 1">
@@ -2999,16 +3460,23 @@
             <p:ph type="ctrTitle"/>
           </p:nvPr>
         </p:nvSpPr>
-        <p:spPr/>
+        <p:spPr>
+          <a:xfrm>
+            <a:off x="1524003" y="1999615"/>
+            <a:ext cx="9144000" cy="2764028"/>
+          </a:xfrm>
+        </p:spPr>
         <p:txBody>
-          <a:bodyPr/>
+          <a:bodyPr anchor="ctr">
+            <a:normAutofit/>
+          </a:bodyPr>
           <a:lstStyle/>
           <a:p>
             <a:r>
-              <a:rPr lang="en-US" dirty="0"/>
+              <a:rPr lang="en-US" sz="7200"/>
               <a:t>Fault Tolerance</a:t>
             </a:r>
-            <a:endParaRPr lang="tr-TR" dirty="0"/>
+            <a:endParaRPr lang="tr-TR" sz="7200"/>
           </a:p>
         </p:txBody>
       </p:sp>
@@ -3028,12 +3496,111 @@
             <p:ph type="subTitle" idx="1"/>
           </p:nvPr>
         </p:nvSpPr>
-        <p:spPr/>
+        <p:spPr>
+          <a:xfrm>
+            <a:off x="1966912" y="5645150"/>
+            <a:ext cx="8258176" cy="631825"/>
+          </a:xfrm>
+        </p:spPr>
         <p:txBody>
-          <a:bodyPr/>
+          <a:bodyPr anchor="ctr">
+            <a:normAutofit/>
+          </a:bodyPr>
           <a:lstStyle/>
           <a:p>
-            <a:endParaRPr lang="tr-TR"/>
+            <a:endParaRPr lang="tr-TR" sz="2800"/>
+          </a:p>
+        </p:txBody>
+      </p:sp>
+      <p:sp>
+        <p:nvSpPr>
+          <p:cNvPr id="14" name="Rectangle 13">
+            <a:extLst>
+              <a:ext uri="{FF2B5EF4-FFF2-40B4-BE49-F238E27FC236}">
+                <a16:creationId xmlns:a16="http://schemas.microsoft.com/office/drawing/2014/main" id="{3629484E-3792-4B3D-89AD-7C8A1ED0E0D4}"/>
+              </a:ext>
+              <a:ext uri="{C183D7F6-B498-43B3-948B-1728B52AA6E4}">
+                <adec:decorative xmlns:adec="http://schemas.microsoft.com/office/drawing/2017/decorative" val="1"/>
+              </a:ext>
+            </a:extLst>
+          </p:cNvPr>
+          <p:cNvSpPr>
+            <a:spLocks noGrp="1" noRot="1" noChangeAspect="1" noMove="1" noResize="1" noEditPoints="1" noAdjustHandles="1" noChangeArrowheads="1" noChangeShapeType="1" noTextEdit="1"/>
+          </p:cNvSpPr>
+          <p:nvPr>
+            <p:extLst>
+              <p:ext uri="{386F3935-93C4-4BCD-93E2-E3B085C9AB24}">
+                <p16:designElem xmlns:p16="http://schemas.microsoft.com/office/powerpoint/2015/main" val="1"/>
+              </p:ext>
+            </p:extLst>
+          </p:nvPr>
+        </p:nvSpPr>
+        <p:spPr>
+          <a:xfrm>
+            <a:off x="3718560" y="5524786"/>
+            <a:ext cx="4754880" cy="27432"/>
+          </a:xfrm>
+          <a:prstGeom prst="rect">
+            <a:avLst/>
+          </a:prstGeom>
+          <a:solidFill>
+            <a:schemeClr val="accent2"/>
+          </a:solidFill>
+          <a:ln>
+            <a:noFill/>
+          </a:ln>
+        </p:spPr>
+        <p:style>
+          <a:lnRef idx="2">
+            <a:schemeClr val="accent1">
+              <a:shade val="50000"/>
+            </a:schemeClr>
+          </a:lnRef>
+          <a:fillRef idx="1">
+            <a:schemeClr val="accent1"/>
+          </a:fillRef>
+          <a:effectRef idx="0">
+            <a:schemeClr val="accent1"/>
+          </a:effectRef>
+          <a:fontRef idx="minor">
+            <a:schemeClr val="lt1"/>
+          </a:fontRef>
+        </p:style>
+        <p:txBody>
+          <a:bodyPr rtlCol="0" anchor="ctr"/>
+          <a:lstStyle/>
+          <a:p>
+            <a:pPr marL="0" marR="0" lvl="0" indent="0" algn="ctr" defTabSz="914400" rtl="0" eaLnBrk="1" fontAlgn="auto" latinLnBrk="0" hangingPunct="1">
+              <a:lnSpc>
+                <a:spcPct val="100000"/>
+              </a:lnSpc>
+              <a:spcBef>
+                <a:spcPts val="0"/>
+              </a:spcBef>
+              <a:spcAft>
+                <a:spcPts val="0"/>
+              </a:spcAft>
+              <a:buClrTx/>
+              <a:buSzTx/>
+              <a:buFontTx/>
+              <a:buNone/>
+              <a:tabLst/>
+              <a:defRPr/>
+            </a:pPr>
+            <a:endParaRPr kumimoji="0" lang="en-US" sz="1800" b="0" i="0" u="none" strike="noStrike" kern="1200" cap="none" spc="0" normalizeH="0" baseline="0" noProof="0">
+              <a:ln>
+                <a:noFill/>
+              </a:ln>
+              <a:solidFill>
+                <a:prstClr val="white"/>
+              </a:solidFill>
+              <a:effectLst/>
+              <a:uLnTx/>
+              <a:uFillTx/>
+              <a:latin typeface="Calibri" panose="020F0502020204030204"/>
+              <a:ea typeface="+mn-ea"/>
+              <a:cs typeface="+mn-cs"/>
+            </a:endParaRPr>
           </a:p>
         </p:txBody>
       </p:sp>
@@ -3117,7 +3684,7 @@
           <a:bodyPr/>
           <a:lstStyle/>
           <a:p>
-            <a:endParaRPr lang="tr-TR"/>
+            <a:endParaRPr lang="tr-TR" dirty="0"/>
           </a:p>
         </p:txBody>
       </p:sp>
@@ -3135,6 +3702,642 @@
 </file>
 
 <file path=ppt/slides/slide11.xml><?xml version="1.0" encoding="utf-8"?>
+<p:sld xmlns:a="http://schemas.openxmlformats.org/drawingml/2006/main" xmlns:r="http://schemas.openxmlformats.org/officeDocument/2006/relationships" xmlns:p="http://schemas.openxmlformats.org/presentationml/2006/main">
+  <p:cSld>
+    <p:bg>
+      <p:bgPr>
+        <a:solidFill>
+          <a:schemeClr val="bg1"/>
+        </a:solidFill>
+        <a:effectLst/>
+      </p:bgPr>
+    </p:bg>
+    <p:spTree>
+      <p:nvGrpSpPr>
+        <p:cNvPr id="1" name=""/>
+        <p:cNvGrpSpPr/>
+        <p:nvPr/>
+      </p:nvGrpSpPr>
+      <p:grpSpPr>
+        <a:xfrm>
+          <a:off x="0" y="0"/>
+          <a:ext cx="0" cy="0"/>
+          <a:chOff x="0" y="0"/>
+          <a:chExt cx="0" cy="0"/>
+        </a:xfrm>
+      </p:grpSpPr>
+      <p:sp useBgFill="1">
+        <p:nvSpPr>
+          <p:cNvPr id="9" name="Rectangle 8">
+            <a:extLst>
+              <a:ext uri="{FF2B5EF4-FFF2-40B4-BE49-F238E27FC236}">
+                <a16:creationId xmlns:a16="http://schemas.microsoft.com/office/drawing/2014/main" id="{6F5A5072-7B47-4D32-B52A-4EBBF590B8A5}"/>
+              </a:ext>
+              <a:ext uri="{C183D7F6-B498-43B3-948B-1728B52AA6E4}">
+                <adec:decorative xmlns:adec="http://schemas.microsoft.com/office/drawing/2017/decorative" val="1"/>
+              </a:ext>
+            </a:extLst>
+          </p:cNvPr>
+          <p:cNvSpPr>
+            <a:spLocks noGrp="1" noRot="1" noChangeAspect="1" noMove="1" noResize="1" noEditPoints="1" noAdjustHandles="1" noChangeArrowheads="1" noChangeShapeType="1" noTextEdit="1"/>
+          </p:cNvSpPr>
+          <p:nvPr>
+            <p:extLst>
+              <p:ext uri="{386F3935-93C4-4BCD-93E2-E3B085C9AB24}">
+                <p16:designElem xmlns:p16="http://schemas.microsoft.com/office/powerpoint/2015/main" val="1"/>
+              </p:ext>
+            </p:extLst>
+          </p:nvPr>
+        </p:nvSpPr>
+        <p:spPr>
+          <a:xfrm>
+            <a:off x="0" y="0"/>
+            <a:ext cx="12192000" cy="6858000"/>
+          </a:xfrm>
+          <a:prstGeom prst="rect">
+            <a:avLst/>
+          </a:prstGeom>
+          <a:ln w="12700" cap="flat" cmpd="sng" algn="ctr">
+            <a:noFill/>
+            <a:prstDash val="solid"/>
+            <a:miter lim="800000"/>
+          </a:ln>
+          <a:effectLst/>
+          <a:extLst>
+            <a:ext uri="{91240B29-F687-4F45-9708-019B960494DF}">
+              <a14:hiddenLine xmlns:a14="http://schemas.microsoft.com/office/drawing/2010/main" w="12700" cap="flat" cmpd="sng" algn="ctr">
+                <a:solidFill>
+                  <a:schemeClr val="accent1">
+                    <a:shade val="50000"/>
+                  </a:schemeClr>
+                </a:solidFill>
+                <a:prstDash val="solid"/>
+                <a:miter lim="800000"/>
+              </a14:hiddenLine>
+            </a:ext>
+          </a:extLst>
+        </p:spPr>
+        <p:style>
+          <a:lnRef idx="2">
+            <a:schemeClr val="accent1">
+              <a:shade val="50000"/>
+            </a:schemeClr>
+          </a:lnRef>
+          <a:fillRef idx="1">
+            <a:schemeClr val="accent1"/>
+          </a:fillRef>
+          <a:effectRef idx="0">
+            <a:schemeClr val="accent1"/>
+          </a:effectRef>
+          <a:fontRef idx="minor">
+            <a:schemeClr val="lt1"/>
+          </a:fontRef>
+        </p:style>
+        <p:txBody>
+          <a:bodyPr rtlCol="0" anchor="ctr"/>
+          <a:lstStyle/>
+          <a:p>
+            <a:pPr algn="ctr"/>
+            <a:endParaRPr lang="en-US"/>
+          </a:p>
+        </p:txBody>
+      </p:sp>
+      <p:sp>
+        <p:nvSpPr>
+          <p:cNvPr id="11" name="Rectangle 10">
+            <a:extLst>
+              <a:ext uri="{FF2B5EF4-FFF2-40B4-BE49-F238E27FC236}">
+                <a16:creationId xmlns:a16="http://schemas.microsoft.com/office/drawing/2014/main" id="{9715DAF0-AE1B-46C9-8A6B-DB2AA05AB91D}"/>
+              </a:ext>
+              <a:ext uri="{C183D7F6-B498-43B3-948B-1728B52AA6E4}">
+                <adec:decorative xmlns:adec="http://schemas.microsoft.com/office/drawing/2017/decorative" val="1"/>
+              </a:ext>
+            </a:extLst>
+          </p:cNvPr>
+          <p:cNvSpPr>
+            <a:spLocks noGrp="1" noRot="1" noChangeAspect="1" noMove="1" noResize="1" noEditPoints="1" noAdjustHandles="1" noChangeArrowheads="1" noChangeShapeType="1" noTextEdit="1"/>
+          </p:cNvSpPr>
+          <p:nvPr>
+            <p:extLst>
+              <p:ext uri="{386F3935-93C4-4BCD-93E2-E3B085C9AB24}">
+                <p16:designElem xmlns:p16="http://schemas.microsoft.com/office/powerpoint/2015/main" val="1"/>
+              </p:ext>
+            </p:extLst>
+          </p:nvPr>
+        </p:nvSpPr>
+        <p:spPr>
+          <a:xfrm rot="10800000">
+            <a:off x="-2" y="-22693"/>
+            <a:ext cx="12191999" cy="4374129"/>
+          </a:xfrm>
+          <a:prstGeom prst="rect">
+            <a:avLst/>
+          </a:prstGeom>
+          <a:gradFill>
+            <a:gsLst>
+              <a:gs pos="0">
+                <a:schemeClr val="accent1">
+                  <a:lumMod val="75000"/>
+                </a:schemeClr>
+              </a:gs>
+              <a:gs pos="100000">
+                <a:srgbClr val="000000"/>
+              </a:gs>
+            </a:gsLst>
+            <a:lin ang="15000000" scaled="0"/>
+          </a:gradFill>
+          <a:ln>
+            <a:noFill/>
+          </a:ln>
+        </p:spPr>
+        <p:style>
+          <a:lnRef idx="2">
+            <a:schemeClr val="accent1">
+              <a:shade val="50000"/>
+            </a:schemeClr>
+          </a:lnRef>
+          <a:fillRef idx="1">
+            <a:schemeClr val="accent1"/>
+          </a:fillRef>
+          <a:effectRef idx="0">
+            <a:schemeClr val="accent1"/>
+          </a:effectRef>
+          <a:fontRef idx="minor">
+            <a:schemeClr val="lt1"/>
+          </a:fontRef>
+        </p:style>
+        <p:txBody>
+          <a:bodyPr rtlCol="0" anchor="ctr"/>
+          <a:lstStyle/>
+          <a:p>
+            <a:pPr algn="ctr"/>
+            <a:endParaRPr lang="en-US"/>
+          </a:p>
+        </p:txBody>
+      </p:sp>
+      <p:sp>
+        <p:nvSpPr>
+          <p:cNvPr id="13" name="Rectangle 12">
+            <a:extLst>
+              <a:ext uri="{FF2B5EF4-FFF2-40B4-BE49-F238E27FC236}">
+                <a16:creationId xmlns:a16="http://schemas.microsoft.com/office/drawing/2014/main" id="{6016219D-510E-4184-9090-6D5578A87BD1}"/>
+              </a:ext>
+              <a:ext uri="{C183D7F6-B498-43B3-948B-1728B52AA6E4}">
+                <adec:decorative xmlns:adec="http://schemas.microsoft.com/office/drawing/2017/decorative" val="1"/>
+              </a:ext>
+            </a:extLst>
+          </p:cNvPr>
+          <p:cNvSpPr>
+            <a:spLocks noGrp="1" noRot="1" noChangeAspect="1" noMove="1" noResize="1" noEditPoints="1" noAdjustHandles="1" noChangeArrowheads="1" noChangeShapeType="1" noTextEdit="1"/>
+          </p:cNvSpPr>
+          <p:nvPr>
+            <p:extLst>
+              <p:ext uri="{386F3935-93C4-4BCD-93E2-E3B085C9AB24}">
+                <p16:designElem xmlns:p16="http://schemas.microsoft.com/office/powerpoint/2015/main" val="1"/>
+              </p:ext>
+            </p:extLst>
+          </p:nvPr>
+        </p:nvSpPr>
+        <p:spPr>
+          <a:xfrm rot="5400000">
+            <a:off x="3908719" y="-3931841"/>
+            <a:ext cx="4374557" cy="12192000"/>
+          </a:xfrm>
+          <a:prstGeom prst="rect">
+            <a:avLst/>
+          </a:prstGeom>
+          <a:gradFill>
+            <a:gsLst>
+              <a:gs pos="40000">
+                <a:schemeClr val="accent1">
+                  <a:alpha val="0"/>
+                </a:schemeClr>
+              </a:gs>
+              <a:gs pos="100000">
+                <a:schemeClr val="accent1">
+                  <a:lumMod val="75000"/>
+                  <a:alpha val="52000"/>
+                </a:schemeClr>
+              </a:gs>
+            </a:gsLst>
+            <a:lin ang="2400000" scaled="0"/>
+          </a:gradFill>
+          <a:ln>
+            <a:noFill/>
+          </a:ln>
+        </p:spPr>
+        <p:style>
+          <a:lnRef idx="2">
+            <a:schemeClr val="accent1">
+              <a:shade val="50000"/>
+            </a:schemeClr>
+          </a:lnRef>
+          <a:fillRef idx="1">
+            <a:schemeClr val="accent1"/>
+          </a:fillRef>
+          <a:effectRef idx="0">
+            <a:schemeClr val="accent1"/>
+          </a:effectRef>
+          <a:fontRef idx="minor">
+            <a:schemeClr val="lt1"/>
+          </a:fontRef>
+        </p:style>
+        <p:txBody>
+          <a:bodyPr rtlCol="0" anchor="ctr"/>
+          <a:lstStyle/>
+          <a:p>
+            <a:pPr algn="ctr"/>
+            <a:endParaRPr lang="en-US"/>
+          </a:p>
+        </p:txBody>
+      </p:sp>
+      <p:sp>
+        <p:nvSpPr>
+          <p:cNvPr id="15" name="Rectangle 14">
+            <a:extLst>
+              <a:ext uri="{FF2B5EF4-FFF2-40B4-BE49-F238E27FC236}">
+                <a16:creationId xmlns:a16="http://schemas.microsoft.com/office/drawing/2014/main" id="{AFF4A713-7B75-4B21-90D7-5AB19547C728}"/>
+              </a:ext>
+              <a:ext uri="{C183D7F6-B498-43B3-948B-1728B52AA6E4}">
+                <adec:decorative xmlns:adec="http://schemas.microsoft.com/office/drawing/2017/decorative" val="1"/>
+              </a:ext>
+            </a:extLst>
+          </p:cNvPr>
+          <p:cNvSpPr>
+            <a:spLocks noGrp="1" noRot="1" noChangeAspect="1" noMove="1" noResize="1" noEditPoints="1" noAdjustHandles="1" noChangeArrowheads="1" noChangeShapeType="1" noTextEdit="1"/>
+          </p:cNvSpPr>
+          <p:nvPr>
+            <p:extLst>
+              <p:ext uri="{386F3935-93C4-4BCD-93E2-E3B085C9AB24}">
+                <p16:designElem xmlns:p16="http://schemas.microsoft.com/office/powerpoint/2015/main" val="1"/>
+              </p:ext>
+            </p:extLst>
+          </p:nvPr>
+        </p:nvSpPr>
+        <p:spPr>
+          <a:xfrm rot="5400000">
+            <a:off x="4136696" y="-3703868"/>
+            <a:ext cx="4374128" cy="11736479"/>
+          </a:xfrm>
+          <a:prstGeom prst="rect">
+            <a:avLst/>
+          </a:prstGeom>
+          <a:gradFill>
+            <a:gsLst>
+              <a:gs pos="17000">
+                <a:schemeClr val="accent1">
+                  <a:alpha val="0"/>
+                </a:schemeClr>
+              </a:gs>
+              <a:gs pos="100000">
+                <a:srgbClr val="000000">
+                  <a:alpha val="37000"/>
+                </a:srgbClr>
+              </a:gs>
+            </a:gsLst>
+            <a:lin ang="7800000" scaled="0"/>
+          </a:gradFill>
+          <a:ln>
+            <a:noFill/>
+          </a:ln>
+        </p:spPr>
+        <p:style>
+          <a:lnRef idx="2">
+            <a:schemeClr val="accent1">
+              <a:shade val="50000"/>
+            </a:schemeClr>
+          </a:lnRef>
+          <a:fillRef idx="1">
+            <a:schemeClr val="accent1"/>
+          </a:fillRef>
+          <a:effectRef idx="0">
+            <a:schemeClr val="accent1"/>
+          </a:effectRef>
+          <a:fontRef idx="minor">
+            <a:schemeClr val="lt1"/>
+          </a:fontRef>
+        </p:style>
+        <p:txBody>
+          <a:bodyPr rtlCol="0" anchor="ctr"/>
+          <a:lstStyle/>
+          <a:p>
+            <a:pPr algn="ctr"/>
+            <a:endParaRPr lang="en-US"/>
+          </a:p>
+        </p:txBody>
+      </p:sp>
+      <p:sp>
+        <p:nvSpPr>
+          <p:cNvPr id="17" name="Rectangle 16">
+            <a:extLst>
+              <a:ext uri="{FF2B5EF4-FFF2-40B4-BE49-F238E27FC236}">
+                <a16:creationId xmlns:a16="http://schemas.microsoft.com/office/drawing/2014/main" id="{DC631C0B-6DA6-4E57-8231-CE32B3434A7E}"/>
+              </a:ext>
+              <a:ext uri="{C183D7F6-B498-43B3-948B-1728B52AA6E4}">
+                <adec:decorative xmlns:adec="http://schemas.microsoft.com/office/drawing/2017/decorative" val="1"/>
+              </a:ext>
+            </a:extLst>
+          </p:cNvPr>
+          <p:cNvSpPr>
+            <a:spLocks noGrp="1" noRot="1" noChangeAspect="1" noMove="1" noResize="1" noEditPoints="1" noAdjustHandles="1" noChangeArrowheads="1" noChangeShapeType="1" noTextEdit="1"/>
+          </p:cNvSpPr>
+          <p:nvPr>
+            <p:extLst>
+              <p:ext uri="{386F3935-93C4-4BCD-93E2-E3B085C9AB24}">
+                <p16:designElem xmlns:p16="http://schemas.microsoft.com/office/powerpoint/2015/main" val="1"/>
+              </p:ext>
+            </p:extLst>
+          </p:nvPr>
+        </p:nvSpPr>
+        <p:spPr>
+          <a:xfrm>
+            <a:off x="-5" y="-22690"/>
+            <a:ext cx="8542485" cy="4374126"/>
+          </a:xfrm>
+          <a:prstGeom prst="rect">
+            <a:avLst/>
+          </a:prstGeom>
+          <a:gradFill>
+            <a:gsLst>
+              <a:gs pos="0">
+                <a:schemeClr val="accent1">
+                  <a:lumMod val="50000"/>
+                  <a:alpha val="0"/>
+                </a:schemeClr>
+              </a:gs>
+              <a:gs pos="100000">
+                <a:srgbClr val="000000">
+                  <a:alpha val="25000"/>
+                </a:srgbClr>
+              </a:gs>
+            </a:gsLst>
+            <a:lin ang="18600000" scaled="0"/>
+          </a:gradFill>
+          <a:ln>
+            <a:noFill/>
+          </a:ln>
+        </p:spPr>
+        <p:style>
+          <a:lnRef idx="2">
+            <a:schemeClr val="accent1">
+              <a:shade val="50000"/>
+            </a:schemeClr>
+          </a:lnRef>
+          <a:fillRef idx="1">
+            <a:schemeClr val="accent1"/>
+          </a:fillRef>
+          <a:effectRef idx="0">
+            <a:schemeClr val="accent1"/>
+          </a:effectRef>
+          <a:fontRef idx="minor">
+            <a:schemeClr val="lt1"/>
+          </a:fontRef>
+        </p:style>
+        <p:txBody>
+          <a:bodyPr rtlCol="0" anchor="ctr"/>
+          <a:lstStyle/>
+          <a:p>
+            <a:pPr algn="ctr"/>
+            <a:endParaRPr lang="en-US"/>
+          </a:p>
+        </p:txBody>
+      </p:sp>
+      <p:sp>
+        <p:nvSpPr>
+          <p:cNvPr id="19" name="Freeform: Shape 18">
+            <a:extLst>
+              <a:ext uri="{FF2B5EF4-FFF2-40B4-BE49-F238E27FC236}">
+                <a16:creationId xmlns:a16="http://schemas.microsoft.com/office/drawing/2014/main" id="{C29501E6-A978-4A61-9689-9085AF97A53A}"/>
+              </a:ext>
+              <a:ext uri="{C183D7F6-B498-43B3-948B-1728B52AA6E4}">
+                <adec:decorative xmlns:adec="http://schemas.microsoft.com/office/drawing/2017/decorative" val="1"/>
+              </a:ext>
+            </a:extLst>
+          </p:cNvPr>
+          <p:cNvSpPr>
+            <a:spLocks noGrp="1" noRot="1" noChangeAspect="1" noMove="1" noResize="1" noEditPoints="1" noAdjustHandles="1" noChangeArrowheads="1" noChangeShapeType="1" noTextEdit="1"/>
+          </p:cNvSpPr>
+          <p:nvPr>
+            <p:extLst>
+              <p:ext uri="{386F3935-93C4-4BCD-93E2-E3B085C9AB24}">
+                <p16:designElem xmlns:p16="http://schemas.microsoft.com/office/powerpoint/2015/main" val="1"/>
+              </p:ext>
+            </p:extLst>
+          </p:nvPr>
+        </p:nvSpPr>
+        <p:spPr>
+          <a:xfrm rot="12508972">
+            <a:off x="5945431" y="-1032053"/>
+            <a:ext cx="4990147" cy="4439131"/>
+          </a:xfrm>
+          <a:custGeom>
+            <a:avLst/>
+            <a:gdLst>
+              <a:gd name="connsiteX0" fmla="*/ 4990147 w 4990147"/>
+              <a:gd name="connsiteY0" fmla="*/ 2229378 h 4439131"/>
+              <a:gd name="connsiteX1" fmla="*/ 917384 w 4990147"/>
+              <a:gd name="connsiteY1" fmla="*/ 4439131 h 4439131"/>
+              <a:gd name="connsiteX2" fmla="*/ 910814 w 4990147"/>
+              <a:gd name="connsiteY2" fmla="*/ 4434219 h 4439131"/>
+              <a:gd name="connsiteX3" fmla="*/ 0 w 4990147"/>
+              <a:gd name="connsiteY3" fmla="*/ 2502877 h 4439131"/>
+              <a:gd name="connsiteX4" fmla="*/ 2502877 w 4990147"/>
+              <a:gd name="connsiteY4" fmla="*/ 0 h 4439131"/>
+              <a:gd name="connsiteX5" fmla="*/ 4954904 w 4990147"/>
+              <a:gd name="connsiteY5" fmla="*/ 1998460 h 4439131"/>
+            </a:gdLst>
+            <a:ahLst/>
+            <a:cxnLst>
+              <a:cxn ang="0">
+                <a:pos x="connsiteX0" y="connsiteY0"/>
+              </a:cxn>
+              <a:cxn ang="0">
+                <a:pos x="connsiteX1" y="connsiteY1"/>
+              </a:cxn>
+              <a:cxn ang="0">
+                <a:pos x="connsiteX2" y="connsiteY2"/>
+              </a:cxn>
+              <a:cxn ang="0">
+                <a:pos x="connsiteX3" y="connsiteY3"/>
+              </a:cxn>
+              <a:cxn ang="0">
+                <a:pos x="connsiteX4" y="connsiteY4"/>
+              </a:cxn>
+              <a:cxn ang="0">
+                <a:pos x="connsiteX5" y="connsiteY5"/>
+              </a:cxn>
+            </a:cxnLst>
+            <a:rect l="l" t="t" r="r" b="b"/>
+            <a:pathLst>
+              <a:path w="4990147" h="4439131">
+                <a:moveTo>
+                  <a:pt x="4990147" y="2229378"/>
+                </a:moveTo>
+                <a:lnTo>
+                  <a:pt x="917384" y="4439131"/>
+                </a:lnTo>
+                <a:lnTo>
+                  <a:pt x="910814" y="4434219"/>
+                </a:lnTo>
+                <a:cubicBezTo>
+                  <a:pt x="354557" y="3975154"/>
+                  <a:pt x="0" y="3280421"/>
+                  <a:pt x="0" y="2502877"/>
+                </a:cubicBezTo>
+                <a:cubicBezTo>
+                  <a:pt x="0" y="1120576"/>
+                  <a:pt x="1120576" y="0"/>
+                  <a:pt x="2502877" y="0"/>
+                </a:cubicBezTo>
+                <a:cubicBezTo>
+                  <a:pt x="3712390" y="0"/>
+                  <a:pt x="4721520" y="857941"/>
+                  <a:pt x="4954904" y="1998460"/>
+                </a:cubicBezTo>
+                <a:close/>
+              </a:path>
+            </a:pathLst>
+          </a:custGeom>
+          <a:gradFill>
+            <a:gsLst>
+              <a:gs pos="0">
+                <a:schemeClr val="accent1">
+                  <a:alpha val="22000"/>
+                </a:schemeClr>
+              </a:gs>
+              <a:gs pos="87000">
+                <a:schemeClr val="accent1">
+                  <a:lumMod val="60000"/>
+                  <a:lumOff val="40000"/>
+                  <a:alpha val="2000"/>
+                </a:schemeClr>
+              </a:gs>
+            </a:gsLst>
+            <a:lin ang="8400000" scaled="0"/>
+          </a:gradFill>
+          <a:ln>
+            <a:noFill/>
+          </a:ln>
+        </p:spPr>
+        <p:style>
+          <a:lnRef idx="2">
+            <a:schemeClr val="accent1">
+              <a:shade val="50000"/>
+            </a:schemeClr>
+          </a:lnRef>
+          <a:fillRef idx="1">
+            <a:schemeClr val="accent1"/>
+          </a:fillRef>
+          <a:effectRef idx="0">
+            <a:schemeClr val="accent1"/>
+          </a:effectRef>
+          <a:fontRef idx="minor">
+            <a:schemeClr val="lt1"/>
+          </a:fontRef>
+        </p:style>
+        <p:txBody>
+          <a:bodyPr wrap="square" rtlCol="0" anchor="ctr">
+            <a:noAutofit/>
+          </a:bodyPr>
+          <a:lstStyle/>
+          <a:p>
+            <a:pPr algn="ctr"/>
+            <a:endParaRPr lang="en-US" dirty="0"/>
+          </a:p>
+        </p:txBody>
+      </p:sp>
+      <p:sp>
+        <p:nvSpPr>
+          <p:cNvPr id="2" name="Title 1">
+            <a:extLst>
+              <a:ext uri="{FF2B5EF4-FFF2-40B4-BE49-F238E27FC236}">
+                <a16:creationId xmlns:a16="http://schemas.microsoft.com/office/drawing/2014/main" id="{CF822F60-E324-83A2-0B65-975CCCE1FDE2}"/>
+              </a:ext>
+            </a:extLst>
+          </p:cNvPr>
+          <p:cNvSpPr>
+            <a:spLocks noGrp="1"/>
+          </p:cNvSpPr>
+          <p:nvPr>
+            <p:ph type="ctrTitle"/>
+          </p:nvPr>
+        </p:nvSpPr>
+        <p:spPr>
+          <a:xfrm>
+            <a:off x="1314824" y="735106"/>
+            <a:ext cx="10053763" cy="2928470"/>
+          </a:xfrm>
+        </p:spPr>
+        <p:txBody>
+          <a:bodyPr anchor="b">
+            <a:normAutofit/>
+          </a:bodyPr>
+          <a:lstStyle/>
+          <a:p>
+            <a:pPr algn="l"/>
+            <a:r>
+              <a:rPr lang="en-US" sz="4800" dirty="0">
+                <a:solidFill>
+                  <a:srgbClr val="FFFFFF"/>
+                </a:solidFill>
+              </a:rPr>
+              <a:t>Diagnosis and Tolerant Strategy of T-Type 3Level Inverters</a:t>
+            </a:r>
+            <a:endParaRPr lang="tr-TR" sz="4800" dirty="0">
+              <a:solidFill>
+                <a:srgbClr val="FFFFFF"/>
+              </a:solidFill>
+            </a:endParaRPr>
+          </a:p>
+        </p:txBody>
+      </p:sp>
+      <p:sp>
+        <p:nvSpPr>
+          <p:cNvPr id="4" name="Subtitle 3">
+            <a:extLst>
+              <a:ext uri="{FF2B5EF4-FFF2-40B4-BE49-F238E27FC236}">
+                <a16:creationId xmlns:a16="http://schemas.microsoft.com/office/drawing/2014/main" id="{C6DEBAA7-B24B-5E9C-BFD9-2F3660180599}"/>
+              </a:ext>
+            </a:extLst>
+          </p:cNvPr>
+          <p:cNvSpPr>
+            <a:spLocks noGrp="1"/>
+          </p:cNvSpPr>
+          <p:nvPr>
+            <p:ph type="subTitle" idx="1"/>
+          </p:nvPr>
+        </p:nvSpPr>
+        <p:spPr>
+          <a:xfrm>
+            <a:off x="1350682" y="4870824"/>
+            <a:ext cx="10005951" cy="1458258"/>
+          </a:xfrm>
+        </p:spPr>
+        <p:txBody>
+          <a:bodyPr anchor="ctr">
+            <a:normAutofit/>
+          </a:bodyPr>
+          <a:lstStyle/>
+          <a:p>
+            <a:pPr algn="l"/>
+            <a:endParaRPr lang="tr-TR"/>
+          </a:p>
+        </p:txBody>
+      </p:sp>
+    </p:spTree>
+    <p:extLst>
+      <p:ext uri="{BB962C8B-B14F-4D97-AF65-F5344CB8AC3E}">
+        <p14:creationId xmlns:p14="http://schemas.microsoft.com/office/powerpoint/2010/main" val="2299652320"/>
+      </p:ext>
+    </p:extLst>
+  </p:cSld>
+  <p:clrMapOvr>
+    <a:masterClrMapping/>
+  </p:clrMapOvr>
+</p:sld>
+</file>
+
+<file path=ppt/slides/slide12.xml><?xml version="1.0" encoding="utf-8"?>
 <p:sld xmlns:a="http://schemas.openxmlformats.org/drawingml/2006/main" xmlns:r="http://schemas.openxmlformats.org/officeDocument/2006/relationships" xmlns:p="http://schemas.openxmlformats.org/presentationml/2006/main">
   <p:cSld>
     <p:bg>
@@ -3295,6 +4498,84 @@
             </a:r>
           </a:p>
           <a:p>
+            <a:pPr marL="342900" indent="-342900" algn="just">
+              <a:buFont typeface="Arial" panose="020B0604020202020204" pitchFamily="34" charset="0"/>
+              <a:buChar char="•"/>
+            </a:pPr>
+            <a:endParaRPr lang="en-US" sz="2000" dirty="0">
+              <a:latin typeface="Times-Roman"/>
+            </a:endParaRPr>
+          </a:p>
+          <a:p>
+            <a:pPr marL="342900" indent="-342900" algn="just">
+              <a:buFont typeface="Arial" panose="020B0604020202020204" pitchFamily="34" charset="0"/>
+              <a:buChar char="•"/>
+            </a:pPr>
+            <a:r>
+              <a:rPr lang="en-US" sz="2000" b="1" u="sng" dirty="0">
+                <a:latin typeface="Times-Roman"/>
+              </a:rPr>
+              <a:t>T-Type Inverter: </a:t>
+            </a:r>
+            <a:r>
+              <a:rPr lang="en-US" sz="2000" dirty="0">
+                <a:latin typeface="Times-Roman"/>
+              </a:rPr>
+              <a:t>Half bridge switches block the full DC-link voltage.</a:t>
+            </a:r>
+          </a:p>
+          <a:p>
+            <a:pPr marL="342900" indent="-342900" algn="just">
+              <a:buFont typeface="Arial" panose="020B0604020202020204" pitchFamily="34" charset="0"/>
+              <a:buChar char="•"/>
+            </a:pPr>
+            <a:endParaRPr lang="en-US" sz="2000" dirty="0">
+              <a:latin typeface="Times-Roman"/>
+            </a:endParaRPr>
+          </a:p>
+          <a:p>
+            <a:pPr marL="342900" indent="-342900" algn="just">
+              <a:buFont typeface="Arial" panose="020B0604020202020204" pitchFamily="34" charset="0"/>
+              <a:buChar char="•"/>
+            </a:pPr>
+            <a:r>
+              <a:rPr lang="en-US" sz="2000" dirty="0">
+                <a:latin typeface="Times-Roman"/>
+              </a:rPr>
+              <a:t>Switches between NP and each output block half of DC-link voltage.</a:t>
+            </a:r>
+          </a:p>
+          <a:p>
+            <a:pPr marL="342900" indent="-342900" algn="just">
+              <a:buFont typeface="Arial" panose="020B0604020202020204" pitchFamily="34" charset="0"/>
+              <a:buChar char="•"/>
+            </a:pPr>
+            <a:endParaRPr lang="en-US" sz="2000" dirty="0">
+              <a:latin typeface="Times-Roman"/>
+            </a:endParaRPr>
+          </a:p>
+          <a:p>
+            <a:pPr marL="342900" indent="-342900" algn="just">
+              <a:buFont typeface="Arial" panose="020B0604020202020204" pitchFamily="34" charset="0"/>
+              <a:buChar char="•"/>
+            </a:pPr>
+            <a:r>
+              <a:rPr lang="en-US" sz="2000" dirty="0">
+                <a:latin typeface="Times-Roman"/>
+              </a:rPr>
+              <a:t>Conduction losses are less than NPC Inverters (2 switches for Vdc in NPC, 1 switch </a:t>
+            </a:r>
+            <a:r>
+              <a:rPr lang="en-US" sz="2000">
+                <a:latin typeface="Times-Roman"/>
+              </a:rPr>
+              <a:t>in T-Type.)</a:t>
+            </a:r>
+            <a:endParaRPr lang="en-US" sz="2000" dirty="0">
+              <a:latin typeface="Times-Roman"/>
+            </a:endParaRPr>
+          </a:p>
+          <a:p>
             <a:pPr marL="342900" indent="-342900" algn="l">
               <a:buFont typeface="Arial" panose="020B0604020202020204" pitchFamily="34" charset="0"/>
               <a:buChar char="•"/>
@@ -3395,6 +4676,90 @@
     <p:extLst>
       <p:ext uri="{BB962C8B-B14F-4D97-AF65-F5344CB8AC3E}">
         <p14:creationId xmlns:p14="http://schemas.microsoft.com/office/powerpoint/2010/main" val="210411962"/>
+      </p:ext>
+    </p:extLst>
+  </p:cSld>
+  <p:clrMapOvr>
+    <a:masterClrMapping/>
+  </p:clrMapOvr>
+</p:sld>
+</file>
+
+<file path=ppt/slides/slide13.xml><?xml version="1.0" encoding="utf-8"?>
+<p:sld xmlns:a="http://schemas.openxmlformats.org/drawingml/2006/main" xmlns:r="http://schemas.openxmlformats.org/officeDocument/2006/relationships" xmlns:p="http://schemas.openxmlformats.org/presentationml/2006/main">
+  <p:cSld>
+    <p:spTree>
+      <p:nvGrpSpPr>
+        <p:cNvPr id="1" name=""/>
+        <p:cNvGrpSpPr/>
+        <p:nvPr/>
+      </p:nvGrpSpPr>
+      <p:grpSpPr>
+        <a:xfrm>
+          <a:off x="0" y="0"/>
+          <a:ext cx="0" cy="0"/>
+          <a:chOff x="0" y="0"/>
+          <a:chExt cx="0" cy="0"/>
+        </a:xfrm>
+      </p:grpSpPr>
+      <p:sp>
+        <p:nvSpPr>
+          <p:cNvPr id="2" name="Title 1">
+            <a:extLst>
+              <a:ext uri="{FF2B5EF4-FFF2-40B4-BE49-F238E27FC236}">
+                <a16:creationId xmlns:a16="http://schemas.microsoft.com/office/drawing/2014/main" id="{3F0C01E9-8536-1237-9FA5-5DAAAB996B57}"/>
+              </a:ext>
+            </a:extLst>
+          </p:cNvPr>
+          <p:cNvSpPr>
+            <a:spLocks noGrp="1"/>
+          </p:cNvSpPr>
+          <p:nvPr>
+            <p:ph type="title"/>
+          </p:nvPr>
+        </p:nvSpPr>
+        <p:spPr/>
+        <p:txBody>
+          <a:bodyPr/>
+          <a:lstStyle/>
+          <a:p>
+            <a:r>
+              <a:rPr lang="en-US"/>
+              <a:t>Diagnosis and Tolerant Strategy of T-Type 3LI</a:t>
+            </a:r>
+            <a:endParaRPr lang="tr-TR" dirty="0"/>
+          </a:p>
+        </p:txBody>
+      </p:sp>
+      <p:sp>
+        <p:nvSpPr>
+          <p:cNvPr id="3" name="Content Placeholder 2">
+            <a:extLst>
+              <a:ext uri="{FF2B5EF4-FFF2-40B4-BE49-F238E27FC236}">
+                <a16:creationId xmlns:a16="http://schemas.microsoft.com/office/drawing/2014/main" id="{FC328C72-921B-B2AE-A20D-6E8FEBBA39FE}"/>
+              </a:ext>
+            </a:extLst>
+          </p:cNvPr>
+          <p:cNvSpPr>
+            <a:spLocks noGrp="1"/>
+          </p:cNvSpPr>
+          <p:nvPr>
+            <p:ph idx="1"/>
+          </p:nvPr>
+        </p:nvSpPr>
+        <p:spPr/>
+        <p:txBody>
+          <a:bodyPr/>
+          <a:lstStyle/>
+          <a:p>
+            <a:endParaRPr lang="tr-TR" dirty="0"/>
+          </a:p>
+        </p:txBody>
+      </p:sp>
+    </p:spTree>
+    <p:extLst>
+      <p:ext uri="{BB962C8B-B14F-4D97-AF65-F5344CB8AC3E}">
+        <p14:creationId xmlns:p14="http://schemas.microsoft.com/office/powerpoint/2010/main" val="153875960"/>
       </p:ext>
     </p:extLst>
   </p:cSld>

</xml_diff>

<commit_message>
3 LI T-Type Inverter Fault operation analysis
</commit_message>
<xml_diff>
--- a/Reports/Fault_Tolerance.pptx
+++ b/Reports/Fault_Tolerance.pptx
@@ -18,6 +18,7 @@
     <p:sldId id="268" r:id="rId12"/>
     <p:sldId id="266" r:id="rId13"/>
     <p:sldId id="267" r:id="rId14"/>
+    <p:sldId id="269" r:id="rId15"/>
   </p:sldIdLst>
   <p:sldSz cx="12192000" cy="6858000"/>
   <p:notesSz cx="6858000" cy="9144000"/>
@@ -255,7 +256,7 @@
           <a:p>
             <a:fld id="{524C83C5-A6E3-467E-88A3-7867E1892419}" type="datetimeFigureOut">
               <a:rPr lang="tr-TR" smtClean="0"/>
-              <a:t>20.02.2024</a:t>
+              <a:t>21.02.2024</a:t>
             </a:fld>
             <a:endParaRPr lang="tr-TR"/>
           </a:p>
@@ -425,7 +426,7 @@
           <a:p>
             <a:fld id="{524C83C5-A6E3-467E-88A3-7867E1892419}" type="datetimeFigureOut">
               <a:rPr lang="tr-TR" smtClean="0"/>
-              <a:t>20.02.2024</a:t>
+              <a:t>21.02.2024</a:t>
             </a:fld>
             <a:endParaRPr lang="tr-TR"/>
           </a:p>
@@ -605,7 +606,7 @@
           <a:p>
             <a:fld id="{524C83C5-A6E3-467E-88A3-7867E1892419}" type="datetimeFigureOut">
               <a:rPr lang="tr-TR" smtClean="0"/>
-              <a:t>20.02.2024</a:t>
+              <a:t>21.02.2024</a:t>
             </a:fld>
             <a:endParaRPr lang="tr-TR"/>
           </a:p>
@@ -775,7 +776,7 @@
           <a:p>
             <a:fld id="{524C83C5-A6E3-467E-88A3-7867E1892419}" type="datetimeFigureOut">
               <a:rPr lang="tr-TR" smtClean="0"/>
-              <a:t>20.02.2024</a:t>
+              <a:t>21.02.2024</a:t>
             </a:fld>
             <a:endParaRPr lang="tr-TR"/>
           </a:p>
@@ -1021,7 +1022,7 @@
           <a:p>
             <a:fld id="{524C83C5-A6E3-467E-88A3-7867E1892419}" type="datetimeFigureOut">
               <a:rPr lang="tr-TR" smtClean="0"/>
-              <a:t>20.02.2024</a:t>
+              <a:t>21.02.2024</a:t>
             </a:fld>
             <a:endParaRPr lang="tr-TR"/>
           </a:p>
@@ -1253,7 +1254,7 @@
           <a:p>
             <a:fld id="{524C83C5-A6E3-467E-88A3-7867E1892419}" type="datetimeFigureOut">
               <a:rPr lang="tr-TR" smtClean="0"/>
-              <a:t>20.02.2024</a:t>
+              <a:t>21.02.2024</a:t>
             </a:fld>
             <a:endParaRPr lang="tr-TR"/>
           </a:p>
@@ -1620,7 +1621,7 @@
           <a:p>
             <a:fld id="{524C83C5-A6E3-467E-88A3-7867E1892419}" type="datetimeFigureOut">
               <a:rPr lang="tr-TR" smtClean="0"/>
-              <a:t>20.02.2024</a:t>
+              <a:t>21.02.2024</a:t>
             </a:fld>
             <a:endParaRPr lang="tr-TR"/>
           </a:p>
@@ -1738,7 +1739,7 @@
           <a:p>
             <a:fld id="{524C83C5-A6E3-467E-88A3-7867E1892419}" type="datetimeFigureOut">
               <a:rPr lang="tr-TR" smtClean="0"/>
-              <a:t>20.02.2024</a:t>
+              <a:t>21.02.2024</a:t>
             </a:fld>
             <a:endParaRPr lang="tr-TR"/>
           </a:p>
@@ -1833,7 +1834,7 @@
           <a:p>
             <a:fld id="{524C83C5-A6E3-467E-88A3-7867E1892419}" type="datetimeFigureOut">
               <a:rPr lang="tr-TR" smtClean="0"/>
-              <a:t>20.02.2024</a:t>
+              <a:t>21.02.2024</a:t>
             </a:fld>
             <a:endParaRPr lang="tr-TR"/>
           </a:p>
@@ -2110,7 +2111,7 @@
           <a:p>
             <a:fld id="{524C83C5-A6E3-467E-88A3-7867E1892419}" type="datetimeFigureOut">
               <a:rPr lang="tr-TR" smtClean="0"/>
-              <a:t>20.02.2024</a:t>
+              <a:t>21.02.2024</a:t>
             </a:fld>
             <a:endParaRPr lang="tr-TR"/>
           </a:p>
@@ -2367,7 +2368,7 @@
           <a:p>
             <a:fld id="{524C83C5-A6E3-467E-88A3-7867E1892419}" type="datetimeFigureOut">
               <a:rPr lang="tr-TR" smtClean="0"/>
-              <a:t>20.02.2024</a:t>
+              <a:t>21.02.2024</a:t>
             </a:fld>
             <a:endParaRPr lang="tr-TR"/>
           </a:p>
@@ -2580,7 +2581,7 @@
           <a:p>
             <a:fld id="{524C83C5-A6E3-467E-88A3-7867E1892419}" type="datetimeFigureOut">
               <a:rPr lang="tr-TR" smtClean="0"/>
-              <a:t>20.02.2024</a:t>
+              <a:t>21.02.2024</a:t>
             </a:fld>
             <a:endParaRPr lang="tr-TR"/>
           </a:p>
@@ -4320,10 +4321,684 @@
           <a:lstStyle/>
           <a:p>
             <a:pPr algn="l"/>
-            <a:endParaRPr lang="tr-TR"/>
+            <a:r>
+              <a:rPr lang="en-US" dirty="0"/>
+              <a:t>*under open-switch fault conditions</a:t>
+            </a:r>
+            <a:endParaRPr lang="tr-TR" dirty="0"/>
           </a:p>
         </p:txBody>
       </p:sp>
+      <p:graphicFrame>
+        <p:nvGraphicFramePr>
+          <p:cNvPr id="3" name="Table 2">
+            <a:extLst>
+              <a:ext uri="{FF2B5EF4-FFF2-40B4-BE49-F238E27FC236}">
+                <a16:creationId xmlns:a16="http://schemas.microsoft.com/office/drawing/2014/main" id="{0222BD00-5246-3092-A911-F466EF587356}"/>
+              </a:ext>
+            </a:extLst>
+          </p:cNvPr>
+          <p:cNvGraphicFramePr>
+            <a:graphicFrameLocks noGrp="1"/>
+          </p:cNvGraphicFramePr>
+          <p:nvPr>
+            <p:extLst>
+              <p:ext uri="{D42A27DB-BD31-4B8C-83A1-F6EECF244321}">
+                <p14:modId xmlns:p14="http://schemas.microsoft.com/office/powerpoint/2010/main" val="2301896621"/>
+              </p:ext>
+            </p:extLst>
+          </p:nvPr>
+        </p:nvGraphicFramePr>
+        <p:xfrm>
+          <a:off x="6672649" y="4976318"/>
+          <a:ext cx="4481382" cy="1218536"/>
+        </p:xfrm>
+        <a:graphic>
+          <a:graphicData uri="http://schemas.openxmlformats.org/drawingml/2006/table">
+            <a:tbl>
+              <a:tblPr>
+                <a:tableStyleId>{5C22544A-7EE6-4342-B048-85BDC9FD1C3A}</a:tableStyleId>
+              </a:tblPr>
+              <a:tblGrid>
+                <a:gridCol w="746897">
+                  <a:extLst>
+                    <a:ext uri="{9D8B030D-6E8A-4147-A177-3AD203B41FA5}">
+                      <a16:colId xmlns:a16="http://schemas.microsoft.com/office/drawing/2014/main" val="738067104"/>
+                    </a:ext>
+                  </a:extLst>
+                </a:gridCol>
+                <a:gridCol w="746897">
+                  <a:extLst>
+                    <a:ext uri="{9D8B030D-6E8A-4147-A177-3AD203B41FA5}">
+                      <a16:colId xmlns:a16="http://schemas.microsoft.com/office/drawing/2014/main" val="1871928831"/>
+                    </a:ext>
+                  </a:extLst>
+                </a:gridCol>
+                <a:gridCol w="746897">
+                  <a:extLst>
+                    <a:ext uri="{9D8B030D-6E8A-4147-A177-3AD203B41FA5}">
+                      <a16:colId xmlns:a16="http://schemas.microsoft.com/office/drawing/2014/main" val="659605148"/>
+                    </a:ext>
+                  </a:extLst>
+                </a:gridCol>
+                <a:gridCol w="746897">
+                  <a:extLst>
+                    <a:ext uri="{9D8B030D-6E8A-4147-A177-3AD203B41FA5}">
+                      <a16:colId xmlns:a16="http://schemas.microsoft.com/office/drawing/2014/main" val="3118763300"/>
+                    </a:ext>
+                  </a:extLst>
+                </a:gridCol>
+                <a:gridCol w="746897">
+                  <a:extLst>
+                    <a:ext uri="{9D8B030D-6E8A-4147-A177-3AD203B41FA5}">
+                      <a16:colId xmlns:a16="http://schemas.microsoft.com/office/drawing/2014/main" val="1741976836"/>
+                    </a:ext>
+                  </a:extLst>
+                </a:gridCol>
+                <a:gridCol w="746897">
+                  <a:extLst>
+                    <a:ext uri="{9D8B030D-6E8A-4147-A177-3AD203B41FA5}">
+                      <a16:colId xmlns:a16="http://schemas.microsoft.com/office/drawing/2014/main" val="3286428204"/>
+                    </a:ext>
+                  </a:extLst>
+                </a:gridCol>
+              </a:tblGrid>
+              <a:tr h="304634">
+                <a:tc>
+                  <a:txBody>
+                    <a:bodyPr/>
+                    <a:lstStyle/>
+                    <a:p>
+                      <a:pPr algn="l" fontAlgn="b"/>
+                      <a:r>
+                        <a:rPr lang="tr-TR" sz="1100" u="none" strike="noStrike">
+                          <a:effectLst/>
+                        </a:rPr>
+                        <a:t>State</a:t>
+                      </a:r>
+                      <a:endParaRPr lang="tr-TR" sz="1100" b="0" i="0" u="none" strike="noStrike">
+                        <a:solidFill>
+                          <a:srgbClr val="000000"/>
+                        </a:solidFill>
+                        <a:effectLst/>
+                        <a:latin typeface="Calibri" panose="020F0502020204030204" pitchFamily="34" charset="0"/>
+                      </a:endParaRPr>
+                    </a:p>
+                  </a:txBody>
+                  <a:tcPr marL="6350" marR="6350" marT="6350" marB="0" anchor="b"/>
+                </a:tc>
+                <a:tc>
+                  <a:txBody>
+                    <a:bodyPr/>
+                    <a:lstStyle/>
+                    <a:p>
+                      <a:pPr algn="l" fontAlgn="b"/>
+                      <a:r>
+                        <a:rPr lang="tr-TR" sz="1100" u="none" strike="noStrike" dirty="0">
+                          <a:effectLst/>
+                        </a:rPr>
+                        <a:t>Vout</a:t>
+                      </a:r>
+                      <a:endParaRPr lang="tr-TR" sz="1100" b="0" i="0" u="none" strike="noStrike" dirty="0">
+                        <a:solidFill>
+                          <a:srgbClr val="000000"/>
+                        </a:solidFill>
+                        <a:effectLst/>
+                        <a:latin typeface="Calibri" panose="020F0502020204030204" pitchFamily="34" charset="0"/>
+                      </a:endParaRPr>
+                    </a:p>
+                  </a:txBody>
+                  <a:tcPr marL="6350" marR="6350" marT="6350" marB="0" anchor="b"/>
+                </a:tc>
+                <a:tc>
+                  <a:txBody>
+                    <a:bodyPr/>
+                    <a:lstStyle/>
+                    <a:p>
+                      <a:pPr algn="l" fontAlgn="b"/>
+                      <a:r>
+                        <a:rPr lang="tr-TR" sz="1100" u="none" strike="noStrike">
+                          <a:effectLst/>
+                        </a:rPr>
+                        <a:t>Sa1</a:t>
+                      </a:r>
+                      <a:endParaRPr lang="tr-TR" sz="1100" b="0" i="0" u="none" strike="noStrike">
+                        <a:solidFill>
+                          <a:srgbClr val="000000"/>
+                        </a:solidFill>
+                        <a:effectLst/>
+                        <a:latin typeface="Calibri" panose="020F0502020204030204" pitchFamily="34" charset="0"/>
+                      </a:endParaRPr>
+                    </a:p>
+                  </a:txBody>
+                  <a:tcPr marL="6350" marR="6350" marT="6350" marB="0" anchor="b"/>
+                </a:tc>
+                <a:tc>
+                  <a:txBody>
+                    <a:bodyPr/>
+                    <a:lstStyle/>
+                    <a:p>
+                      <a:pPr algn="l" fontAlgn="b"/>
+                      <a:r>
+                        <a:rPr lang="tr-TR" sz="1100" u="none" strike="noStrike">
+                          <a:effectLst/>
+                        </a:rPr>
+                        <a:t>Sa2</a:t>
+                      </a:r>
+                      <a:endParaRPr lang="tr-TR" sz="1100" b="0" i="0" u="none" strike="noStrike">
+                        <a:solidFill>
+                          <a:srgbClr val="000000"/>
+                        </a:solidFill>
+                        <a:effectLst/>
+                        <a:latin typeface="Calibri" panose="020F0502020204030204" pitchFamily="34" charset="0"/>
+                      </a:endParaRPr>
+                    </a:p>
+                  </a:txBody>
+                  <a:tcPr marL="6350" marR="6350" marT="6350" marB="0" anchor="b"/>
+                </a:tc>
+                <a:tc>
+                  <a:txBody>
+                    <a:bodyPr/>
+                    <a:lstStyle/>
+                    <a:p>
+                      <a:pPr algn="l" fontAlgn="b"/>
+                      <a:r>
+                        <a:rPr lang="tr-TR" sz="1100" u="none" strike="noStrike">
+                          <a:effectLst/>
+                        </a:rPr>
+                        <a:t>Sa3</a:t>
+                      </a:r>
+                      <a:endParaRPr lang="tr-TR" sz="1100" b="0" i="0" u="none" strike="noStrike">
+                        <a:solidFill>
+                          <a:srgbClr val="000000"/>
+                        </a:solidFill>
+                        <a:effectLst/>
+                        <a:latin typeface="Calibri" panose="020F0502020204030204" pitchFamily="34" charset="0"/>
+                      </a:endParaRPr>
+                    </a:p>
+                  </a:txBody>
+                  <a:tcPr marL="6350" marR="6350" marT="6350" marB="0" anchor="b"/>
+                </a:tc>
+                <a:tc>
+                  <a:txBody>
+                    <a:bodyPr/>
+                    <a:lstStyle/>
+                    <a:p>
+                      <a:pPr algn="l" fontAlgn="b"/>
+                      <a:r>
+                        <a:rPr lang="tr-TR" sz="1100" u="none" strike="noStrike">
+                          <a:effectLst/>
+                        </a:rPr>
+                        <a:t>Sa4</a:t>
+                      </a:r>
+                      <a:endParaRPr lang="tr-TR" sz="1100" b="0" i="0" u="none" strike="noStrike">
+                        <a:solidFill>
+                          <a:srgbClr val="000000"/>
+                        </a:solidFill>
+                        <a:effectLst/>
+                        <a:latin typeface="Calibri" panose="020F0502020204030204" pitchFamily="34" charset="0"/>
+                      </a:endParaRPr>
+                    </a:p>
+                  </a:txBody>
+                  <a:tcPr marL="6350" marR="6350" marT="6350" marB="0" anchor="b"/>
+                </a:tc>
+                <a:extLst>
+                  <a:ext uri="{0D108BD9-81ED-4DB2-BD59-A6C34878D82A}">
+                    <a16:rowId xmlns:a16="http://schemas.microsoft.com/office/drawing/2014/main" val="3878468668"/>
+                  </a:ext>
+                </a:extLst>
+              </a:tr>
+              <a:tr h="304634">
+                <a:tc>
+                  <a:txBody>
+                    <a:bodyPr/>
+                    <a:lstStyle/>
+                    <a:p>
+                      <a:pPr algn="l" fontAlgn="b"/>
+                      <a:r>
+                        <a:rPr lang="tr-TR" sz="1100" u="none" strike="noStrike">
+                          <a:effectLst/>
+                        </a:rPr>
+                        <a:t>P</a:t>
+                      </a:r>
+                      <a:endParaRPr lang="tr-TR" sz="1100" b="0" i="0" u="none" strike="noStrike">
+                        <a:solidFill>
+                          <a:srgbClr val="000000"/>
+                        </a:solidFill>
+                        <a:effectLst/>
+                        <a:latin typeface="Calibri" panose="020F0502020204030204" pitchFamily="34" charset="0"/>
+                      </a:endParaRPr>
+                    </a:p>
+                  </a:txBody>
+                  <a:tcPr marL="6350" marR="6350" marT="6350" marB="0" anchor="b"/>
+                </a:tc>
+                <a:tc>
+                  <a:txBody>
+                    <a:bodyPr/>
+                    <a:lstStyle/>
+                    <a:p>
+                      <a:pPr algn="l" fontAlgn="b"/>
+                      <a:r>
+                        <a:rPr lang="en-US" sz="1100" u="none" strike="noStrike" dirty="0">
+                          <a:effectLst/>
+                        </a:rPr>
+                        <a:t>+</a:t>
+                      </a:r>
+                      <a:r>
+                        <a:rPr lang="tr-TR" sz="1100" u="none" strike="noStrike" dirty="0">
+                          <a:effectLst/>
+                        </a:rPr>
+                        <a:t>Vdc/2</a:t>
+                      </a:r>
+                      <a:endParaRPr lang="tr-TR" sz="1100" b="0" i="0" u="none" strike="noStrike" dirty="0">
+                        <a:solidFill>
+                          <a:srgbClr val="000000"/>
+                        </a:solidFill>
+                        <a:effectLst/>
+                        <a:latin typeface="Calibri" panose="020F0502020204030204" pitchFamily="34" charset="0"/>
+                      </a:endParaRPr>
+                    </a:p>
+                  </a:txBody>
+                  <a:tcPr marL="6350" marR="6350" marT="6350" marB="0" anchor="b"/>
+                </a:tc>
+                <a:tc>
+                  <a:txBody>
+                    <a:bodyPr/>
+                    <a:lstStyle/>
+                    <a:p>
+                      <a:pPr algn="l" fontAlgn="b"/>
+                      <a:r>
+                        <a:rPr lang="tr-TR" sz="1100" u="none" strike="noStrike">
+                          <a:effectLst/>
+                        </a:rPr>
+                        <a:t>ON</a:t>
+                      </a:r>
+                      <a:endParaRPr lang="tr-TR" sz="1100" b="0" i="0" u="none" strike="noStrike">
+                        <a:solidFill>
+                          <a:srgbClr val="000000"/>
+                        </a:solidFill>
+                        <a:effectLst/>
+                        <a:latin typeface="Calibri" panose="020F0502020204030204" pitchFamily="34" charset="0"/>
+                      </a:endParaRPr>
+                    </a:p>
+                  </a:txBody>
+                  <a:tcPr marL="6350" marR="6350" marT="6350" marB="0" anchor="b"/>
+                </a:tc>
+                <a:tc>
+                  <a:txBody>
+                    <a:bodyPr/>
+                    <a:lstStyle/>
+                    <a:p>
+                      <a:pPr algn="l" fontAlgn="b"/>
+                      <a:r>
+                        <a:rPr lang="tr-TR" sz="1100" u="none" strike="noStrike" dirty="0">
+                          <a:effectLst/>
+                        </a:rPr>
+                        <a:t>ON</a:t>
+                      </a:r>
+                      <a:endParaRPr lang="tr-TR" sz="1100" b="0" i="0" u="none" strike="noStrike" dirty="0">
+                        <a:solidFill>
+                          <a:srgbClr val="000000"/>
+                        </a:solidFill>
+                        <a:effectLst/>
+                        <a:latin typeface="Calibri" panose="020F0502020204030204" pitchFamily="34" charset="0"/>
+                      </a:endParaRPr>
+                    </a:p>
+                  </a:txBody>
+                  <a:tcPr marL="6350" marR="6350" marT="6350" marB="0" anchor="b"/>
+                </a:tc>
+                <a:tc>
+                  <a:txBody>
+                    <a:bodyPr/>
+                    <a:lstStyle/>
+                    <a:p>
+                      <a:pPr algn="l" fontAlgn="b"/>
+                      <a:r>
+                        <a:rPr lang="tr-TR" sz="1100" u="none" strike="noStrike">
+                          <a:effectLst/>
+                        </a:rPr>
+                        <a:t>OFF</a:t>
+                      </a:r>
+                      <a:endParaRPr lang="tr-TR" sz="1100" b="0" i="0" u="none" strike="noStrike">
+                        <a:solidFill>
+                          <a:srgbClr val="000000"/>
+                        </a:solidFill>
+                        <a:effectLst/>
+                        <a:latin typeface="Calibri" panose="020F0502020204030204" pitchFamily="34" charset="0"/>
+                      </a:endParaRPr>
+                    </a:p>
+                  </a:txBody>
+                  <a:tcPr marL="6350" marR="6350" marT="6350" marB="0" anchor="b"/>
+                </a:tc>
+                <a:tc>
+                  <a:txBody>
+                    <a:bodyPr/>
+                    <a:lstStyle/>
+                    <a:p>
+                      <a:pPr algn="l" fontAlgn="b"/>
+                      <a:r>
+                        <a:rPr lang="tr-TR" sz="1100" u="none" strike="noStrike">
+                          <a:effectLst/>
+                        </a:rPr>
+                        <a:t>OFF</a:t>
+                      </a:r>
+                      <a:endParaRPr lang="tr-TR" sz="1100" b="0" i="0" u="none" strike="noStrike">
+                        <a:solidFill>
+                          <a:srgbClr val="000000"/>
+                        </a:solidFill>
+                        <a:effectLst/>
+                        <a:latin typeface="Calibri" panose="020F0502020204030204" pitchFamily="34" charset="0"/>
+                      </a:endParaRPr>
+                    </a:p>
+                  </a:txBody>
+                  <a:tcPr marL="6350" marR="6350" marT="6350" marB="0" anchor="b"/>
+                </a:tc>
+                <a:extLst>
+                  <a:ext uri="{0D108BD9-81ED-4DB2-BD59-A6C34878D82A}">
+                    <a16:rowId xmlns:a16="http://schemas.microsoft.com/office/drawing/2014/main" val="1327193577"/>
+                  </a:ext>
+                </a:extLst>
+              </a:tr>
+              <a:tr h="304634">
+                <a:tc>
+                  <a:txBody>
+                    <a:bodyPr/>
+                    <a:lstStyle/>
+                    <a:p>
+                      <a:pPr algn="l" fontAlgn="b"/>
+                      <a:r>
+                        <a:rPr lang="tr-TR" sz="1100" u="none" strike="noStrike">
+                          <a:effectLst/>
+                        </a:rPr>
+                        <a:t>0</a:t>
+                      </a:r>
+                      <a:endParaRPr lang="tr-TR" sz="1100" b="0" i="0" u="none" strike="noStrike">
+                        <a:solidFill>
+                          <a:srgbClr val="000000"/>
+                        </a:solidFill>
+                        <a:effectLst/>
+                        <a:latin typeface="Calibri" panose="020F0502020204030204" pitchFamily="34" charset="0"/>
+                      </a:endParaRPr>
+                    </a:p>
+                  </a:txBody>
+                  <a:tcPr marL="6350" marR="6350" marT="6350" marB="0" anchor="b"/>
+                </a:tc>
+                <a:tc>
+                  <a:txBody>
+                    <a:bodyPr/>
+                    <a:lstStyle/>
+                    <a:p>
+                      <a:pPr algn="ctr" fontAlgn="b"/>
+                      <a:r>
+                        <a:rPr lang="tr-TR" sz="1100" u="none" strike="noStrike">
+                          <a:effectLst/>
+                        </a:rPr>
+                        <a:t>0</a:t>
+                      </a:r>
+                      <a:endParaRPr lang="tr-TR" sz="1100" b="0" i="0" u="none" strike="noStrike">
+                        <a:solidFill>
+                          <a:srgbClr val="000000"/>
+                        </a:solidFill>
+                        <a:effectLst/>
+                        <a:latin typeface="Calibri" panose="020F0502020204030204" pitchFamily="34" charset="0"/>
+                      </a:endParaRPr>
+                    </a:p>
+                  </a:txBody>
+                  <a:tcPr marL="6350" marR="6350" marT="6350" marB="0" anchor="b"/>
+                </a:tc>
+                <a:tc>
+                  <a:txBody>
+                    <a:bodyPr/>
+                    <a:lstStyle/>
+                    <a:p>
+                      <a:pPr algn="l" fontAlgn="b"/>
+                      <a:r>
+                        <a:rPr lang="tr-TR" sz="1100" u="none" strike="noStrike">
+                          <a:effectLst/>
+                        </a:rPr>
+                        <a:t>OFF</a:t>
+                      </a:r>
+                      <a:endParaRPr lang="tr-TR" sz="1100" b="0" i="0" u="none" strike="noStrike">
+                        <a:solidFill>
+                          <a:srgbClr val="000000"/>
+                        </a:solidFill>
+                        <a:effectLst/>
+                        <a:latin typeface="Calibri" panose="020F0502020204030204" pitchFamily="34" charset="0"/>
+                      </a:endParaRPr>
+                    </a:p>
+                  </a:txBody>
+                  <a:tcPr marL="6350" marR="6350" marT="6350" marB="0" anchor="b"/>
+                </a:tc>
+                <a:tc>
+                  <a:txBody>
+                    <a:bodyPr/>
+                    <a:lstStyle/>
+                    <a:p>
+                      <a:pPr algn="l" fontAlgn="b"/>
+                      <a:r>
+                        <a:rPr lang="tr-TR" sz="1100" u="none" strike="noStrike" dirty="0">
+                          <a:effectLst/>
+                        </a:rPr>
+                        <a:t>ON</a:t>
+                      </a:r>
+                      <a:endParaRPr lang="tr-TR" sz="1100" b="0" i="0" u="none" strike="noStrike" dirty="0">
+                        <a:solidFill>
+                          <a:srgbClr val="000000"/>
+                        </a:solidFill>
+                        <a:effectLst/>
+                        <a:latin typeface="Calibri" panose="020F0502020204030204" pitchFamily="34" charset="0"/>
+                      </a:endParaRPr>
+                    </a:p>
+                  </a:txBody>
+                  <a:tcPr marL="6350" marR="6350" marT="6350" marB="0" anchor="b"/>
+                </a:tc>
+                <a:tc>
+                  <a:txBody>
+                    <a:bodyPr/>
+                    <a:lstStyle/>
+                    <a:p>
+                      <a:pPr algn="l" fontAlgn="b"/>
+                      <a:r>
+                        <a:rPr lang="tr-TR" sz="1100" u="none" strike="noStrike">
+                          <a:effectLst/>
+                        </a:rPr>
+                        <a:t>ON</a:t>
+                      </a:r>
+                      <a:endParaRPr lang="tr-TR" sz="1100" b="0" i="0" u="none" strike="noStrike">
+                        <a:solidFill>
+                          <a:srgbClr val="000000"/>
+                        </a:solidFill>
+                        <a:effectLst/>
+                        <a:latin typeface="Calibri" panose="020F0502020204030204" pitchFamily="34" charset="0"/>
+                      </a:endParaRPr>
+                    </a:p>
+                  </a:txBody>
+                  <a:tcPr marL="6350" marR="6350" marT="6350" marB="0" anchor="b"/>
+                </a:tc>
+                <a:tc>
+                  <a:txBody>
+                    <a:bodyPr/>
+                    <a:lstStyle/>
+                    <a:p>
+                      <a:pPr algn="l" fontAlgn="b"/>
+                      <a:r>
+                        <a:rPr lang="tr-TR" sz="1100" u="none" strike="noStrike">
+                          <a:effectLst/>
+                        </a:rPr>
+                        <a:t>OFF</a:t>
+                      </a:r>
+                      <a:endParaRPr lang="tr-TR" sz="1100" b="0" i="0" u="none" strike="noStrike">
+                        <a:solidFill>
+                          <a:srgbClr val="000000"/>
+                        </a:solidFill>
+                        <a:effectLst/>
+                        <a:latin typeface="Calibri" panose="020F0502020204030204" pitchFamily="34" charset="0"/>
+                      </a:endParaRPr>
+                    </a:p>
+                  </a:txBody>
+                  <a:tcPr marL="6350" marR="6350" marT="6350" marB="0" anchor="b"/>
+                </a:tc>
+                <a:extLst>
+                  <a:ext uri="{0D108BD9-81ED-4DB2-BD59-A6C34878D82A}">
+                    <a16:rowId xmlns:a16="http://schemas.microsoft.com/office/drawing/2014/main" val="124995844"/>
+                  </a:ext>
+                </a:extLst>
+              </a:tr>
+              <a:tr h="304634">
+                <a:tc>
+                  <a:txBody>
+                    <a:bodyPr/>
+                    <a:lstStyle/>
+                    <a:p>
+                      <a:pPr algn="l" fontAlgn="b"/>
+                      <a:r>
+                        <a:rPr lang="tr-TR" sz="1100" u="none" strike="noStrike">
+                          <a:effectLst/>
+                        </a:rPr>
+                        <a:t>N</a:t>
+                      </a:r>
+                      <a:endParaRPr lang="tr-TR" sz="1100" b="0" i="0" u="none" strike="noStrike">
+                        <a:solidFill>
+                          <a:srgbClr val="000000"/>
+                        </a:solidFill>
+                        <a:effectLst/>
+                        <a:latin typeface="Calibri" panose="020F0502020204030204" pitchFamily="34" charset="0"/>
+                      </a:endParaRPr>
+                    </a:p>
+                  </a:txBody>
+                  <a:tcPr marL="6350" marR="6350" marT="6350" marB="0" anchor="b"/>
+                </a:tc>
+                <a:tc>
+                  <a:txBody>
+                    <a:bodyPr/>
+                    <a:lstStyle/>
+                    <a:p>
+                      <a:pPr algn="l" fontAlgn="b"/>
+                      <a:r>
+                        <a:rPr lang="en-US" sz="1100" u="none" strike="noStrike" dirty="0">
+                          <a:effectLst/>
+                        </a:rPr>
+                        <a:t>-</a:t>
+                      </a:r>
+                      <a:r>
+                        <a:rPr lang="tr-TR" sz="1100" u="none" strike="noStrike" dirty="0">
+                          <a:effectLst/>
+                        </a:rPr>
+                        <a:t>Vdc/2</a:t>
+                      </a:r>
+                      <a:endParaRPr lang="tr-TR" sz="1100" b="0" i="0" u="none" strike="noStrike" dirty="0">
+                        <a:solidFill>
+                          <a:srgbClr val="000000"/>
+                        </a:solidFill>
+                        <a:effectLst/>
+                        <a:latin typeface="Calibri" panose="020F0502020204030204" pitchFamily="34" charset="0"/>
+                      </a:endParaRPr>
+                    </a:p>
+                  </a:txBody>
+                  <a:tcPr marL="6350" marR="6350" marT="6350" marB="0" anchor="b"/>
+                </a:tc>
+                <a:tc>
+                  <a:txBody>
+                    <a:bodyPr/>
+                    <a:lstStyle/>
+                    <a:p>
+                      <a:pPr algn="l" fontAlgn="b"/>
+                      <a:r>
+                        <a:rPr lang="tr-TR" sz="1100" u="none" strike="noStrike">
+                          <a:effectLst/>
+                        </a:rPr>
+                        <a:t>OFF</a:t>
+                      </a:r>
+                      <a:endParaRPr lang="tr-TR" sz="1100" b="0" i="0" u="none" strike="noStrike">
+                        <a:solidFill>
+                          <a:srgbClr val="000000"/>
+                        </a:solidFill>
+                        <a:effectLst/>
+                        <a:latin typeface="Calibri" panose="020F0502020204030204" pitchFamily="34" charset="0"/>
+                      </a:endParaRPr>
+                    </a:p>
+                  </a:txBody>
+                  <a:tcPr marL="6350" marR="6350" marT="6350" marB="0" anchor="b"/>
+                </a:tc>
+                <a:tc>
+                  <a:txBody>
+                    <a:bodyPr/>
+                    <a:lstStyle/>
+                    <a:p>
+                      <a:pPr algn="l" fontAlgn="b"/>
+                      <a:r>
+                        <a:rPr lang="tr-TR" sz="1100" u="none" strike="noStrike" dirty="0">
+                          <a:effectLst/>
+                        </a:rPr>
+                        <a:t>OFF</a:t>
+                      </a:r>
+                      <a:endParaRPr lang="tr-TR" sz="1100" b="0" i="0" u="none" strike="noStrike" dirty="0">
+                        <a:solidFill>
+                          <a:srgbClr val="000000"/>
+                        </a:solidFill>
+                        <a:effectLst/>
+                        <a:latin typeface="Calibri" panose="020F0502020204030204" pitchFamily="34" charset="0"/>
+                      </a:endParaRPr>
+                    </a:p>
+                  </a:txBody>
+                  <a:tcPr marL="6350" marR="6350" marT="6350" marB="0" anchor="b"/>
+                </a:tc>
+                <a:tc>
+                  <a:txBody>
+                    <a:bodyPr/>
+                    <a:lstStyle/>
+                    <a:p>
+                      <a:pPr algn="l" fontAlgn="b"/>
+                      <a:r>
+                        <a:rPr lang="tr-TR" sz="1100" u="none" strike="noStrike" dirty="0">
+                          <a:effectLst/>
+                        </a:rPr>
+                        <a:t>ON</a:t>
+                      </a:r>
+                      <a:endParaRPr lang="tr-TR" sz="1100" b="0" i="0" u="none" strike="noStrike" dirty="0">
+                        <a:solidFill>
+                          <a:srgbClr val="000000"/>
+                        </a:solidFill>
+                        <a:effectLst/>
+                        <a:latin typeface="Calibri" panose="020F0502020204030204" pitchFamily="34" charset="0"/>
+                      </a:endParaRPr>
+                    </a:p>
+                  </a:txBody>
+                  <a:tcPr marL="6350" marR="6350" marT="6350" marB="0" anchor="b"/>
+                </a:tc>
+                <a:tc>
+                  <a:txBody>
+                    <a:bodyPr/>
+                    <a:lstStyle/>
+                    <a:p>
+                      <a:pPr algn="l" fontAlgn="b"/>
+                      <a:r>
+                        <a:rPr lang="tr-TR" sz="1100" u="none" strike="noStrike" dirty="0">
+                          <a:effectLst/>
+                        </a:rPr>
+                        <a:t>ON</a:t>
+                      </a:r>
+                      <a:endParaRPr lang="tr-TR" sz="1100" b="0" i="0" u="none" strike="noStrike" dirty="0">
+                        <a:solidFill>
+                          <a:srgbClr val="000000"/>
+                        </a:solidFill>
+                        <a:effectLst/>
+                        <a:latin typeface="Calibri" panose="020F0502020204030204" pitchFamily="34" charset="0"/>
+                      </a:endParaRPr>
+                    </a:p>
+                  </a:txBody>
+                  <a:tcPr marL="6350" marR="6350" marT="6350" marB="0" anchor="b"/>
+                </a:tc>
+                <a:extLst>
+                  <a:ext uri="{0D108BD9-81ED-4DB2-BD59-A6C34878D82A}">
+                    <a16:rowId xmlns:a16="http://schemas.microsoft.com/office/drawing/2014/main" val="3262284922"/>
+                  </a:ext>
+                </a:extLst>
+              </a:tr>
+            </a:tbl>
+          </a:graphicData>
+        </a:graphic>
+      </p:graphicFrame>
     </p:spTree>
     <p:extLst>
       <p:ext uri="{BB962C8B-B14F-4D97-AF65-F5344CB8AC3E}">
@@ -4563,17 +5238,8 @@
               <a:rPr lang="en-US" sz="2000" dirty="0">
                 <a:latin typeface="Times-Roman"/>
               </a:rPr>
-              <a:t>Conduction losses are less than NPC Inverters (2 switches for Vdc in NPC, 1 switch </a:t>
+              <a:t>Conduction losses are less than NPC Inverters (2 switches for Vdc in NPC, 1 switch in T-Type.)</a:t>
             </a:r>
-            <a:r>
-              <a:rPr lang="en-US" sz="2000">
-                <a:latin typeface="Times-Roman"/>
-              </a:rPr>
-              <a:t>in T-Type.)</a:t>
-            </a:r>
-            <a:endParaRPr lang="en-US" sz="2000" dirty="0">
-              <a:latin typeface="Times-Roman"/>
-            </a:endParaRPr>
           </a:p>
           <a:p>
             <a:pPr marL="342900" indent="-342900" algn="l">
@@ -4718,16 +5384,496 @@
             <p:ph type="title"/>
           </p:nvPr>
         </p:nvSpPr>
+        <p:spPr>
+          <a:xfrm>
+            <a:off x="838200" y="365126"/>
+            <a:ext cx="10620632" cy="809282"/>
+          </a:xfrm>
+        </p:spPr>
+        <p:txBody>
+          <a:bodyPr>
+            <a:normAutofit fontScale="90000"/>
+          </a:bodyPr>
+          <a:lstStyle/>
+          <a:p>
+            <a:pPr algn="ctr"/>
+            <a:r>
+              <a:rPr lang="en-US" dirty="0"/>
+              <a:t>Analysis of T-Type 3LI During Open-Switch Fault</a:t>
+            </a:r>
+            <a:endParaRPr lang="tr-TR" dirty="0"/>
+          </a:p>
+        </p:txBody>
+      </p:sp>
+      <p:pic>
+        <p:nvPicPr>
+          <p:cNvPr id="5" name="Picture 4">
+            <a:extLst>
+              <a:ext uri="{FF2B5EF4-FFF2-40B4-BE49-F238E27FC236}">
+                <a16:creationId xmlns:a16="http://schemas.microsoft.com/office/drawing/2014/main" id="{9E489573-4BE8-6819-CD00-D1EBB66D0C1D}"/>
+              </a:ext>
+            </a:extLst>
+          </p:cNvPr>
+          <p:cNvPicPr>
+            <a:picLocks noChangeAspect="1"/>
+          </p:cNvPicPr>
+          <p:nvPr/>
+        </p:nvPicPr>
+        <p:blipFill>
+          <a:blip r:embed="rId2"/>
+          <a:stretch>
+            <a:fillRect/>
+          </a:stretch>
+        </p:blipFill>
+        <p:spPr>
+          <a:xfrm>
+            <a:off x="733168" y="1103484"/>
+            <a:ext cx="3128127" cy="2269630"/>
+          </a:xfrm>
+          <a:prstGeom prst="rect">
+            <a:avLst/>
+          </a:prstGeom>
+        </p:spPr>
+      </p:pic>
+      <p:pic>
+        <p:nvPicPr>
+          <p:cNvPr id="7" name="Picture 6">
+            <a:extLst>
+              <a:ext uri="{FF2B5EF4-FFF2-40B4-BE49-F238E27FC236}">
+                <a16:creationId xmlns:a16="http://schemas.microsoft.com/office/drawing/2014/main" id="{8EF62AFD-D918-A801-2E20-1F69E9370114}"/>
+              </a:ext>
+            </a:extLst>
+          </p:cNvPr>
+          <p:cNvPicPr>
+            <a:picLocks noChangeAspect="1"/>
+          </p:cNvPicPr>
+          <p:nvPr/>
+        </p:nvPicPr>
+        <p:blipFill>
+          <a:blip r:embed="rId2"/>
+          <a:stretch>
+            <a:fillRect/>
+          </a:stretch>
+        </p:blipFill>
+        <p:spPr>
+          <a:xfrm>
+            <a:off x="838200" y="3751668"/>
+            <a:ext cx="3282177" cy="2381402"/>
+          </a:xfrm>
+          <a:prstGeom prst="rect">
+            <a:avLst/>
+          </a:prstGeom>
+        </p:spPr>
+      </p:pic>
+      <p:pic>
+        <p:nvPicPr>
+          <p:cNvPr id="9" name="Picture 8">
+            <a:extLst>
+              <a:ext uri="{FF2B5EF4-FFF2-40B4-BE49-F238E27FC236}">
+                <a16:creationId xmlns:a16="http://schemas.microsoft.com/office/drawing/2014/main" id="{60753EA9-3379-4648-E01F-0F02363742BA}"/>
+              </a:ext>
+            </a:extLst>
+          </p:cNvPr>
+          <p:cNvPicPr>
+            <a:picLocks noChangeAspect="1"/>
+          </p:cNvPicPr>
+          <p:nvPr/>
+        </p:nvPicPr>
+        <p:blipFill>
+          <a:blip r:embed="rId3"/>
+          <a:stretch>
+            <a:fillRect/>
+          </a:stretch>
+        </p:blipFill>
+        <p:spPr>
+          <a:xfrm>
+            <a:off x="6095999" y="1083060"/>
+            <a:ext cx="3368813" cy="2381402"/>
+          </a:xfrm>
+          <a:prstGeom prst="rect">
+            <a:avLst/>
+          </a:prstGeom>
+        </p:spPr>
+      </p:pic>
+      <p:sp>
+        <p:nvSpPr>
+          <p:cNvPr id="10" name="TextBox 9">
+            <a:extLst>
+              <a:ext uri="{FF2B5EF4-FFF2-40B4-BE49-F238E27FC236}">
+                <a16:creationId xmlns:a16="http://schemas.microsoft.com/office/drawing/2014/main" id="{912776B9-E344-D16D-F7C9-448D8D243CDD}"/>
+              </a:ext>
+            </a:extLst>
+          </p:cNvPr>
+          <p:cNvSpPr txBox="1"/>
+          <p:nvPr/>
+        </p:nvSpPr>
+        <p:spPr>
+          <a:xfrm>
+            <a:off x="4096033" y="1776634"/>
+            <a:ext cx="1765227" cy="923330"/>
+          </a:xfrm>
+          <a:prstGeom prst="rect">
+            <a:avLst/>
+          </a:prstGeom>
+          <a:noFill/>
+        </p:spPr>
+        <p:txBody>
+          <a:bodyPr wrap="none" rtlCol="0">
+            <a:spAutoFit/>
+          </a:bodyPr>
+          <a:lstStyle/>
+          <a:p>
+            <a:r>
+              <a:rPr lang="en-US" dirty="0"/>
+              <a:t>Sa1 open-switch.</a:t>
+            </a:r>
+          </a:p>
+          <a:p>
+            <a:r>
+              <a:rPr lang="en-US" dirty="0"/>
+              <a:t> a: </a:t>
+            </a:r>
+            <a:r>
+              <a:rPr lang="en-US" dirty="0" err="1"/>
+              <a:t>Ia</a:t>
+            </a:r>
+            <a:r>
+              <a:rPr lang="en-US" dirty="0"/>
+              <a:t>&gt;0 &amp; b: </a:t>
+            </a:r>
+            <a:r>
+              <a:rPr lang="en-US" dirty="0" err="1"/>
+              <a:t>Ia</a:t>
+            </a:r>
+            <a:r>
+              <a:rPr lang="en-US" dirty="0"/>
+              <a:t>&lt;0</a:t>
+            </a:r>
+          </a:p>
+          <a:p>
+            <a:r>
+              <a:rPr lang="en-US" dirty="0"/>
+              <a:t>State: [P]</a:t>
+            </a:r>
+          </a:p>
+        </p:txBody>
+      </p:sp>
+      <p:sp>
+        <p:nvSpPr>
+          <p:cNvPr id="11" name="TextBox 10">
+            <a:extLst>
+              <a:ext uri="{FF2B5EF4-FFF2-40B4-BE49-F238E27FC236}">
+                <a16:creationId xmlns:a16="http://schemas.microsoft.com/office/drawing/2014/main" id="{FC841E7C-7BDA-5C00-6FB5-CC6698CAD5EB}"/>
+              </a:ext>
+            </a:extLst>
+          </p:cNvPr>
+          <p:cNvSpPr txBox="1"/>
+          <p:nvPr/>
+        </p:nvSpPr>
+        <p:spPr>
+          <a:xfrm>
+            <a:off x="4208810" y="4459239"/>
+            <a:ext cx="1833387" cy="923330"/>
+          </a:xfrm>
+          <a:prstGeom prst="rect">
+            <a:avLst/>
+          </a:prstGeom>
+          <a:noFill/>
+        </p:spPr>
+        <p:txBody>
+          <a:bodyPr wrap="none" rtlCol="0">
+            <a:spAutoFit/>
+          </a:bodyPr>
+          <a:lstStyle/>
+          <a:p>
+            <a:r>
+              <a:rPr lang="en-US" dirty="0"/>
+              <a:t>Sa2 open-switch. </a:t>
+            </a:r>
+          </a:p>
+          <a:p>
+            <a:r>
+              <a:rPr lang="en-US" dirty="0"/>
+              <a:t>a: </a:t>
+            </a:r>
+            <a:r>
+              <a:rPr lang="en-US" dirty="0" err="1"/>
+              <a:t>Ia</a:t>
+            </a:r>
+            <a:r>
+              <a:rPr lang="en-US" dirty="0"/>
+              <a:t>&gt;0 &amp; b: </a:t>
+            </a:r>
+            <a:r>
+              <a:rPr lang="en-US" dirty="0" err="1"/>
+              <a:t>Ia</a:t>
+            </a:r>
+            <a:r>
+              <a:rPr lang="en-US" dirty="0"/>
+              <a:t>&lt;0</a:t>
+            </a:r>
+          </a:p>
+          <a:p>
+            <a:r>
+              <a:rPr lang="en-US" dirty="0"/>
+              <a:t>State: [0]</a:t>
+            </a:r>
+          </a:p>
+        </p:txBody>
+      </p:sp>
+      <p:sp>
+        <p:nvSpPr>
+          <p:cNvPr id="12" name="TextBox 11">
+            <a:extLst>
+              <a:ext uri="{FF2B5EF4-FFF2-40B4-BE49-F238E27FC236}">
+                <a16:creationId xmlns:a16="http://schemas.microsoft.com/office/drawing/2014/main" id="{AD7B98D5-A067-73A7-53B5-A6876A7BFE94}"/>
+              </a:ext>
+            </a:extLst>
+          </p:cNvPr>
+          <p:cNvSpPr txBox="1"/>
+          <p:nvPr/>
+        </p:nvSpPr>
+        <p:spPr>
+          <a:xfrm>
+            <a:off x="9814327" y="1812096"/>
+            <a:ext cx="1765227" cy="923330"/>
+          </a:xfrm>
+          <a:prstGeom prst="rect">
+            <a:avLst/>
+          </a:prstGeom>
+          <a:noFill/>
+        </p:spPr>
+        <p:txBody>
+          <a:bodyPr wrap="none" rtlCol="0">
+            <a:spAutoFit/>
+          </a:bodyPr>
+          <a:lstStyle/>
+          <a:p>
+            <a:r>
+              <a:rPr lang="en-US" dirty="0"/>
+              <a:t>Sa3 open-switch.</a:t>
+            </a:r>
+          </a:p>
+          <a:p>
+            <a:r>
+              <a:rPr lang="en-US" dirty="0"/>
+              <a:t> a: </a:t>
+            </a:r>
+            <a:r>
+              <a:rPr lang="en-US" dirty="0" err="1"/>
+              <a:t>Ia</a:t>
+            </a:r>
+            <a:r>
+              <a:rPr lang="en-US" dirty="0"/>
+              <a:t>&gt;0 &amp; b: </a:t>
+            </a:r>
+            <a:r>
+              <a:rPr lang="en-US" dirty="0" err="1"/>
+              <a:t>Ia</a:t>
+            </a:r>
+            <a:r>
+              <a:rPr lang="en-US" dirty="0"/>
+              <a:t>&lt;0</a:t>
+            </a:r>
+          </a:p>
+          <a:p>
+            <a:r>
+              <a:rPr lang="en-US" dirty="0"/>
+              <a:t>State: [0]</a:t>
+            </a:r>
+          </a:p>
+        </p:txBody>
+      </p:sp>
+      <p:pic>
+        <p:nvPicPr>
+          <p:cNvPr id="14" name="Picture 13">
+            <a:extLst>
+              <a:ext uri="{FF2B5EF4-FFF2-40B4-BE49-F238E27FC236}">
+                <a16:creationId xmlns:a16="http://schemas.microsoft.com/office/drawing/2014/main" id="{8BA2EA0E-5D1F-0645-BA69-A6B06F12AD3D}"/>
+              </a:ext>
+            </a:extLst>
+          </p:cNvPr>
+          <p:cNvPicPr>
+            <a:picLocks noChangeAspect="1"/>
+          </p:cNvPicPr>
+          <p:nvPr/>
+        </p:nvPicPr>
+        <p:blipFill>
+          <a:blip r:embed="rId4"/>
+          <a:stretch>
+            <a:fillRect/>
+          </a:stretch>
+        </p:blipFill>
+        <p:spPr>
+          <a:xfrm>
+            <a:off x="5829997" y="3834022"/>
+            <a:ext cx="3634815" cy="2423813"/>
+          </a:xfrm>
+          <a:prstGeom prst="rect">
+            <a:avLst/>
+          </a:prstGeom>
+        </p:spPr>
+      </p:pic>
+      <p:sp>
+        <p:nvSpPr>
+          <p:cNvPr id="15" name="TextBox 14">
+            <a:extLst>
+              <a:ext uri="{FF2B5EF4-FFF2-40B4-BE49-F238E27FC236}">
+                <a16:creationId xmlns:a16="http://schemas.microsoft.com/office/drawing/2014/main" id="{4A9F7D59-8B66-F942-ED74-D3D86B4F1583}"/>
+              </a:ext>
+            </a:extLst>
+          </p:cNvPr>
+          <p:cNvSpPr txBox="1"/>
+          <p:nvPr/>
+        </p:nvSpPr>
+        <p:spPr>
+          <a:xfrm>
+            <a:off x="10046730" y="4480704"/>
+            <a:ext cx="1833387" cy="923330"/>
+          </a:xfrm>
+          <a:prstGeom prst="rect">
+            <a:avLst/>
+          </a:prstGeom>
+          <a:noFill/>
+        </p:spPr>
+        <p:txBody>
+          <a:bodyPr wrap="none" rtlCol="0">
+            <a:spAutoFit/>
+          </a:bodyPr>
+          <a:lstStyle/>
+          <a:p>
+            <a:r>
+              <a:rPr lang="en-US" dirty="0"/>
+              <a:t>Sa4 open-switch. </a:t>
+            </a:r>
+          </a:p>
+          <a:p>
+            <a:r>
+              <a:rPr lang="en-US" dirty="0"/>
+              <a:t>a: </a:t>
+            </a:r>
+            <a:r>
+              <a:rPr lang="en-US" dirty="0" err="1"/>
+              <a:t>Ia</a:t>
+            </a:r>
+            <a:r>
+              <a:rPr lang="en-US" dirty="0"/>
+              <a:t>&gt;0 &amp; b: </a:t>
+            </a:r>
+            <a:r>
+              <a:rPr lang="en-US" dirty="0" err="1"/>
+              <a:t>Ia</a:t>
+            </a:r>
+            <a:r>
+              <a:rPr lang="en-US" dirty="0"/>
+              <a:t>&lt;0</a:t>
+            </a:r>
+          </a:p>
+          <a:p>
+            <a:r>
+              <a:rPr lang="en-US" dirty="0"/>
+              <a:t>State: [N]</a:t>
+            </a:r>
+          </a:p>
+        </p:txBody>
+      </p:sp>
+      <p:sp>
+        <p:nvSpPr>
+          <p:cNvPr id="16" name="TextBox 15">
+            <a:extLst>
+              <a:ext uri="{FF2B5EF4-FFF2-40B4-BE49-F238E27FC236}">
+                <a16:creationId xmlns:a16="http://schemas.microsoft.com/office/drawing/2014/main" id="{AA0132AC-7D6C-6FA3-9B81-F4BC67FFAB49}"/>
+              </a:ext>
+            </a:extLst>
+          </p:cNvPr>
+          <p:cNvSpPr txBox="1"/>
+          <p:nvPr/>
+        </p:nvSpPr>
+        <p:spPr>
+          <a:xfrm>
+            <a:off x="550944" y="6257835"/>
+            <a:ext cx="10620632" cy="646331"/>
+          </a:xfrm>
+          <a:prstGeom prst="rect">
+            <a:avLst/>
+          </a:prstGeom>
+          <a:noFill/>
+        </p:spPr>
+        <p:txBody>
+          <a:bodyPr wrap="square" rtlCol="0">
+            <a:spAutoFit/>
+          </a:bodyPr>
+          <a:lstStyle/>
+          <a:p>
+            <a:pPr algn="ctr"/>
+            <a:r>
+              <a:rPr lang="en-US" sz="1800" b="1" i="0" u="none" strike="noStrike" baseline="0" dirty="0">
+                <a:latin typeface="Times-Roman"/>
+              </a:rPr>
+              <a:t>Because of an open-switch fault, the undesirable output pole voltage is produced, and the phase current is distorted. It causes an unbalance of neutral-point </a:t>
+            </a:r>
+            <a:r>
+              <a:rPr lang="tr-TR" sz="1800" b="1" i="0" u="none" strike="noStrike" baseline="0" dirty="0">
+                <a:latin typeface="Times-Roman"/>
+              </a:rPr>
+              <a:t>voltage.</a:t>
+            </a:r>
+            <a:endParaRPr lang="tr-TR" b="1" dirty="0"/>
+          </a:p>
+        </p:txBody>
+      </p:sp>
+    </p:spTree>
+    <p:extLst>
+      <p:ext uri="{BB962C8B-B14F-4D97-AF65-F5344CB8AC3E}">
+        <p14:creationId xmlns:p14="http://schemas.microsoft.com/office/powerpoint/2010/main" val="153875960"/>
+      </p:ext>
+    </p:extLst>
+  </p:cSld>
+  <p:clrMapOvr>
+    <a:masterClrMapping/>
+  </p:clrMapOvr>
+</p:sld>
+</file>
+
+<file path=ppt/slides/slide14.xml><?xml version="1.0" encoding="utf-8"?>
+<p:sld xmlns:a="http://schemas.openxmlformats.org/drawingml/2006/main" xmlns:r="http://schemas.openxmlformats.org/officeDocument/2006/relationships" xmlns:p="http://schemas.openxmlformats.org/presentationml/2006/main">
+  <p:cSld>
+    <p:spTree>
+      <p:nvGrpSpPr>
+        <p:cNvPr id="1" name=""/>
+        <p:cNvGrpSpPr/>
+        <p:nvPr/>
+      </p:nvGrpSpPr>
+      <p:grpSpPr>
+        <a:xfrm>
+          <a:off x="0" y="0"/>
+          <a:ext cx="0" cy="0"/>
+          <a:chOff x="0" y="0"/>
+          <a:chExt cx="0" cy="0"/>
+        </a:xfrm>
+      </p:grpSpPr>
+      <p:sp>
+        <p:nvSpPr>
+          <p:cNvPr id="2" name="Title 1">
+            <a:extLst>
+              <a:ext uri="{FF2B5EF4-FFF2-40B4-BE49-F238E27FC236}">
+                <a16:creationId xmlns:a16="http://schemas.microsoft.com/office/drawing/2014/main" id="{3E66B360-920F-20AB-C705-FCEC3244F08F}"/>
+              </a:ext>
+            </a:extLst>
+          </p:cNvPr>
+          <p:cNvSpPr>
+            <a:spLocks noGrp="1"/>
+          </p:cNvSpPr>
+          <p:nvPr>
+            <p:ph type="title"/>
+          </p:nvPr>
+        </p:nvSpPr>
         <p:spPr/>
         <p:txBody>
           <a:bodyPr/>
           <a:lstStyle/>
           <a:p>
-            <a:r>
-              <a:rPr lang="en-US"/>
-              <a:t>Diagnosis and Tolerant Strategy of T-Type 3LI</a:t>
-            </a:r>
-            <a:endParaRPr lang="tr-TR" dirty="0"/>
+            <a:endParaRPr lang="tr-TR"/>
           </a:p>
         </p:txBody>
       </p:sp>
@@ -4736,7 +5882,7 @@
           <p:cNvPr id="3" name="Content Placeholder 2">
             <a:extLst>
               <a:ext uri="{FF2B5EF4-FFF2-40B4-BE49-F238E27FC236}">
-                <a16:creationId xmlns:a16="http://schemas.microsoft.com/office/drawing/2014/main" id="{FC328C72-921B-B2AE-A20D-6E8FEBBA39FE}"/>
+                <a16:creationId xmlns:a16="http://schemas.microsoft.com/office/drawing/2014/main" id="{37F800F4-D8D3-6F6F-FFA9-3D4C12EA8A51}"/>
               </a:ext>
             </a:extLst>
           </p:cNvPr>
@@ -4752,14 +5898,14 @@
           <a:bodyPr/>
           <a:lstStyle/>
           <a:p>
-            <a:endParaRPr lang="tr-TR" dirty="0"/>
+            <a:endParaRPr lang="tr-TR"/>
           </a:p>
         </p:txBody>
       </p:sp>
     </p:spTree>
     <p:extLst>
       <p:ext uri="{BB962C8B-B14F-4D97-AF65-F5344CB8AC3E}">
-        <p14:creationId xmlns:p14="http://schemas.microsoft.com/office/powerpoint/2010/main" val="153875960"/>
+        <p14:creationId xmlns:p14="http://schemas.microsoft.com/office/powerpoint/2010/main" val="2193058896"/>
       </p:ext>
     </p:extLst>
   </p:cSld>

</xml_diff>

<commit_message>
Fault Tolerant Operations for NPC Inverter p1
</commit_message>
<xml_diff>
--- a/Reports/Fault_Tolerance.pptx
+++ b/Reports/Fault_Tolerance.pptx
@@ -19,6 +19,9 @@
     <p:sldId id="266" r:id="rId13"/>
     <p:sldId id="267" r:id="rId14"/>
     <p:sldId id="269" r:id="rId15"/>
+    <p:sldId id="270" r:id="rId16"/>
+    <p:sldId id="271" r:id="rId17"/>
+    <p:sldId id="272" r:id="rId18"/>
   </p:sldIdLst>
   <p:sldSz cx="12192000" cy="6858000"/>
   <p:notesSz cx="6858000" cy="9144000"/>
@@ -256,7 +259,7 @@
           <a:p>
             <a:fld id="{524C83C5-A6E3-467E-88A3-7867E1892419}" type="datetimeFigureOut">
               <a:rPr lang="tr-TR" smtClean="0"/>
-              <a:t>21.02.2024</a:t>
+              <a:t>26.02.2024</a:t>
             </a:fld>
             <a:endParaRPr lang="tr-TR"/>
           </a:p>
@@ -426,7 +429,7 @@
           <a:p>
             <a:fld id="{524C83C5-A6E3-467E-88A3-7867E1892419}" type="datetimeFigureOut">
               <a:rPr lang="tr-TR" smtClean="0"/>
-              <a:t>21.02.2024</a:t>
+              <a:t>26.02.2024</a:t>
             </a:fld>
             <a:endParaRPr lang="tr-TR"/>
           </a:p>
@@ -606,7 +609,7 @@
           <a:p>
             <a:fld id="{524C83C5-A6E3-467E-88A3-7867E1892419}" type="datetimeFigureOut">
               <a:rPr lang="tr-TR" smtClean="0"/>
-              <a:t>21.02.2024</a:t>
+              <a:t>26.02.2024</a:t>
             </a:fld>
             <a:endParaRPr lang="tr-TR"/>
           </a:p>
@@ -776,7 +779,7 @@
           <a:p>
             <a:fld id="{524C83C5-A6E3-467E-88A3-7867E1892419}" type="datetimeFigureOut">
               <a:rPr lang="tr-TR" smtClean="0"/>
-              <a:t>21.02.2024</a:t>
+              <a:t>26.02.2024</a:t>
             </a:fld>
             <a:endParaRPr lang="tr-TR"/>
           </a:p>
@@ -1022,7 +1025,7 @@
           <a:p>
             <a:fld id="{524C83C5-A6E3-467E-88A3-7867E1892419}" type="datetimeFigureOut">
               <a:rPr lang="tr-TR" smtClean="0"/>
-              <a:t>21.02.2024</a:t>
+              <a:t>26.02.2024</a:t>
             </a:fld>
             <a:endParaRPr lang="tr-TR"/>
           </a:p>
@@ -1254,7 +1257,7 @@
           <a:p>
             <a:fld id="{524C83C5-A6E3-467E-88A3-7867E1892419}" type="datetimeFigureOut">
               <a:rPr lang="tr-TR" smtClean="0"/>
-              <a:t>21.02.2024</a:t>
+              <a:t>26.02.2024</a:t>
             </a:fld>
             <a:endParaRPr lang="tr-TR"/>
           </a:p>
@@ -1621,7 +1624,7 @@
           <a:p>
             <a:fld id="{524C83C5-A6E3-467E-88A3-7867E1892419}" type="datetimeFigureOut">
               <a:rPr lang="tr-TR" smtClean="0"/>
-              <a:t>21.02.2024</a:t>
+              <a:t>26.02.2024</a:t>
             </a:fld>
             <a:endParaRPr lang="tr-TR"/>
           </a:p>
@@ -1739,7 +1742,7 @@
           <a:p>
             <a:fld id="{524C83C5-A6E3-467E-88A3-7867E1892419}" type="datetimeFigureOut">
               <a:rPr lang="tr-TR" smtClean="0"/>
-              <a:t>21.02.2024</a:t>
+              <a:t>26.02.2024</a:t>
             </a:fld>
             <a:endParaRPr lang="tr-TR"/>
           </a:p>
@@ -1834,7 +1837,7 @@
           <a:p>
             <a:fld id="{524C83C5-A6E3-467E-88A3-7867E1892419}" type="datetimeFigureOut">
               <a:rPr lang="tr-TR" smtClean="0"/>
-              <a:t>21.02.2024</a:t>
+              <a:t>26.02.2024</a:t>
             </a:fld>
             <a:endParaRPr lang="tr-TR"/>
           </a:p>
@@ -2111,7 +2114,7 @@
           <a:p>
             <a:fld id="{524C83C5-A6E3-467E-88A3-7867E1892419}" type="datetimeFigureOut">
               <a:rPr lang="tr-TR" smtClean="0"/>
-              <a:t>21.02.2024</a:t>
+              <a:t>26.02.2024</a:t>
             </a:fld>
             <a:endParaRPr lang="tr-TR"/>
           </a:p>
@@ -2368,7 +2371,7 @@
           <a:p>
             <a:fld id="{524C83C5-A6E3-467E-88A3-7867E1892419}" type="datetimeFigureOut">
               <a:rPr lang="tr-TR" smtClean="0"/>
-              <a:t>21.02.2024</a:t>
+              <a:t>26.02.2024</a:t>
             </a:fld>
             <a:endParaRPr lang="tr-TR"/>
           </a:p>
@@ -2581,7 +2584,7 @@
           <a:p>
             <a:fld id="{524C83C5-A6E3-467E-88A3-7867E1892419}" type="datetimeFigureOut">
               <a:rPr lang="tr-TR" smtClean="0"/>
-              <a:t>21.02.2024</a:t>
+              <a:t>26.02.2024</a:t>
             </a:fld>
             <a:endParaRPr lang="tr-TR"/>
           </a:p>
@@ -4419,12 +4422,12 @@
                     <a:p>
                       <a:pPr algn="l" fontAlgn="b"/>
                       <a:r>
-                        <a:rPr lang="tr-TR" sz="1100" u="none" strike="noStrike">
+                        <a:rPr lang="tr-TR" sz="1100" u="none" strike="noStrike" dirty="0">
                           <a:effectLst/>
                         </a:rPr>
                         <a:t>State</a:t>
                       </a:r>
-                      <a:endParaRPr lang="tr-TR" sz="1100" b="0" i="0" u="none" strike="noStrike">
+                      <a:endParaRPr lang="tr-TR" sz="1100" b="0" i="0" u="none" strike="noStrike" dirty="0">
                         <a:solidFill>
                           <a:srgbClr val="000000"/>
                         </a:solidFill>
@@ -5964,6 +5967,1727 @@
     <p:extLst>
       <p:ext uri="{BB962C8B-B14F-4D97-AF65-F5344CB8AC3E}">
         <p14:creationId xmlns:p14="http://schemas.microsoft.com/office/powerpoint/2010/main" val="2193058896"/>
+      </p:ext>
+    </p:extLst>
+  </p:cSld>
+  <p:clrMapOvr>
+    <a:masterClrMapping/>
+  </p:clrMapOvr>
+</p:sld>
+</file>
+
+<file path=ppt/slides/slide15.xml><?xml version="1.0" encoding="utf-8"?>
+<p:sld xmlns:a="http://schemas.openxmlformats.org/drawingml/2006/main" xmlns:r="http://schemas.openxmlformats.org/officeDocument/2006/relationships" xmlns:p="http://schemas.openxmlformats.org/presentationml/2006/main">
+  <p:cSld>
+    <p:bg>
+      <p:bgPr>
+        <a:solidFill>
+          <a:schemeClr val="bg1"/>
+        </a:solidFill>
+        <a:effectLst/>
+      </p:bgPr>
+    </p:bg>
+    <p:spTree>
+      <p:nvGrpSpPr>
+        <p:cNvPr id="1" name=""/>
+        <p:cNvGrpSpPr/>
+        <p:nvPr/>
+      </p:nvGrpSpPr>
+      <p:grpSpPr>
+        <a:xfrm>
+          <a:off x="0" y="0"/>
+          <a:ext cx="0" cy="0"/>
+          <a:chOff x="0" y="0"/>
+          <a:chExt cx="0" cy="0"/>
+        </a:xfrm>
+      </p:grpSpPr>
+      <p:sp useBgFill="1">
+        <p:nvSpPr>
+          <p:cNvPr id="22" name="Rectangle 21">
+            <a:extLst>
+              <a:ext uri="{FF2B5EF4-FFF2-40B4-BE49-F238E27FC236}">
+                <a16:creationId xmlns:a16="http://schemas.microsoft.com/office/drawing/2014/main" id="{8A94871E-96FC-4ADE-815B-41A636E34F1A}"/>
+              </a:ext>
+              <a:ext uri="{C183D7F6-B498-43B3-948B-1728B52AA6E4}">
+                <adec:decorative xmlns:adec="http://schemas.microsoft.com/office/drawing/2017/decorative" val="1"/>
+              </a:ext>
+            </a:extLst>
+          </p:cNvPr>
+          <p:cNvSpPr>
+            <a:spLocks noGrp="1" noRot="1" noChangeAspect="1" noMove="1" noResize="1" noEditPoints="1" noAdjustHandles="1" noChangeArrowheads="1" noChangeShapeType="1" noTextEdit="1"/>
+          </p:cNvSpPr>
+          <p:nvPr>
+            <p:extLst>
+              <p:ext uri="{386F3935-93C4-4BCD-93E2-E3B085C9AB24}">
+                <p16:designElem xmlns:p16="http://schemas.microsoft.com/office/powerpoint/2015/main" val="1"/>
+              </p:ext>
+            </p:extLst>
+          </p:nvPr>
+        </p:nvSpPr>
+        <p:spPr>
+          <a:xfrm>
+            <a:off x="0" y="0"/>
+            <a:ext cx="12192000" cy="6858000"/>
+          </a:xfrm>
+          <a:prstGeom prst="rect">
+            <a:avLst/>
+          </a:prstGeom>
+          <a:ln>
+            <a:noFill/>
+          </a:ln>
+        </p:spPr>
+        <p:style>
+          <a:lnRef idx="2">
+            <a:schemeClr val="accent1">
+              <a:shade val="50000"/>
+            </a:schemeClr>
+          </a:lnRef>
+          <a:fillRef idx="1">
+            <a:schemeClr val="accent1"/>
+          </a:fillRef>
+          <a:effectRef idx="0">
+            <a:schemeClr val="accent1"/>
+          </a:effectRef>
+          <a:fontRef idx="minor">
+            <a:schemeClr val="lt1"/>
+          </a:fontRef>
+        </p:style>
+        <p:txBody>
+          <a:bodyPr rtlCol="0" anchor="ctr"/>
+          <a:lstStyle/>
+          <a:p>
+            <a:pPr algn="ctr"/>
+            <a:endParaRPr lang="en-US"/>
+          </a:p>
+        </p:txBody>
+      </p:sp>
+      <p:sp>
+        <p:nvSpPr>
+          <p:cNvPr id="4" name="Title 3">
+            <a:extLst>
+              <a:ext uri="{FF2B5EF4-FFF2-40B4-BE49-F238E27FC236}">
+                <a16:creationId xmlns:a16="http://schemas.microsoft.com/office/drawing/2014/main" id="{4C316BEC-D9BD-1856-8606-75E6ECCEE7A4}"/>
+              </a:ext>
+            </a:extLst>
+          </p:cNvPr>
+          <p:cNvSpPr>
+            <a:spLocks noGrp="1"/>
+          </p:cNvSpPr>
+          <p:nvPr>
+            <p:ph type="ctrTitle"/>
+          </p:nvPr>
+        </p:nvSpPr>
+        <p:spPr>
+          <a:xfrm>
+            <a:off x="640080" y="320040"/>
+            <a:ext cx="6692827" cy="3892669"/>
+          </a:xfrm>
+        </p:spPr>
+        <p:txBody>
+          <a:bodyPr>
+            <a:normAutofit/>
+          </a:bodyPr>
+          <a:lstStyle/>
+          <a:p>
+            <a:pPr algn="l"/>
+            <a:r>
+              <a:rPr lang="en-US" sz="6600"/>
+              <a:t>Diagnosis and Tolerant Strategy of 3Level NPC Inverters</a:t>
+            </a:r>
+            <a:endParaRPr lang="tr-TR" sz="6600"/>
+          </a:p>
+        </p:txBody>
+      </p:sp>
+      <p:sp>
+        <p:nvSpPr>
+          <p:cNvPr id="5" name="Subtitle 4">
+            <a:extLst>
+              <a:ext uri="{FF2B5EF4-FFF2-40B4-BE49-F238E27FC236}">
+                <a16:creationId xmlns:a16="http://schemas.microsoft.com/office/drawing/2014/main" id="{7E313AC6-718A-3E7C-BAF8-43BE2CC4E761}"/>
+              </a:ext>
+            </a:extLst>
+          </p:cNvPr>
+          <p:cNvSpPr>
+            <a:spLocks noGrp="1"/>
+          </p:cNvSpPr>
+          <p:nvPr>
+            <p:ph type="subTitle" idx="1"/>
+          </p:nvPr>
+        </p:nvSpPr>
+        <p:spPr>
+          <a:xfrm>
+            <a:off x="640080" y="4631161"/>
+            <a:ext cx="6692827" cy="1569486"/>
+          </a:xfrm>
+        </p:spPr>
+        <p:txBody>
+          <a:bodyPr>
+            <a:normAutofit/>
+          </a:bodyPr>
+          <a:lstStyle/>
+          <a:p>
+            <a:pPr algn="l"/>
+            <a:endParaRPr lang="en-US"/>
+          </a:p>
+          <a:p>
+            <a:pPr algn="l"/>
+            <a:r>
+              <a:rPr lang="en-US"/>
+              <a:t>Paper: </a:t>
+            </a:r>
+            <a:r>
+              <a:rPr lang="en-US" b="1" i="0" u="sng" strike="noStrike" baseline="0">
+                <a:latin typeface="Times New Roman" panose="02020603050405020304" pitchFamily="18" charset="0"/>
+              </a:rPr>
+              <a:t>Open-circuit fault detection method for Grid-side </a:t>
+            </a:r>
+            <a:r>
+              <a:rPr lang="tr-TR" b="1" i="0" u="sng" strike="noStrike" baseline="0">
+                <a:latin typeface="Times New Roman" panose="02020603050405020304" pitchFamily="18" charset="0"/>
+              </a:rPr>
+              <a:t>Three-level NPC Inverter</a:t>
+            </a:r>
+            <a:endParaRPr lang="tr-TR" b="1" u="sng" dirty="0"/>
+          </a:p>
+        </p:txBody>
+      </p:sp>
+      <p:sp>
+        <p:nvSpPr>
+          <p:cNvPr id="23" name="sketch line">
+            <a:extLst>
+              <a:ext uri="{FF2B5EF4-FFF2-40B4-BE49-F238E27FC236}">
+                <a16:creationId xmlns:a16="http://schemas.microsoft.com/office/drawing/2014/main" id="{3FCFB1DE-0B7E-48CC-BA90-B2AB0889F9D6}"/>
+              </a:ext>
+              <a:ext uri="{C183D7F6-B498-43B3-948B-1728B52AA6E4}">
+                <adec:decorative xmlns:adec="http://schemas.microsoft.com/office/drawing/2017/decorative" val="1"/>
+              </a:ext>
+            </a:extLst>
+          </p:cNvPr>
+          <p:cNvSpPr>
+            <a:spLocks noGrp="1" noRot="1" noChangeAspect="1" noMove="1" noResize="1" noEditPoints="1" noAdjustHandles="1" noChangeArrowheads="1" noChangeShapeType="1" noTextEdit="1"/>
+          </p:cNvSpPr>
+          <p:nvPr>
+            <p:extLst>
+              <p:ext uri="{386F3935-93C4-4BCD-93E2-E3B085C9AB24}">
+                <p16:designElem xmlns:p16="http://schemas.microsoft.com/office/powerpoint/2015/main" val="1"/>
+              </p:ext>
+            </p:extLst>
+          </p:nvPr>
+        </p:nvSpPr>
+        <p:spPr>
+          <a:xfrm>
+            <a:off x="714562" y="4409267"/>
+            <a:ext cx="4243589" cy="18288"/>
+          </a:xfrm>
+          <a:custGeom>
+            <a:avLst/>
+            <a:gdLst>
+              <a:gd name="connsiteX0" fmla="*/ 0 w 4243589"/>
+              <a:gd name="connsiteY0" fmla="*/ 0 h 18288"/>
+              <a:gd name="connsiteX1" fmla="*/ 563791 w 4243589"/>
+              <a:gd name="connsiteY1" fmla="*/ 0 h 18288"/>
+              <a:gd name="connsiteX2" fmla="*/ 1042710 w 4243589"/>
+              <a:gd name="connsiteY2" fmla="*/ 0 h 18288"/>
+              <a:gd name="connsiteX3" fmla="*/ 1564066 w 4243589"/>
+              <a:gd name="connsiteY3" fmla="*/ 0 h 18288"/>
+              <a:gd name="connsiteX4" fmla="*/ 2212729 w 4243589"/>
+              <a:gd name="connsiteY4" fmla="*/ 0 h 18288"/>
+              <a:gd name="connsiteX5" fmla="*/ 2776520 w 4243589"/>
+              <a:gd name="connsiteY5" fmla="*/ 0 h 18288"/>
+              <a:gd name="connsiteX6" fmla="*/ 3297875 w 4243589"/>
+              <a:gd name="connsiteY6" fmla="*/ 0 h 18288"/>
+              <a:gd name="connsiteX7" fmla="*/ 4243589 w 4243589"/>
+              <a:gd name="connsiteY7" fmla="*/ 0 h 18288"/>
+              <a:gd name="connsiteX8" fmla="*/ 4243589 w 4243589"/>
+              <a:gd name="connsiteY8" fmla="*/ 18288 h 18288"/>
+              <a:gd name="connsiteX9" fmla="*/ 3637362 w 4243589"/>
+              <a:gd name="connsiteY9" fmla="*/ 18288 h 18288"/>
+              <a:gd name="connsiteX10" fmla="*/ 3116007 w 4243589"/>
+              <a:gd name="connsiteY10" fmla="*/ 18288 h 18288"/>
+              <a:gd name="connsiteX11" fmla="*/ 2424908 w 4243589"/>
+              <a:gd name="connsiteY11" fmla="*/ 18288 h 18288"/>
+              <a:gd name="connsiteX12" fmla="*/ 1861117 w 4243589"/>
+              <a:gd name="connsiteY12" fmla="*/ 18288 h 18288"/>
+              <a:gd name="connsiteX13" fmla="*/ 1382198 w 4243589"/>
+              <a:gd name="connsiteY13" fmla="*/ 18288 h 18288"/>
+              <a:gd name="connsiteX14" fmla="*/ 733535 w 4243589"/>
+              <a:gd name="connsiteY14" fmla="*/ 18288 h 18288"/>
+              <a:gd name="connsiteX15" fmla="*/ 0 w 4243589"/>
+              <a:gd name="connsiteY15" fmla="*/ 18288 h 18288"/>
+              <a:gd name="connsiteX16" fmla="*/ 0 w 4243589"/>
+              <a:gd name="connsiteY16" fmla="*/ 0 h 18288"/>
+            </a:gdLst>
+            <a:ahLst/>
+            <a:cxnLst>
+              <a:cxn ang="0">
+                <a:pos x="connsiteX0" y="connsiteY0"/>
+              </a:cxn>
+              <a:cxn ang="0">
+                <a:pos x="connsiteX1" y="connsiteY1"/>
+              </a:cxn>
+              <a:cxn ang="0">
+                <a:pos x="connsiteX2" y="connsiteY2"/>
+              </a:cxn>
+              <a:cxn ang="0">
+                <a:pos x="connsiteX3" y="connsiteY3"/>
+              </a:cxn>
+              <a:cxn ang="0">
+                <a:pos x="connsiteX4" y="connsiteY4"/>
+              </a:cxn>
+              <a:cxn ang="0">
+                <a:pos x="connsiteX5" y="connsiteY5"/>
+              </a:cxn>
+              <a:cxn ang="0">
+                <a:pos x="connsiteX6" y="connsiteY6"/>
+              </a:cxn>
+              <a:cxn ang="0">
+                <a:pos x="connsiteX7" y="connsiteY7"/>
+              </a:cxn>
+              <a:cxn ang="0">
+                <a:pos x="connsiteX8" y="connsiteY8"/>
+              </a:cxn>
+              <a:cxn ang="0">
+                <a:pos x="connsiteX9" y="connsiteY9"/>
+              </a:cxn>
+              <a:cxn ang="0">
+                <a:pos x="connsiteX10" y="connsiteY10"/>
+              </a:cxn>
+              <a:cxn ang="0">
+                <a:pos x="connsiteX11" y="connsiteY11"/>
+              </a:cxn>
+              <a:cxn ang="0">
+                <a:pos x="connsiteX12" y="connsiteY12"/>
+              </a:cxn>
+              <a:cxn ang="0">
+                <a:pos x="connsiteX13" y="connsiteY13"/>
+              </a:cxn>
+              <a:cxn ang="0">
+                <a:pos x="connsiteX14" y="connsiteY14"/>
+              </a:cxn>
+              <a:cxn ang="0">
+                <a:pos x="connsiteX15" y="connsiteY15"/>
+              </a:cxn>
+              <a:cxn ang="0">
+                <a:pos x="connsiteX16" y="connsiteY16"/>
+              </a:cxn>
+            </a:cxnLst>
+            <a:rect l="l" t="t" r="r" b="b"/>
+            <a:pathLst>
+              <a:path w="4243589" h="18288" fill="none" extrusionOk="0">
+                <a:moveTo>
+                  <a:pt x="0" y="0"/>
+                </a:moveTo>
+                <a:cubicBezTo>
+                  <a:pt x="157351" y="-15653"/>
+                  <a:pt x="378877" y="-5828"/>
+                  <a:pt x="563791" y="0"/>
+                </a:cubicBezTo>
+                <a:cubicBezTo>
+                  <a:pt x="748705" y="5828"/>
+                  <a:pt x="905659" y="-5525"/>
+                  <a:pt x="1042710" y="0"/>
+                </a:cubicBezTo>
+                <a:cubicBezTo>
+                  <a:pt x="1179761" y="5525"/>
+                  <a:pt x="1356845" y="-21288"/>
+                  <a:pt x="1564066" y="0"/>
+                </a:cubicBezTo>
+                <a:cubicBezTo>
+                  <a:pt x="1771287" y="21288"/>
+                  <a:pt x="1912099" y="25135"/>
+                  <a:pt x="2212729" y="0"/>
+                </a:cubicBezTo>
+                <a:cubicBezTo>
+                  <a:pt x="2513359" y="-25135"/>
+                  <a:pt x="2514918" y="-27119"/>
+                  <a:pt x="2776520" y="0"/>
+                </a:cubicBezTo>
+                <a:cubicBezTo>
+                  <a:pt x="3038122" y="27119"/>
+                  <a:pt x="3178771" y="18116"/>
+                  <a:pt x="3297875" y="0"/>
+                </a:cubicBezTo>
+                <a:cubicBezTo>
+                  <a:pt x="3416980" y="-18116"/>
+                  <a:pt x="4012240" y="-40869"/>
+                  <a:pt x="4243589" y="0"/>
+                </a:cubicBezTo>
+                <a:cubicBezTo>
+                  <a:pt x="4243987" y="7429"/>
+                  <a:pt x="4243569" y="10822"/>
+                  <a:pt x="4243589" y="18288"/>
+                </a:cubicBezTo>
+                <a:cubicBezTo>
+                  <a:pt x="4112949" y="-2855"/>
+                  <a:pt x="3928037" y="1831"/>
+                  <a:pt x="3637362" y="18288"/>
+                </a:cubicBezTo>
+                <a:cubicBezTo>
+                  <a:pt x="3346687" y="34745"/>
+                  <a:pt x="3254446" y="26669"/>
+                  <a:pt x="3116007" y="18288"/>
+                </a:cubicBezTo>
+                <a:cubicBezTo>
+                  <a:pt x="2977569" y="9907"/>
+                  <a:pt x="2620228" y="28873"/>
+                  <a:pt x="2424908" y="18288"/>
+                </a:cubicBezTo>
+                <a:cubicBezTo>
+                  <a:pt x="2229588" y="7703"/>
+                  <a:pt x="2088287" y="-3854"/>
+                  <a:pt x="1861117" y="18288"/>
+                </a:cubicBezTo>
+                <a:cubicBezTo>
+                  <a:pt x="1633947" y="40430"/>
+                  <a:pt x="1502447" y="-871"/>
+                  <a:pt x="1382198" y="18288"/>
+                </a:cubicBezTo>
+                <a:cubicBezTo>
+                  <a:pt x="1261949" y="37447"/>
+                  <a:pt x="1045440" y="28353"/>
+                  <a:pt x="733535" y="18288"/>
+                </a:cubicBezTo>
+                <a:cubicBezTo>
+                  <a:pt x="421630" y="8223"/>
+                  <a:pt x="341257" y="-18359"/>
+                  <a:pt x="0" y="18288"/>
+                </a:cubicBezTo>
+                <a:cubicBezTo>
+                  <a:pt x="-591" y="13205"/>
+                  <a:pt x="-663" y="6329"/>
+                  <a:pt x="0" y="0"/>
+                </a:cubicBezTo>
+                <a:close/>
+              </a:path>
+              <a:path w="4243589" h="18288" stroke="0" extrusionOk="0">
+                <a:moveTo>
+                  <a:pt x="0" y="0"/>
+                </a:moveTo>
+                <a:cubicBezTo>
+                  <a:pt x="128164" y="17204"/>
+                  <a:pt x="312653" y="1129"/>
+                  <a:pt x="563791" y="0"/>
+                </a:cubicBezTo>
+                <a:cubicBezTo>
+                  <a:pt x="814929" y="-1129"/>
+                  <a:pt x="837271" y="8503"/>
+                  <a:pt x="1042710" y="0"/>
+                </a:cubicBezTo>
+                <a:cubicBezTo>
+                  <a:pt x="1248149" y="-8503"/>
+                  <a:pt x="1588432" y="-28862"/>
+                  <a:pt x="1733809" y="0"/>
+                </a:cubicBezTo>
+                <a:cubicBezTo>
+                  <a:pt x="1879186" y="28862"/>
+                  <a:pt x="2052815" y="5974"/>
+                  <a:pt x="2297600" y="0"/>
+                </a:cubicBezTo>
+                <a:cubicBezTo>
+                  <a:pt x="2542385" y="-5974"/>
+                  <a:pt x="2699960" y="-23550"/>
+                  <a:pt x="2861391" y="0"/>
+                </a:cubicBezTo>
+                <a:cubicBezTo>
+                  <a:pt x="3022822" y="23550"/>
+                  <a:pt x="3390411" y="25272"/>
+                  <a:pt x="3552490" y="0"/>
+                </a:cubicBezTo>
+                <a:cubicBezTo>
+                  <a:pt x="3714569" y="-25272"/>
+                  <a:pt x="3950585" y="-31327"/>
+                  <a:pt x="4243589" y="0"/>
+                </a:cubicBezTo>
+                <a:cubicBezTo>
+                  <a:pt x="4242703" y="5429"/>
+                  <a:pt x="4244410" y="14046"/>
+                  <a:pt x="4243589" y="18288"/>
+                </a:cubicBezTo>
+                <a:cubicBezTo>
+                  <a:pt x="4130424" y="-1240"/>
+                  <a:pt x="3932803" y="42249"/>
+                  <a:pt x="3722234" y="18288"/>
+                </a:cubicBezTo>
+                <a:cubicBezTo>
+                  <a:pt x="3511665" y="-5673"/>
+                  <a:pt x="3269903" y="45994"/>
+                  <a:pt x="3116007" y="18288"/>
+                </a:cubicBezTo>
+                <a:cubicBezTo>
+                  <a:pt x="2962111" y="-9418"/>
+                  <a:pt x="2744280" y="23224"/>
+                  <a:pt x="2509780" y="18288"/>
+                </a:cubicBezTo>
+                <a:cubicBezTo>
+                  <a:pt x="2275280" y="13352"/>
+                  <a:pt x="2066059" y="43664"/>
+                  <a:pt x="1945989" y="18288"/>
+                </a:cubicBezTo>
+                <a:cubicBezTo>
+                  <a:pt x="1825919" y="-7088"/>
+                  <a:pt x="1407329" y="12616"/>
+                  <a:pt x="1254890" y="18288"/>
+                </a:cubicBezTo>
+                <a:cubicBezTo>
+                  <a:pt x="1102451" y="23960"/>
+                  <a:pt x="837950" y="31673"/>
+                  <a:pt x="563791" y="18288"/>
+                </a:cubicBezTo>
+                <a:cubicBezTo>
+                  <a:pt x="289632" y="4903"/>
+                  <a:pt x="132768" y="7105"/>
+                  <a:pt x="0" y="18288"/>
+                </a:cubicBezTo>
+                <a:cubicBezTo>
+                  <a:pt x="668" y="13665"/>
+                  <a:pt x="578" y="5675"/>
+                  <a:pt x="0" y="0"/>
+                </a:cubicBezTo>
+                <a:close/>
+              </a:path>
+            </a:pathLst>
+          </a:custGeom>
+          <a:solidFill>
+            <a:schemeClr val="accent2"/>
+          </a:solidFill>
+          <a:ln w="38100" cap="rnd">
+            <a:solidFill>
+              <a:schemeClr val="accent2"/>
+            </a:solidFill>
+            <a:round/>
+            <a:extLst>
+              <a:ext uri="{C807C97D-BFC1-408E-A445-0C87EB9F89A2}">
+                <ask:lineSketchStyleProps xmlns:ask="http://schemas.microsoft.com/office/drawing/2018/sketchyshapes" sd="1219033472">
+                  <a:prstGeom prst="rect">
+                    <a:avLst/>
+                  </a:prstGeom>
+                  <ask:type>
+                    <ask:lineSketchFreehand/>
+                  </ask:type>
+                </ask:lineSketchStyleProps>
+              </a:ext>
+            </a:extLst>
+          </a:ln>
+        </p:spPr>
+        <p:style>
+          <a:lnRef idx="2">
+            <a:schemeClr val="accent1">
+              <a:shade val="50000"/>
+            </a:schemeClr>
+          </a:lnRef>
+          <a:fillRef idx="1">
+            <a:schemeClr val="accent1"/>
+          </a:fillRef>
+          <a:effectRef idx="0">
+            <a:schemeClr val="accent1"/>
+          </a:effectRef>
+          <a:fontRef idx="minor">
+            <a:schemeClr val="lt1"/>
+          </a:fontRef>
+        </p:style>
+        <p:txBody>
+          <a:bodyPr rtlCol="0" anchor="ctr"/>
+          <a:lstStyle/>
+          <a:p>
+            <a:pPr algn="ctr"/>
+            <a:endParaRPr lang="en-US"/>
+          </a:p>
+        </p:txBody>
+      </p:sp>
+    </p:spTree>
+    <p:extLst>
+      <p:ext uri="{BB962C8B-B14F-4D97-AF65-F5344CB8AC3E}">
+        <p14:creationId xmlns:p14="http://schemas.microsoft.com/office/powerpoint/2010/main" val="227483003"/>
+      </p:ext>
+    </p:extLst>
+  </p:cSld>
+  <p:clrMapOvr>
+    <a:masterClrMapping/>
+  </p:clrMapOvr>
+</p:sld>
+</file>
+
+<file path=ppt/slides/slide16.xml><?xml version="1.0" encoding="utf-8"?>
+<p:sld xmlns:a="http://schemas.openxmlformats.org/drawingml/2006/main" xmlns:r="http://schemas.openxmlformats.org/officeDocument/2006/relationships" xmlns:p="http://schemas.openxmlformats.org/presentationml/2006/main">
+  <p:cSld>
+    <p:bg>
+      <p:bgPr>
+        <a:solidFill>
+          <a:schemeClr val="bg1"/>
+        </a:solidFill>
+        <a:effectLst/>
+      </p:bgPr>
+    </p:bg>
+    <p:spTree>
+      <p:nvGrpSpPr>
+        <p:cNvPr id="1" name=""/>
+        <p:cNvGrpSpPr/>
+        <p:nvPr/>
+      </p:nvGrpSpPr>
+      <p:grpSpPr>
+        <a:xfrm>
+          <a:off x="0" y="0"/>
+          <a:ext cx="0" cy="0"/>
+          <a:chOff x="0" y="0"/>
+          <a:chExt cx="0" cy="0"/>
+        </a:xfrm>
+      </p:grpSpPr>
+      <p:sp useBgFill="1">
+        <p:nvSpPr>
+          <p:cNvPr id="27" name="Rectangle 26">
+            <a:extLst>
+              <a:ext uri="{FF2B5EF4-FFF2-40B4-BE49-F238E27FC236}">
+                <a16:creationId xmlns:a16="http://schemas.microsoft.com/office/drawing/2014/main" id="{2B97F24A-32CE-4C1C-A50D-3016B394DCFB}"/>
+              </a:ext>
+              <a:ext uri="{C183D7F6-B498-43B3-948B-1728B52AA6E4}">
+                <adec:decorative xmlns:adec="http://schemas.microsoft.com/office/drawing/2017/decorative" val="1"/>
+              </a:ext>
+            </a:extLst>
+          </p:cNvPr>
+          <p:cNvSpPr>
+            <a:spLocks noGrp="1" noRot="1" noChangeAspect="1" noMove="1" noResize="1" noEditPoints="1" noAdjustHandles="1" noChangeArrowheads="1" noChangeShapeType="1" noTextEdit="1"/>
+          </p:cNvSpPr>
+          <p:nvPr>
+            <p:extLst>
+              <p:ext uri="{386F3935-93C4-4BCD-93E2-E3B085C9AB24}">
+                <p16:designElem xmlns:p16="http://schemas.microsoft.com/office/powerpoint/2015/main" val="1"/>
+              </p:ext>
+            </p:extLst>
+          </p:nvPr>
+        </p:nvSpPr>
+        <p:spPr>
+          <a:xfrm>
+            <a:off x="0" y="0"/>
+            <a:ext cx="12192000" cy="6858000"/>
+          </a:xfrm>
+          <a:prstGeom prst="rect">
+            <a:avLst/>
+          </a:prstGeom>
+          <a:ln>
+            <a:noFill/>
+          </a:ln>
+        </p:spPr>
+        <p:style>
+          <a:lnRef idx="2">
+            <a:schemeClr val="accent1">
+              <a:shade val="50000"/>
+            </a:schemeClr>
+          </a:lnRef>
+          <a:fillRef idx="1">
+            <a:schemeClr val="accent1"/>
+          </a:fillRef>
+          <a:effectRef idx="0">
+            <a:schemeClr val="accent1"/>
+          </a:effectRef>
+          <a:fontRef idx="minor">
+            <a:schemeClr val="lt1"/>
+          </a:fontRef>
+        </p:style>
+        <p:txBody>
+          <a:bodyPr rtlCol="0" anchor="ctr"/>
+          <a:lstStyle/>
+          <a:p>
+            <a:pPr algn="ctr"/>
+            <a:endParaRPr lang="en-US"/>
+          </a:p>
+        </p:txBody>
+      </p:sp>
+      <p:sp>
+        <p:nvSpPr>
+          <p:cNvPr id="2" name="Title 1">
+            <a:extLst>
+              <a:ext uri="{FF2B5EF4-FFF2-40B4-BE49-F238E27FC236}">
+                <a16:creationId xmlns:a16="http://schemas.microsoft.com/office/drawing/2014/main" id="{7C65A851-34A5-1AC6-9BEA-586465E6DD2D}"/>
+              </a:ext>
+            </a:extLst>
+          </p:cNvPr>
+          <p:cNvSpPr>
+            <a:spLocks noGrp="1"/>
+          </p:cNvSpPr>
+          <p:nvPr>
+            <p:ph type="title"/>
+          </p:nvPr>
+        </p:nvSpPr>
+        <p:spPr>
+          <a:xfrm>
+            <a:off x="630936" y="639520"/>
+            <a:ext cx="3429000" cy="1719072"/>
+          </a:xfrm>
+        </p:spPr>
+        <p:txBody>
+          <a:bodyPr anchor="b">
+            <a:normAutofit/>
+          </a:bodyPr>
+          <a:lstStyle/>
+          <a:p>
+            <a:r>
+              <a:rPr lang="en-US" sz="3400"/>
+              <a:t>Normal Operation of NPC 3-Level Inverter</a:t>
+            </a:r>
+            <a:endParaRPr lang="tr-TR" sz="3400"/>
+          </a:p>
+        </p:txBody>
+      </p:sp>
+      <p:sp>
+        <p:nvSpPr>
+          <p:cNvPr id="28" name="sketch line">
+            <a:extLst>
+              <a:ext uri="{FF2B5EF4-FFF2-40B4-BE49-F238E27FC236}">
+                <a16:creationId xmlns:a16="http://schemas.microsoft.com/office/drawing/2014/main" id="{CD8B4F24-440B-49E9-B85D-733523DC064B}"/>
+              </a:ext>
+              <a:ext uri="{C183D7F6-B498-43B3-948B-1728B52AA6E4}">
+                <adec:decorative xmlns:adec="http://schemas.microsoft.com/office/drawing/2017/decorative" val="1"/>
+              </a:ext>
+            </a:extLst>
+          </p:cNvPr>
+          <p:cNvSpPr>
+            <a:spLocks noGrp="1" noRot="1" noChangeAspect="1" noMove="1" noResize="1" noEditPoints="1" noAdjustHandles="1" noChangeArrowheads="1" noChangeShapeType="1" noTextEdit="1"/>
+          </p:cNvSpPr>
+          <p:nvPr>
+            <p:extLst>
+              <p:ext uri="{386F3935-93C4-4BCD-93E2-E3B085C9AB24}">
+                <p16:designElem xmlns:p16="http://schemas.microsoft.com/office/powerpoint/2015/main" val="1"/>
+              </p:ext>
+            </p:extLst>
+          </p:nvPr>
+        </p:nvSpPr>
+        <p:spPr>
+          <a:xfrm>
+            <a:off x="643278" y="2573756"/>
+            <a:ext cx="3255095" cy="18288"/>
+          </a:xfrm>
+          <a:custGeom>
+            <a:avLst/>
+            <a:gdLst>
+              <a:gd name="connsiteX0" fmla="*/ 0 w 3255095"/>
+              <a:gd name="connsiteY0" fmla="*/ 0 h 18288"/>
+              <a:gd name="connsiteX1" fmla="*/ 618468 w 3255095"/>
+              <a:gd name="connsiteY1" fmla="*/ 0 h 18288"/>
+              <a:gd name="connsiteX2" fmla="*/ 1269487 w 3255095"/>
+              <a:gd name="connsiteY2" fmla="*/ 0 h 18288"/>
+              <a:gd name="connsiteX3" fmla="*/ 1953057 w 3255095"/>
+              <a:gd name="connsiteY3" fmla="*/ 0 h 18288"/>
+              <a:gd name="connsiteX4" fmla="*/ 2636627 w 3255095"/>
+              <a:gd name="connsiteY4" fmla="*/ 0 h 18288"/>
+              <a:gd name="connsiteX5" fmla="*/ 3255095 w 3255095"/>
+              <a:gd name="connsiteY5" fmla="*/ 0 h 18288"/>
+              <a:gd name="connsiteX6" fmla="*/ 3255095 w 3255095"/>
+              <a:gd name="connsiteY6" fmla="*/ 18288 h 18288"/>
+              <a:gd name="connsiteX7" fmla="*/ 2538974 w 3255095"/>
+              <a:gd name="connsiteY7" fmla="*/ 18288 h 18288"/>
+              <a:gd name="connsiteX8" fmla="*/ 1822853 w 3255095"/>
+              <a:gd name="connsiteY8" fmla="*/ 18288 h 18288"/>
+              <a:gd name="connsiteX9" fmla="*/ 1171834 w 3255095"/>
+              <a:gd name="connsiteY9" fmla="*/ 18288 h 18288"/>
+              <a:gd name="connsiteX10" fmla="*/ 0 w 3255095"/>
+              <a:gd name="connsiteY10" fmla="*/ 18288 h 18288"/>
+              <a:gd name="connsiteX11" fmla="*/ 0 w 3255095"/>
+              <a:gd name="connsiteY11" fmla="*/ 0 h 18288"/>
+            </a:gdLst>
+            <a:ahLst/>
+            <a:cxnLst>
+              <a:cxn ang="0">
+                <a:pos x="connsiteX0" y="connsiteY0"/>
+              </a:cxn>
+              <a:cxn ang="0">
+                <a:pos x="connsiteX1" y="connsiteY1"/>
+              </a:cxn>
+              <a:cxn ang="0">
+                <a:pos x="connsiteX2" y="connsiteY2"/>
+              </a:cxn>
+              <a:cxn ang="0">
+                <a:pos x="connsiteX3" y="connsiteY3"/>
+              </a:cxn>
+              <a:cxn ang="0">
+                <a:pos x="connsiteX4" y="connsiteY4"/>
+              </a:cxn>
+              <a:cxn ang="0">
+                <a:pos x="connsiteX5" y="connsiteY5"/>
+              </a:cxn>
+              <a:cxn ang="0">
+                <a:pos x="connsiteX6" y="connsiteY6"/>
+              </a:cxn>
+              <a:cxn ang="0">
+                <a:pos x="connsiteX7" y="connsiteY7"/>
+              </a:cxn>
+              <a:cxn ang="0">
+                <a:pos x="connsiteX8" y="connsiteY8"/>
+              </a:cxn>
+              <a:cxn ang="0">
+                <a:pos x="connsiteX9" y="connsiteY9"/>
+              </a:cxn>
+              <a:cxn ang="0">
+                <a:pos x="connsiteX10" y="connsiteY10"/>
+              </a:cxn>
+              <a:cxn ang="0">
+                <a:pos x="connsiteX11" y="connsiteY11"/>
+              </a:cxn>
+            </a:cxnLst>
+            <a:rect l="l" t="t" r="r" b="b"/>
+            <a:pathLst>
+              <a:path w="3255095" h="18288" fill="none" extrusionOk="0">
+                <a:moveTo>
+                  <a:pt x="0" y="0"/>
+                </a:moveTo>
+                <a:cubicBezTo>
+                  <a:pt x="240201" y="-22123"/>
+                  <a:pt x="462021" y="-19623"/>
+                  <a:pt x="618468" y="0"/>
+                </a:cubicBezTo>
+                <a:cubicBezTo>
+                  <a:pt x="774915" y="19623"/>
+                  <a:pt x="974734" y="2035"/>
+                  <a:pt x="1269487" y="0"/>
+                </a:cubicBezTo>
+                <a:cubicBezTo>
+                  <a:pt x="1564240" y="-2035"/>
+                  <a:pt x="1733579" y="10639"/>
+                  <a:pt x="1953057" y="0"/>
+                </a:cubicBezTo>
+                <a:cubicBezTo>
+                  <a:pt x="2172535" y="-10639"/>
+                  <a:pt x="2453962" y="14018"/>
+                  <a:pt x="2636627" y="0"/>
+                </a:cubicBezTo>
+                <a:cubicBezTo>
+                  <a:pt x="2819292" y="-14018"/>
+                  <a:pt x="3121375" y="5399"/>
+                  <a:pt x="3255095" y="0"/>
+                </a:cubicBezTo>
+                <a:cubicBezTo>
+                  <a:pt x="3254386" y="8157"/>
+                  <a:pt x="3254682" y="12125"/>
+                  <a:pt x="3255095" y="18288"/>
+                </a:cubicBezTo>
+                <a:cubicBezTo>
+                  <a:pt x="3088545" y="23203"/>
+                  <a:pt x="2687475" y="7419"/>
+                  <a:pt x="2538974" y="18288"/>
+                </a:cubicBezTo>
+                <a:cubicBezTo>
+                  <a:pt x="2390473" y="29157"/>
+                  <a:pt x="2137381" y="-8959"/>
+                  <a:pt x="1822853" y="18288"/>
+                </a:cubicBezTo>
+                <a:cubicBezTo>
+                  <a:pt x="1508325" y="45535"/>
+                  <a:pt x="1466437" y="20385"/>
+                  <a:pt x="1171834" y="18288"/>
+                </a:cubicBezTo>
+                <a:cubicBezTo>
+                  <a:pt x="877231" y="16191"/>
+                  <a:pt x="561097" y="37643"/>
+                  <a:pt x="0" y="18288"/>
+                </a:cubicBezTo>
+                <a:cubicBezTo>
+                  <a:pt x="-46" y="12483"/>
+                  <a:pt x="-203" y="6491"/>
+                  <a:pt x="0" y="0"/>
+                </a:cubicBezTo>
+                <a:close/>
+              </a:path>
+              <a:path w="3255095" h="18288" stroke="0" extrusionOk="0">
+                <a:moveTo>
+                  <a:pt x="0" y="0"/>
+                </a:moveTo>
+                <a:cubicBezTo>
+                  <a:pt x="291965" y="19429"/>
+                  <a:pt x="363155" y="8568"/>
+                  <a:pt x="618468" y="0"/>
+                </a:cubicBezTo>
+                <a:cubicBezTo>
+                  <a:pt x="873781" y="-8568"/>
+                  <a:pt x="904459" y="-19505"/>
+                  <a:pt x="1171834" y="0"/>
+                </a:cubicBezTo>
+                <a:cubicBezTo>
+                  <a:pt x="1439209" y="19505"/>
+                  <a:pt x="1744369" y="9790"/>
+                  <a:pt x="1887955" y="0"/>
+                </a:cubicBezTo>
+                <a:cubicBezTo>
+                  <a:pt x="2031541" y="-9790"/>
+                  <a:pt x="2346378" y="21240"/>
+                  <a:pt x="2506423" y="0"/>
+                </a:cubicBezTo>
+                <a:cubicBezTo>
+                  <a:pt x="2666468" y="-21240"/>
+                  <a:pt x="2990257" y="30414"/>
+                  <a:pt x="3255095" y="0"/>
+                </a:cubicBezTo>
+                <a:cubicBezTo>
+                  <a:pt x="3254831" y="4493"/>
+                  <a:pt x="3255479" y="9472"/>
+                  <a:pt x="3255095" y="18288"/>
+                </a:cubicBezTo>
+                <a:cubicBezTo>
+                  <a:pt x="3120743" y="16690"/>
+                  <a:pt x="2759628" y="42462"/>
+                  <a:pt x="2604076" y="18288"/>
+                </a:cubicBezTo>
+                <a:cubicBezTo>
+                  <a:pt x="2448524" y="-5886"/>
+                  <a:pt x="2184336" y="19599"/>
+                  <a:pt x="1887955" y="18288"/>
+                </a:cubicBezTo>
+                <a:cubicBezTo>
+                  <a:pt x="1591574" y="16977"/>
+                  <a:pt x="1548845" y="6870"/>
+                  <a:pt x="1334589" y="18288"/>
+                </a:cubicBezTo>
+                <a:cubicBezTo>
+                  <a:pt x="1120333" y="29706"/>
+                  <a:pt x="996014" y="9662"/>
+                  <a:pt x="683570" y="18288"/>
+                </a:cubicBezTo>
+                <a:cubicBezTo>
+                  <a:pt x="371126" y="26914"/>
+                  <a:pt x="198687" y="16167"/>
+                  <a:pt x="0" y="18288"/>
+                </a:cubicBezTo>
+                <a:cubicBezTo>
+                  <a:pt x="843" y="9577"/>
+                  <a:pt x="371" y="6900"/>
+                  <a:pt x="0" y="0"/>
+                </a:cubicBezTo>
+                <a:close/>
+              </a:path>
+            </a:pathLst>
+          </a:custGeom>
+          <a:solidFill>
+            <a:schemeClr val="accent2"/>
+          </a:solidFill>
+          <a:ln w="38100" cap="rnd">
+            <a:solidFill>
+              <a:schemeClr val="accent2"/>
+            </a:solidFill>
+            <a:round/>
+            <a:extLst>
+              <a:ext uri="{C807C97D-BFC1-408E-A445-0C87EB9F89A2}">
+                <ask:lineSketchStyleProps xmlns:ask="http://schemas.microsoft.com/office/drawing/2018/sketchyshapes" sd="1219033472">
+                  <a:prstGeom prst="rect">
+                    <a:avLst/>
+                  </a:prstGeom>
+                  <ask:type>
+                    <ask:lineSketchFreehand/>
+                  </ask:type>
+                </ask:lineSketchStyleProps>
+              </a:ext>
+            </a:extLst>
+          </a:ln>
+        </p:spPr>
+        <p:style>
+          <a:lnRef idx="2">
+            <a:schemeClr val="accent1">
+              <a:shade val="50000"/>
+            </a:schemeClr>
+          </a:lnRef>
+          <a:fillRef idx="1">
+            <a:schemeClr val="accent1"/>
+          </a:fillRef>
+          <a:effectRef idx="0">
+            <a:schemeClr val="accent1"/>
+          </a:effectRef>
+          <a:fontRef idx="minor">
+            <a:schemeClr val="lt1"/>
+          </a:fontRef>
+        </p:style>
+        <p:txBody>
+          <a:bodyPr rtlCol="0" anchor="ctr"/>
+          <a:lstStyle/>
+          <a:p>
+            <a:pPr algn="ctr"/>
+            <a:endParaRPr lang="en-US"/>
+          </a:p>
+        </p:txBody>
+      </p:sp>
+      <p:pic>
+        <p:nvPicPr>
+          <p:cNvPr id="5" name="Content Placeholder 4">
+            <a:extLst>
+              <a:ext uri="{FF2B5EF4-FFF2-40B4-BE49-F238E27FC236}">
+                <a16:creationId xmlns:a16="http://schemas.microsoft.com/office/drawing/2014/main" id="{2F652CD8-15F1-CC06-576C-D3219D8358B3}"/>
+              </a:ext>
+            </a:extLst>
+          </p:cNvPr>
+          <p:cNvPicPr>
+            <a:picLocks noChangeAspect="1"/>
+          </p:cNvPicPr>
+          <p:nvPr/>
+        </p:nvPicPr>
+        <p:blipFill rotWithShape="1">
+          <a:blip r:embed="rId2"/>
+          <a:srcRect l="3911" r="1802" b="-2"/>
+          <a:stretch/>
+        </p:blipFill>
+        <p:spPr>
+          <a:xfrm>
+            <a:off x="5308776" y="640080"/>
+            <a:ext cx="5594760" cy="5577840"/>
+          </a:xfrm>
+          <a:prstGeom prst="rect">
+            <a:avLst/>
+          </a:prstGeom>
+        </p:spPr>
+      </p:pic>
+      <p:graphicFrame>
+        <p:nvGraphicFramePr>
+          <p:cNvPr id="6" name="Table 5">
+            <a:extLst>
+              <a:ext uri="{FF2B5EF4-FFF2-40B4-BE49-F238E27FC236}">
+                <a16:creationId xmlns:a16="http://schemas.microsoft.com/office/drawing/2014/main" id="{F5FD5335-FA0F-90DC-D5A8-2EF3D460D9CB}"/>
+              </a:ext>
+            </a:extLst>
+          </p:cNvPr>
+          <p:cNvGraphicFramePr>
+            <a:graphicFrameLocks noGrp="1"/>
+          </p:cNvGraphicFramePr>
+          <p:nvPr>
+            <p:extLst>
+              <p:ext uri="{D42A27DB-BD31-4B8C-83A1-F6EECF244321}">
+                <p14:modId xmlns:p14="http://schemas.microsoft.com/office/powerpoint/2010/main" val="1630918296"/>
+              </p:ext>
+            </p:extLst>
+          </p:nvPr>
+        </p:nvGraphicFramePr>
+        <p:xfrm>
+          <a:off x="316910" y="3606216"/>
+          <a:ext cx="4991866" cy="1954496"/>
+        </p:xfrm>
+        <a:graphic>
+          <a:graphicData uri="http://schemas.openxmlformats.org/drawingml/2006/table">
+            <a:tbl>
+              <a:tblPr>
+                <a:tableStyleId>{5C22544A-7EE6-4342-B048-85BDC9FD1C3A}</a:tableStyleId>
+              </a:tblPr>
+              <a:tblGrid>
+                <a:gridCol w="855201">
+                  <a:extLst>
+                    <a:ext uri="{9D8B030D-6E8A-4147-A177-3AD203B41FA5}">
+                      <a16:colId xmlns:a16="http://schemas.microsoft.com/office/drawing/2014/main" val="738067104"/>
+                    </a:ext>
+                  </a:extLst>
+                </a:gridCol>
+                <a:gridCol w="1075037">
+                  <a:extLst>
+                    <a:ext uri="{9D8B030D-6E8A-4147-A177-3AD203B41FA5}">
+                      <a16:colId xmlns:a16="http://schemas.microsoft.com/office/drawing/2014/main" val="1871928831"/>
+                    </a:ext>
+                  </a:extLst>
+                </a:gridCol>
+                <a:gridCol w="765407">
+                  <a:extLst>
+                    <a:ext uri="{9D8B030D-6E8A-4147-A177-3AD203B41FA5}">
+                      <a16:colId xmlns:a16="http://schemas.microsoft.com/office/drawing/2014/main" val="659605148"/>
+                    </a:ext>
+                  </a:extLst>
+                </a:gridCol>
+                <a:gridCol w="765407">
+                  <a:extLst>
+                    <a:ext uri="{9D8B030D-6E8A-4147-A177-3AD203B41FA5}">
+                      <a16:colId xmlns:a16="http://schemas.microsoft.com/office/drawing/2014/main" val="3118763300"/>
+                    </a:ext>
+                  </a:extLst>
+                </a:gridCol>
+                <a:gridCol w="765407">
+                  <a:extLst>
+                    <a:ext uri="{9D8B030D-6E8A-4147-A177-3AD203B41FA5}">
+                      <a16:colId xmlns:a16="http://schemas.microsoft.com/office/drawing/2014/main" val="1741976836"/>
+                    </a:ext>
+                  </a:extLst>
+                </a:gridCol>
+                <a:gridCol w="765407">
+                  <a:extLst>
+                    <a:ext uri="{9D8B030D-6E8A-4147-A177-3AD203B41FA5}">
+                      <a16:colId xmlns:a16="http://schemas.microsoft.com/office/drawing/2014/main" val="3286428204"/>
+                    </a:ext>
+                  </a:extLst>
+                </a:gridCol>
+              </a:tblGrid>
+              <a:tr h="488624">
+                <a:tc>
+                  <a:txBody>
+                    <a:bodyPr/>
+                    <a:lstStyle/>
+                    <a:p>
+                      <a:pPr algn="l" fontAlgn="b"/>
+                      <a:r>
+                        <a:rPr lang="tr-TR" sz="1800" u="none" strike="noStrike">
+                          <a:effectLst/>
+                        </a:rPr>
+                        <a:t>State</a:t>
+                      </a:r>
+                      <a:endParaRPr lang="tr-TR" sz="1800" b="0" i="0" u="none" strike="noStrike">
+                        <a:solidFill>
+                          <a:srgbClr val="000000"/>
+                        </a:solidFill>
+                        <a:effectLst/>
+                        <a:latin typeface="Calibri" panose="020F0502020204030204" pitchFamily="34" charset="0"/>
+                      </a:endParaRPr>
+                    </a:p>
+                  </a:txBody>
+                  <a:tcPr marL="10141" marR="10141" marT="10141" marB="0" anchor="b"/>
+                </a:tc>
+                <a:tc>
+                  <a:txBody>
+                    <a:bodyPr/>
+                    <a:lstStyle/>
+                    <a:p>
+                      <a:pPr algn="l" fontAlgn="b"/>
+                      <a:r>
+                        <a:rPr lang="tr-TR" sz="1800" u="none" strike="noStrike">
+                          <a:effectLst/>
+                        </a:rPr>
+                        <a:t>Vout</a:t>
+                      </a:r>
+                      <a:endParaRPr lang="tr-TR" sz="1800" b="0" i="0" u="none" strike="noStrike">
+                        <a:solidFill>
+                          <a:srgbClr val="000000"/>
+                        </a:solidFill>
+                        <a:effectLst/>
+                        <a:latin typeface="Calibri" panose="020F0502020204030204" pitchFamily="34" charset="0"/>
+                      </a:endParaRPr>
+                    </a:p>
+                  </a:txBody>
+                  <a:tcPr marL="10141" marR="10141" marT="10141" marB="0" anchor="b"/>
+                </a:tc>
+                <a:tc>
+                  <a:txBody>
+                    <a:bodyPr/>
+                    <a:lstStyle/>
+                    <a:p>
+                      <a:pPr algn="l" fontAlgn="b"/>
+                      <a:r>
+                        <a:rPr lang="tr-TR" sz="1800" u="none" strike="noStrike">
+                          <a:effectLst/>
+                        </a:rPr>
+                        <a:t>Sa1</a:t>
+                      </a:r>
+                      <a:endParaRPr lang="tr-TR" sz="1800" b="0" i="0" u="none" strike="noStrike">
+                        <a:solidFill>
+                          <a:srgbClr val="000000"/>
+                        </a:solidFill>
+                        <a:effectLst/>
+                        <a:latin typeface="Calibri" panose="020F0502020204030204" pitchFamily="34" charset="0"/>
+                      </a:endParaRPr>
+                    </a:p>
+                  </a:txBody>
+                  <a:tcPr marL="10141" marR="10141" marT="10141" marB="0" anchor="b"/>
+                </a:tc>
+                <a:tc>
+                  <a:txBody>
+                    <a:bodyPr/>
+                    <a:lstStyle/>
+                    <a:p>
+                      <a:pPr algn="l" fontAlgn="b"/>
+                      <a:r>
+                        <a:rPr lang="tr-TR" sz="1800" u="none" strike="noStrike">
+                          <a:effectLst/>
+                        </a:rPr>
+                        <a:t>Sa2</a:t>
+                      </a:r>
+                      <a:endParaRPr lang="tr-TR" sz="1800" b="0" i="0" u="none" strike="noStrike">
+                        <a:solidFill>
+                          <a:srgbClr val="000000"/>
+                        </a:solidFill>
+                        <a:effectLst/>
+                        <a:latin typeface="Calibri" panose="020F0502020204030204" pitchFamily="34" charset="0"/>
+                      </a:endParaRPr>
+                    </a:p>
+                  </a:txBody>
+                  <a:tcPr marL="10141" marR="10141" marT="10141" marB="0" anchor="b"/>
+                </a:tc>
+                <a:tc>
+                  <a:txBody>
+                    <a:bodyPr/>
+                    <a:lstStyle/>
+                    <a:p>
+                      <a:pPr algn="l" fontAlgn="b"/>
+                      <a:r>
+                        <a:rPr lang="tr-TR" sz="1800" u="none" strike="noStrike">
+                          <a:effectLst/>
+                        </a:rPr>
+                        <a:t>Sa3</a:t>
+                      </a:r>
+                      <a:endParaRPr lang="tr-TR" sz="1800" b="0" i="0" u="none" strike="noStrike">
+                        <a:solidFill>
+                          <a:srgbClr val="000000"/>
+                        </a:solidFill>
+                        <a:effectLst/>
+                        <a:latin typeface="Calibri" panose="020F0502020204030204" pitchFamily="34" charset="0"/>
+                      </a:endParaRPr>
+                    </a:p>
+                  </a:txBody>
+                  <a:tcPr marL="10141" marR="10141" marT="10141" marB="0" anchor="b"/>
+                </a:tc>
+                <a:tc>
+                  <a:txBody>
+                    <a:bodyPr/>
+                    <a:lstStyle/>
+                    <a:p>
+                      <a:pPr algn="l" fontAlgn="b"/>
+                      <a:r>
+                        <a:rPr lang="tr-TR" sz="1800" u="none" strike="noStrike">
+                          <a:effectLst/>
+                        </a:rPr>
+                        <a:t>Sa4</a:t>
+                      </a:r>
+                      <a:endParaRPr lang="tr-TR" sz="1800" b="0" i="0" u="none" strike="noStrike">
+                        <a:solidFill>
+                          <a:srgbClr val="000000"/>
+                        </a:solidFill>
+                        <a:effectLst/>
+                        <a:latin typeface="Calibri" panose="020F0502020204030204" pitchFamily="34" charset="0"/>
+                      </a:endParaRPr>
+                    </a:p>
+                  </a:txBody>
+                  <a:tcPr marL="10141" marR="10141" marT="10141" marB="0" anchor="b"/>
+                </a:tc>
+                <a:extLst>
+                  <a:ext uri="{0D108BD9-81ED-4DB2-BD59-A6C34878D82A}">
+                    <a16:rowId xmlns:a16="http://schemas.microsoft.com/office/drawing/2014/main" val="3878468668"/>
+                  </a:ext>
+                </a:extLst>
+              </a:tr>
+              <a:tr h="488624">
+                <a:tc>
+                  <a:txBody>
+                    <a:bodyPr/>
+                    <a:lstStyle/>
+                    <a:p>
+                      <a:pPr algn="l" fontAlgn="b"/>
+                      <a:r>
+                        <a:rPr lang="tr-TR" sz="1800" u="none" strike="noStrike">
+                          <a:effectLst/>
+                        </a:rPr>
+                        <a:t>P</a:t>
+                      </a:r>
+                      <a:endParaRPr lang="tr-TR" sz="1800" b="0" i="0" u="none" strike="noStrike">
+                        <a:solidFill>
+                          <a:srgbClr val="000000"/>
+                        </a:solidFill>
+                        <a:effectLst/>
+                        <a:latin typeface="Calibri" panose="020F0502020204030204" pitchFamily="34" charset="0"/>
+                      </a:endParaRPr>
+                    </a:p>
+                  </a:txBody>
+                  <a:tcPr marL="10141" marR="10141" marT="10141" marB="0" anchor="b"/>
+                </a:tc>
+                <a:tc>
+                  <a:txBody>
+                    <a:bodyPr/>
+                    <a:lstStyle/>
+                    <a:p>
+                      <a:pPr algn="l" fontAlgn="b"/>
+                      <a:r>
+                        <a:rPr lang="en-US" sz="1800" u="none" strike="noStrike">
+                          <a:effectLst/>
+                        </a:rPr>
+                        <a:t>+</a:t>
+                      </a:r>
+                      <a:r>
+                        <a:rPr lang="tr-TR" sz="1800" u="none" strike="noStrike">
+                          <a:effectLst/>
+                        </a:rPr>
+                        <a:t>Vdc/2</a:t>
+                      </a:r>
+                      <a:endParaRPr lang="tr-TR" sz="1800" b="0" i="0" u="none" strike="noStrike">
+                        <a:solidFill>
+                          <a:srgbClr val="000000"/>
+                        </a:solidFill>
+                        <a:effectLst/>
+                        <a:latin typeface="Calibri" panose="020F0502020204030204" pitchFamily="34" charset="0"/>
+                      </a:endParaRPr>
+                    </a:p>
+                  </a:txBody>
+                  <a:tcPr marL="10141" marR="10141" marT="10141" marB="0" anchor="b"/>
+                </a:tc>
+                <a:tc>
+                  <a:txBody>
+                    <a:bodyPr/>
+                    <a:lstStyle/>
+                    <a:p>
+                      <a:pPr algn="l" fontAlgn="b"/>
+                      <a:r>
+                        <a:rPr lang="tr-TR" sz="1800" u="none" strike="noStrike">
+                          <a:effectLst/>
+                        </a:rPr>
+                        <a:t>ON</a:t>
+                      </a:r>
+                      <a:endParaRPr lang="tr-TR" sz="1800" b="0" i="0" u="none" strike="noStrike">
+                        <a:solidFill>
+                          <a:srgbClr val="000000"/>
+                        </a:solidFill>
+                        <a:effectLst/>
+                        <a:latin typeface="Calibri" panose="020F0502020204030204" pitchFamily="34" charset="0"/>
+                      </a:endParaRPr>
+                    </a:p>
+                  </a:txBody>
+                  <a:tcPr marL="10141" marR="10141" marT="10141" marB="0" anchor="b"/>
+                </a:tc>
+                <a:tc>
+                  <a:txBody>
+                    <a:bodyPr/>
+                    <a:lstStyle/>
+                    <a:p>
+                      <a:pPr algn="l" fontAlgn="b"/>
+                      <a:r>
+                        <a:rPr lang="tr-TR" sz="1800" u="none" strike="noStrike">
+                          <a:effectLst/>
+                        </a:rPr>
+                        <a:t>ON</a:t>
+                      </a:r>
+                      <a:endParaRPr lang="tr-TR" sz="1800" b="0" i="0" u="none" strike="noStrike">
+                        <a:solidFill>
+                          <a:srgbClr val="000000"/>
+                        </a:solidFill>
+                        <a:effectLst/>
+                        <a:latin typeface="Calibri" panose="020F0502020204030204" pitchFamily="34" charset="0"/>
+                      </a:endParaRPr>
+                    </a:p>
+                  </a:txBody>
+                  <a:tcPr marL="10141" marR="10141" marT="10141" marB="0" anchor="b"/>
+                </a:tc>
+                <a:tc>
+                  <a:txBody>
+                    <a:bodyPr/>
+                    <a:lstStyle/>
+                    <a:p>
+                      <a:pPr algn="l" fontAlgn="b"/>
+                      <a:r>
+                        <a:rPr lang="tr-TR" sz="1800" u="none" strike="noStrike">
+                          <a:effectLst/>
+                        </a:rPr>
+                        <a:t>OFF</a:t>
+                      </a:r>
+                      <a:endParaRPr lang="tr-TR" sz="1800" b="0" i="0" u="none" strike="noStrike">
+                        <a:solidFill>
+                          <a:srgbClr val="000000"/>
+                        </a:solidFill>
+                        <a:effectLst/>
+                        <a:latin typeface="Calibri" panose="020F0502020204030204" pitchFamily="34" charset="0"/>
+                      </a:endParaRPr>
+                    </a:p>
+                  </a:txBody>
+                  <a:tcPr marL="10141" marR="10141" marT="10141" marB="0" anchor="b"/>
+                </a:tc>
+                <a:tc>
+                  <a:txBody>
+                    <a:bodyPr/>
+                    <a:lstStyle/>
+                    <a:p>
+                      <a:pPr algn="l" fontAlgn="b"/>
+                      <a:r>
+                        <a:rPr lang="tr-TR" sz="1800" u="none" strike="noStrike">
+                          <a:effectLst/>
+                        </a:rPr>
+                        <a:t>OFF</a:t>
+                      </a:r>
+                      <a:endParaRPr lang="tr-TR" sz="1800" b="0" i="0" u="none" strike="noStrike">
+                        <a:solidFill>
+                          <a:srgbClr val="000000"/>
+                        </a:solidFill>
+                        <a:effectLst/>
+                        <a:latin typeface="Calibri" panose="020F0502020204030204" pitchFamily="34" charset="0"/>
+                      </a:endParaRPr>
+                    </a:p>
+                  </a:txBody>
+                  <a:tcPr marL="10141" marR="10141" marT="10141" marB="0" anchor="b"/>
+                </a:tc>
+                <a:extLst>
+                  <a:ext uri="{0D108BD9-81ED-4DB2-BD59-A6C34878D82A}">
+                    <a16:rowId xmlns:a16="http://schemas.microsoft.com/office/drawing/2014/main" val="1327193577"/>
+                  </a:ext>
+                </a:extLst>
+              </a:tr>
+              <a:tr h="488624">
+                <a:tc>
+                  <a:txBody>
+                    <a:bodyPr/>
+                    <a:lstStyle/>
+                    <a:p>
+                      <a:pPr algn="l" fontAlgn="b"/>
+                      <a:r>
+                        <a:rPr lang="tr-TR" sz="1800" u="none" strike="noStrike">
+                          <a:effectLst/>
+                        </a:rPr>
+                        <a:t>0</a:t>
+                      </a:r>
+                      <a:endParaRPr lang="tr-TR" sz="1800" b="0" i="0" u="none" strike="noStrike">
+                        <a:solidFill>
+                          <a:srgbClr val="000000"/>
+                        </a:solidFill>
+                        <a:effectLst/>
+                        <a:latin typeface="Calibri" panose="020F0502020204030204" pitchFamily="34" charset="0"/>
+                      </a:endParaRPr>
+                    </a:p>
+                  </a:txBody>
+                  <a:tcPr marL="10141" marR="10141" marT="10141" marB="0" anchor="b"/>
+                </a:tc>
+                <a:tc>
+                  <a:txBody>
+                    <a:bodyPr/>
+                    <a:lstStyle/>
+                    <a:p>
+                      <a:pPr algn="ctr" fontAlgn="b"/>
+                      <a:r>
+                        <a:rPr lang="tr-TR" sz="1800" u="none" strike="noStrike">
+                          <a:effectLst/>
+                        </a:rPr>
+                        <a:t>0</a:t>
+                      </a:r>
+                      <a:endParaRPr lang="tr-TR" sz="1800" b="0" i="0" u="none" strike="noStrike">
+                        <a:solidFill>
+                          <a:srgbClr val="000000"/>
+                        </a:solidFill>
+                        <a:effectLst/>
+                        <a:latin typeface="Calibri" panose="020F0502020204030204" pitchFamily="34" charset="0"/>
+                      </a:endParaRPr>
+                    </a:p>
+                  </a:txBody>
+                  <a:tcPr marL="10141" marR="10141" marT="10141" marB="0" anchor="b"/>
+                </a:tc>
+                <a:tc>
+                  <a:txBody>
+                    <a:bodyPr/>
+                    <a:lstStyle/>
+                    <a:p>
+                      <a:pPr algn="l" fontAlgn="b"/>
+                      <a:r>
+                        <a:rPr lang="tr-TR" sz="1800" u="none" strike="noStrike">
+                          <a:effectLst/>
+                        </a:rPr>
+                        <a:t>OFF</a:t>
+                      </a:r>
+                      <a:endParaRPr lang="tr-TR" sz="1800" b="0" i="0" u="none" strike="noStrike">
+                        <a:solidFill>
+                          <a:srgbClr val="000000"/>
+                        </a:solidFill>
+                        <a:effectLst/>
+                        <a:latin typeface="Calibri" panose="020F0502020204030204" pitchFamily="34" charset="0"/>
+                      </a:endParaRPr>
+                    </a:p>
+                  </a:txBody>
+                  <a:tcPr marL="10141" marR="10141" marT="10141" marB="0" anchor="b"/>
+                </a:tc>
+                <a:tc>
+                  <a:txBody>
+                    <a:bodyPr/>
+                    <a:lstStyle/>
+                    <a:p>
+                      <a:pPr algn="l" fontAlgn="b"/>
+                      <a:r>
+                        <a:rPr lang="tr-TR" sz="1800" u="none" strike="noStrike">
+                          <a:effectLst/>
+                        </a:rPr>
+                        <a:t>ON</a:t>
+                      </a:r>
+                      <a:endParaRPr lang="tr-TR" sz="1800" b="0" i="0" u="none" strike="noStrike">
+                        <a:solidFill>
+                          <a:srgbClr val="000000"/>
+                        </a:solidFill>
+                        <a:effectLst/>
+                        <a:latin typeface="Calibri" panose="020F0502020204030204" pitchFamily="34" charset="0"/>
+                      </a:endParaRPr>
+                    </a:p>
+                  </a:txBody>
+                  <a:tcPr marL="10141" marR="10141" marT="10141" marB="0" anchor="b"/>
+                </a:tc>
+                <a:tc>
+                  <a:txBody>
+                    <a:bodyPr/>
+                    <a:lstStyle/>
+                    <a:p>
+                      <a:pPr algn="l" fontAlgn="b"/>
+                      <a:r>
+                        <a:rPr lang="tr-TR" sz="1800" u="none" strike="noStrike">
+                          <a:effectLst/>
+                        </a:rPr>
+                        <a:t>ON</a:t>
+                      </a:r>
+                      <a:endParaRPr lang="tr-TR" sz="1800" b="0" i="0" u="none" strike="noStrike">
+                        <a:solidFill>
+                          <a:srgbClr val="000000"/>
+                        </a:solidFill>
+                        <a:effectLst/>
+                        <a:latin typeface="Calibri" panose="020F0502020204030204" pitchFamily="34" charset="0"/>
+                      </a:endParaRPr>
+                    </a:p>
+                  </a:txBody>
+                  <a:tcPr marL="10141" marR="10141" marT="10141" marB="0" anchor="b"/>
+                </a:tc>
+                <a:tc>
+                  <a:txBody>
+                    <a:bodyPr/>
+                    <a:lstStyle/>
+                    <a:p>
+                      <a:pPr algn="l" fontAlgn="b"/>
+                      <a:r>
+                        <a:rPr lang="tr-TR" sz="1800" u="none" strike="noStrike">
+                          <a:effectLst/>
+                        </a:rPr>
+                        <a:t>OFF</a:t>
+                      </a:r>
+                      <a:endParaRPr lang="tr-TR" sz="1800" b="0" i="0" u="none" strike="noStrike">
+                        <a:solidFill>
+                          <a:srgbClr val="000000"/>
+                        </a:solidFill>
+                        <a:effectLst/>
+                        <a:latin typeface="Calibri" panose="020F0502020204030204" pitchFamily="34" charset="0"/>
+                      </a:endParaRPr>
+                    </a:p>
+                  </a:txBody>
+                  <a:tcPr marL="10141" marR="10141" marT="10141" marB="0" anchor="b"/>
+                </a:tc>
+                <a:extLst>
+                  <a:ext uri="{0D108BD9-81ED-4DB2-BD59-A6C34878D82A}">
+                    <a16:rowId xmlns:a16="http://schemas.microsoft.com/office/drawing/2014/main" val="124995844"/>
+                  </a:ext>
+                </a:extLst>
+              </a:tr>
+              <a:tr h="488624">
+                <a:tc>
+                  <a:txBody>
+                    <a:bodyPr/>
+                    <a:lstStyle/>
+                    <a:p>
+                      <a:pPr algn="l" fontAlgn="b"/>
+                      <a:r>
+                        <a:rPr lang="tr-TR" sz="1800" u="none" strike="noStrike">
+                          <a:effectLst/>
+                        </a:rPr>
+                        <a:t>N</a:t>
+                      </a:r>
+                      <a:endParaRPr lang="tr-TR" sz="1800" b="0" i="0" u="none" strike="noStrike">
+                        <a:solidFill>
+                          <a:srgbClr val="000000"/>
+                        </a:solidFill>
+                        <a:effectLst/>
+                        <a:latin typeface="Calibri" panose="020F0502020204030204" pitchFamily="34" charset="0"/>
+                      </a:endParaRPr>
+                    </a:p>
+                  </a:txBody>
+                  <a:tcPr marL="10141" marR="10141" marT="10141" marB="0" anchor="b"/>
+                </a:tc>
+                <a:tc>
+                  <a:txBody>
+                    <a:bodyPr/>
+                    <a:lstStyle/>
+                    <a:p>
+                      <a:pPr algn="l" fontAlgn="b"/>
+                      <a:r>
+                        <a:rPr lang="en-US" sz="1800" u="none" strike="noStrike">
+                          <a:effectLst/>
+                        </a:rPr>
+                        <a:t>-</a:t>
+                      </a:r>
+                      <a:r>
+                        <a:rPr lang="tr-TR" sz="1800" u="none" strike="noStrike">
+                          <a:effectLst/>
+                        </a:rPr>
+                        <a:t>Vdc/2</a:t>
+                      </a:r>
+                      <a:endParaRPr lang="tr-TR" sz="1800" b="0" i="0" u="none" strike="noStrike">
+                        <a:solidFill>
+                          <a:srgbClr val="000000"/>
+                        </a:solidFill>
+                        <a:effectLst/>
+                        <a:latin typeface="Calibri" panose="020F0502020204030204" pitchFamily="34" charset="0"/>
+                      </a:endParaRPr>
+                    </a:p>
+                  </a:txBody>
+                  <a:tcPr marL="10141" marR="10141" marT="10141" marB="0" anchor="b"/>
+                </a:tc>
+                <a:tc>
+                  <a:txBody>
+                    <a:bodyPr/>
+                    <a:lstStyle/>
+                    <a:p>
+                      <a:pPr algn="l" fontAlgn="b"/>
+                      <a:r>
+                        <a:rPr lang="tr-TR" sz="1800" u="none" strike="noStrike">
+                          <a:effectLst/>
+                        </a:rPr>
+                        <a:t>OFF</a:t>
+                      </a:r>
+                      <a:endParaRPr lang="tr-TR" sz="1800" b="0" i="0" u="none" strike="noStrike">
+                        <a:solidFill>
+                          <a:srgbClr val="000000"/>
+                        </a:solidFill>
+                        <a:effectLst/>
+                        <a:latin typeface="Calibri" panose="020F0502020204030204" pitchFamily="34" charset="0"/>
+                      </a:endParaRPr>
+                    </a:p>
+                  </a:txBody>
+                  <a:tcPr marL="10141" marR="10141" marT="10141" marB="0" anchor="b"/>
+                </a:tc>
+                <a:tc>
+                  <a:txBody>
+                    <a:bodyPr/>
+                    <a:lstStyle/>
+                    <a:p>
+                      <a:pPr algn="l" fontAlgn="b"/>
+                      <a:r>
+                        <a:rPr lang="tr-TR" sz="1800" u="none" strike="noStrike">
+                          <a:effectLst/>
+                        </a:rPr>
+                        <a:t>OFF</a:t>
+                      </a:r>
+                      <a:endParaRPr lang="tr-TR" sz="1800" b="0" i="0" u="none" strike="noStrike">
+                        <a:solidFill>
+                          <a:srgbClr val="000000"/>
+                        </a:solidFill>
+                        <a:effectLst/>
+                        <a:latin typeface="Calibri" panose="020F0502020204030204" pitchFamily="34" charset="0"/>
+                      </a:endParaRPr>
+                    </a:p>
+                  </a:txBody>
+                  <a:tcPr marL="10141" marR="10141" marT="10141" marB="0" anchor="b"/>
+                </a:tc>
+                <a:tc>
+                  <a:txBody>
+                    <a:bodyPr/>
+                    <a:lstStyle/>
+                    <a:p>
+                      <a:pPr algn="l" fontAlgn="b"/>
+                      <a:r>
+                        <a:rPr lang="tr-TR" sz="1800" u="none" strike="noStrike">
+                          <a:effectLst/>
+                        </a:rPr>
+                        <a:t>ON</a:t>
+                      </a:r>
+                      <a:endParaRPr lang="tr-TR" sz="1800" b="0" i="0" u="none" strike="noStrike">
+                        <a:solidFill>
+                          <a:srgbClr val="000000"/>
+                        </a:solidFill>
+                        <a:effectLst/>
+                        <a:latin typeface="Calibri" panose="020F0502020204030204" pitchFamily="34" charset="0"/>
+                      </a:endParaRPr>
+                    </a:p>
+                  </a:txBody>
+                  <a:tcPr marL="10141" marR="10141" marT="10141" marB="0" anchor="b"/>
+                </a:tc>
+                <a:tc>
+                  <a:txBody>
+                    <a:bodyPr/>
+                    <a:lstStyle/>
+                    <a:p>
+                      <a:pPr algn="l" fontAlgn="b"/>
+                      <a:r>
+                        <a:rPr lang="tr-TR" sz="1800" u="none" strike="noStrike" dirty="0">
+                          <a:effectLst/>
+                        </a:rPr>
+                        <a:t>ON</a:t>
+                      </a:r>
+                      <a:endParaRPr lang="tr-TR" sz="1800" b="0" i="0" u="none" strike="noStrike" dirty="0">
+                        <a:solidFill>
+                          <a:srgbClr val="000000"/>
+                        </a:solidFill>
+                        <a:effectLst/>
+                        <a:latin typeface="Calibri" panose="020F0502020204030204" pitchFamily="34" charset="0"/>
+                      </a:endParaRPr>
+                    </a:p>
+                  </a:txBody>
+                  <a:tcPr marL="10141" marR="10141" marT="10141" marB="0" anchor="b"/>
+                </a:tc>
+                <a:extLst>
+                  <a:ext uri="{0D108BD9-81ED-4DB2-BD59-A6C34878D82A}">
+                    <a16:rowId xmlns:a16="http://schemas.microsoft.com/office/drawing/2014/main" val="3262284922"/>
+                  </a:ext>
+                </a:extLst>
+              </a:tr>
+            </a:tbl>
+          </a:graphicData>
+        </a:graphic>
+      </p:graphicFrame>
+    </p:spTree>
+    <p:extLst>
+      <p:ext uri="{BB962C8B-B14F-4D97-AF65-F5344CB8AC3E}">
+        <p14:creationId xmlns:p14="http://schemas.microsoft.com/office/powerpoint/2010/main" val="366156327"/>
+      </p:ext>
+    </p:extLst>
+  </p:cSld>
+  <p:clrMapOvr>
+    <a:masterClrMapping/>
+  </p:clrMapOvr>
+</p:sld>
+</file>
+
+<file path=ppt/slides/slide17.xml><?xml version="1.0" encoding="utf-8"?>
+<p:sld xmlns:a="http://schemas.openxmlformats.org/drawingml/2006/main" xmlns:r="http://schemas.openxmlformats.org/officeDocument/2006/relationships" xmlns:p="http://schemas.openxmlformats.org/presentationml/2006/main">
+  <p:cSld>
+    <p:spTree>
+      <p:nvGrpSpPr>
+        <p:cNvPr id="1" name=""/>
+        <p:cNvGrpSpPr/>
+        <p:nvPr/>
+      </p:nvGrpSpPr>
+      <p:grpSpPr>
+        <a:xfrm>
+          <a:off x="0" y="0"/>
+          <a:ext cx="0" cy="0"/>
+          <a:chOff x="0" y="0"/>
+          <a:chExt cx="0" cy="0"/>
+        </a:xfrm>
+      </p:grpSpPr>
+      <p:sp>
+        <p:nvSpPr>
+          <p:cNvPr id="2" name="Title 1">
+            <a:extLst>
+              <a:ext uri="{FF2B5EF4-FFF2-40B4-BE49-F238E27FC236}">
+                <a16:creationId xmlns:a16="http://schemas.microsoft.com/office/drawing/2014/main" id="{34744FB4-DDD0-B804-B271-16CA1D362110}"/>
+              </a:ext>
+            </a:extLst>
+          </p:cNvPr>
+          <p:cNvSpPr>
+            <a:spLocks noGrp="1"/>
+          </p:cNvSpPr>
+          <p:nvPr>
+            <p:ph type="title"/>
+          </p:nvPr>
+        </p:nvSpPr>
+        <p:spPr/>
+        <p:txBody>
+          <a:bodyPr/>
+          <a:lstStyle/>
+          <a:p>
+            <a:r>
+              <a:rPr lang="en-US" dirty="0"/>
+              <a:t>NPC Under Fault Operation</a:t>
+            </a:r>
+            <a:endParaRPr lang="tr-TR" dirty="0"/>
+          </a:p>
+        </p:txBody>
+      </p:sp>
+      <p:sp>
+        <p:nvSpPr>
+          <p:cNvPr id="3" name="Content Placeholder 2">
+            <a:extLst>
+              <a:ext uri="{FF2B5EF4-FFF2-40B4-BE49-F238E27FC236}">
+                <a16:creationId xmlns:a16="http://schemas.microsoft.com/office/drawing/2014/main" id="{AB9A5423-4DAD-63CB-C353-DEF9B175B7F9}"/>
+              </a:ext>
+            </a:extLst>
+          </p:cNvPr>
+          <p:cNvSpPr>
+            <a:spLocks noGrp="1"/>
+          </p:cNvSpPr>
+          <p:nvPr>
+            <p:ph idx="1"/>
+          </p:nvPr>
+        </p:nvSpPr>
+        <p:spPr/>
+        <p:txBody>
+          <a:bodyPr/>
+          <a:lstStyle/>
+          <a:p>
+            <a:endParaRPr lang="tr-TR" dirty="0"/>
+          </a:p>
+        </p:txBody>
+      </p:sp>
+    </p:spTree>
+    <p:extLst>
+      <p:ext uri="{BB962C8B-B14F-4D97-AF65-F5344CB8AC3E}">
+        <p14:creationId xmlns:p14="http://schemas.microsoft.com/office/powerpoint/2010/main" val="1055659088"/>
       </p:ext>
     </p:extLst>
   </p:cSld>

</xml_diff>